<commit_message>
Modification Présentation ppt : ajout diapo historique
</commit_message>
<xml_diff>
--- a/Présentation_gitlab_Rstudio.pptx
+++ b/Présentation_gitlab_Rstudio.pptx
@@ -5,10 +5,10 @@
     <p:sldMasterId id="2147483648" r:id="rId1"/>
   </p:sldMasterIdLst>
   <p:notesMasterIdLst>
-    <p:notesMasterId r:id="rId21"/>
+    <p:notesMasterId r:id="rId20"/>
   </p:notesMasterIdLst>
   <p:handoutMasterIdLst>
-    <p:handoutMasterId r:id="rId22"/>
+    <p:handoutMasterId r:id="rId21"/>
   </p:handoutMasterIdLst>
   <p:sldIdLst>
     <p:sldId id="265" r:id="rId2"/>
@@ -27,9 +27,8 @@
     <p:sldId id="288" r:id="rId15"/>
     <p:sldId id="289" r:id="rId16"/>
     <p:sldId id="291" r:id="rId17"/>
-    <p:sldId id="278" r:id="rId18"/>
-    <p:sldId id="279" r:id="rId19"/>
-    <p:sldId id="280" r:id="rId20"/>
+    <p:sldId id="279" r:id="rId18"/>
+    <p:sldId id="280" r:id="rId19"/>
   </p:sldIdLst>
   <p:sldSz cx="9144000" cy="6858000" type="screen4x3"/>
   <p:notesSz cx="6858000" cy="9144000"/>
@@ -6322,8 +6321,8 @@
         </p:nvSpPr>
         <p:spPr>
           <a:xfrm>
-            <a:off x="4571999" y="2194124"/>
-            <a:ext cx="4660777" cy="4832092"/>
+            <a:off x="4170780" y="2343496"/>
+            <a:ext cx="4973220" cy="4832092"/>
           </a:xfrm>
           <a:prstGeom prst="rect">
             <a:avLst/>
@@ -6344,7 +6343,7 @@
             <a:endParaRPr lang="fr-FR" sz="1400" dirty="0"/>
           </a:p>
           <a:p>
-            <a:pPr marL="285750" indent="-285750">
+            <a:pPr marL="742950" lvl="1" indent="-285750">
               <a:buFont typeface="Courier New" panose="02070309020205020404" pitchFamily="49" charset="0"/>
               <a:buChar char="o"/>
             </a:pPr>
@@ -6382,14 +6381,14 @@
             </a:r>
           </a:p>
           <a:p>
-            <a:pPr marL="285750" indent="-285750">
+            <a:pPr marL="742950" lvl="1" indent="-285750">
               <a:buFont typeface="Courier New" panose="02070309020205020404" pitchFamily="49" charset="0"/>
               <a:buChar char="o"/>
             </a:pPr>
             <a:endParaRPr lang="fr-FR" sz="1400" dirty="0"/>
           </a:p>
           <a:p>
-            <a:pPr marL="285750" indent="-285750">
+            <a:pPr marL="742950" lvl="1" indent="-285750">
               <a:buFont typeface="Courier New" panose="02070309020205020404" pitchFamily="49" charset="0"/>
               <a:buChar char="o"/>
             </a:pPr>
@@ -6443,14 +6442,14 @@
             </a:r>
           </a:p>
           <a:p>
-            <a:pPr marL="285750" indent="-285750">
+            <a:pPr marL="742950" lvl="1" indent="-285750">
               <a:buFont typeface="Courier New" panose="02070309020205020404" pitchFamily="49" charset="0"/>
               <a:buChar char="o"/>
             </a:pPr>
             <a:endParaRPr lang="fr-FR" sz="1400" dirty="0"/>
           </a:p>
           <a:p>
-            <a:pPr marL="285750" indent="-285750">
+            <a:pPr marL="742950" lvl="1" indent="-285750">
               <a:buFont typeface="Courier New" panose="02070309020205020404" pitchFamily="49" charset="0"/>
               <a:buChar char="o"/>
             </a:pPr>
@@ -6488,14 +6487,14 @@
             </a:r>
           </a:p>
           <a:p>
-            <a:pPr marL="285750" indent="-285750">
+            <a:pPr marL="742950" lvl="1" indent="-285750">
               <a:buFont typeface="Courier New" panose="02070309020205020404" pitchFamily="49" charset="0"/>
               <a:buChar char="o"/>
             </a:pPr>
             <a:endParaRPr lang="fr-FR" sz="1400" dirty="0"/>
           </a:p>
           <a:p>
-            <a:pPr marL="285750" indent="-285750">
+            <a:pPr marL="742950" lvl="1" indent="-285750">
               <a:buFont typeface="Courier New" panose="02070309020205020404" pitchFamily="49" charset="0"/>
               <a:buChar char="o"/>
             </a:pPr>
@@ -6990,6 +6989,33 @@
                                   </p:childTnLst>
                                 </p:cTn>
                               </p:par>
+                              <p:par>
+                                <p:cTn id="9" presetID="1" presetClass="entr" presetSubtype="0" fill="hold" grpId="0" nodeType="withEffect">
+                                  <p:stCondLst>
+                                    <p:cond delay="0"/>
+                                  </p:stCondLst>
+                                  <p:childTnLst>
+                                    <p:set>
+                                      <p:cBhvr>
+                                        <p:cTn id="10" dur="1" fill="hold">
+                                          <p:stCondLst>
+                                            <p:cond delay="0"/>
+                                          </p:stCondLst>
+                                        </p:cTn>
+                                        <p:tgtEl>
+                                          <p:spTgt spid="7"/>
+                                        </p:tgtEl>
+                                        <p:attrNameLst>
+                                          <p:attrName>style.visibility</p:attrName>
+                                        </p:attrNameLst>
+                                      </p:cBhvr>
+                                      <p:to>
+                                        <p:strVal val="visible"/>
+                                      </p:to>
+                                    </p:set>
+                                  </p:childTnLst>
+                                </p:cTn>
+                              </p:par>
                             </p:childTnLst>
                           </p:cTn>
                         </p:par>
@@ -6997,26 +7023,26 @@
                     </p:cTn>
                   </p:par>
                   <p:par>
-                    <p:cTn id="9" fill="hold">
+                    <p:cTn id="11" fill="hold">
                       <p:stCondLst>
                         <p:cond delay="indefinite"/>
                       </p:stCondLst>
                       <p:childTnLst>
                         <p:par>
-                          <p:cTn id="10" fill="hold">
+                          <p:cTn id="12" fill="hold">
                             <p:stCondLst>
                               <p:cond delay="0"/>
                             </p:stCondLst>
                             <p:childTnLst>
                               <p:par>
-                                <p:cTn id="11" presetID="1" presetClass="entr" presetSubtype="0" fill="hold" nodeType="clickEffect">
+                                <p:cTn id="13" presetID="1" presetClass="entr" presetSubtype="0" fill="hold" nodeType="clickEffect">
                                   <p:stCondLst>
                                     <p:cond delay="0"/>
                                   </p:stCondLst>
                                   <p:childTnLst>
                                     <p:set>
                                       <p:cBhvr>
-                                        <p:cTn id="12" dur="1" fill="hold">
+                                        <p:cTn id="14" dur="1" fill="hold">
                                           <p:stCondLst>
                                             <p:cond delay="0"/>
                                           </p:stCondLst>
@@ -7036,14 +7062,14 @@
                                 </p:cTn>
                               </p:par>
                               <p:par>
-                                <p:cTn id="13" presetID="1" presetClass="entr" presetSubtype="0" fill="hold" nodeType="withEffect">
+                                <p:cTn id="15" presetID="1" presetClass="entr" presetSubtype="0" fill="hold" nodeType="withEffect">
                                   <p:stCondLst>
                                     <p:cond delay="0"/>
                                   </p:stCondLst>
                                   <p:childTnLst>
                                     <p:set>
                                       <p:cBhvr>
-                                        <p:cTn id="14" dur="1" fill="hold">
+                                        <p:cTn id="16" dur="1" fill="hold">
                                           <p:stCondLst>
                                             <p:cond delay="0"/>
                                           </p:stCondLst>
@@ -7069,26 +7095,26 @@
                     </p:cTn>
                   </p:par>
                   <p:par>
-                    <p:cTn id="15" fill="hold">
+                    <p:cTn id="17" fill="hold">
                       <p:stCondLst>
                         <p:cond delay="indefinite"/>
                       </p:stCondLst>
                       <p:childTnLst>
                         <p:par>
-                          <p:cTn id="16" fill="hold">
+                          <p:cTn id="18" fill="hold">
                             <p:stCondLst>
                               <p:cond delay="0"/>
                             </p:stCondLst>
                             <p:childTnLst>
                               <p:par>
-                                <p:cTn id="17" presetID="1" presetClass="entr" presetSubtype="0" fill="hold" nodeType="clickEffect">
+                                <p:cTn id="19" presetID="1" presetClass="entr" presetSubtype="0" fill="hold" nodeType="clickEffect">
                                   <p:stCondLst>
                                     <p:cond delay="0"/>
                                   </p:stCondLst>
                                   <p:childTnLst>
                                     <p:set>
                                       <p:cBhvr>
-                                        <p:cTn id="18" dur="1" fill="hold">
+                                        <p:cTn id="20" dur="1" fill="hold">
                                           <p:stCondLst>
                                             <p:cond delay="0"/>
                                           </p:stCondLst>
@@ -7108,14 +7134,14 @@
                                 </p:cTn>
                               </p:par>
                               <p:par>
-                                <p:cTn id="19" presetID="1" presetClass="entr" presetSubtype="0" fill="hold" nodeType="withEffect">
+                                <p:cTn id="21" presetID="1" presetClass="entr" presetSubtype="0" fill="hold" nodeType="withEffect">
                                   <p:stCondLst>
                                     <p:cond delay="0"/>
                                   </p:stCondLst>
                                   <p:childTnLst>
                                     <p:set>
                                       <p:cBhvr>
-                                        <p:cTn id="20" dur="1" fill="hold">
+                                        <p:cTn id="22" dur="1" fill="hold">
                                           <p:stCondLst>
                                             <p:cond delay="0"/>
                                           </p:stCondLst>
@@ -7162,6 +7188,7 @@
       </p:par>
     </p:tnLst>
     <p:bldLst>
+      <p:bldP spid="7" grpId="0"/>
       <p:bldP spid="3" grpId="0" animBg="1"/>
       <p:bldP spid="13" grpId="0" animBg="1"/>
     </p:bldLst>
@@ -7186,74 +7213,65 @@
           <a:chExt cx="0" cy="0"/>
         </a:xfrm>
       </p:grpSpPr>
-      <p:sp>
-        <p:nvSpPr>
-          <p:cNvPr id="2" name="Rectangle 1">
+      <p:pic>
+        <p:nvPicPr>
+          <p:cNvPr id="3" name="Image 2">
             <a:extLst>
               <a:ext uri="{FF2B5EF4-FFF2-40B4-BE49-F238E27FC236}">
-                <a16:creationId xmlns:a16="http://schemas.microsoft.com/office/drawing/2014/main" id="{A7D99FB3-0AB0-491C-8B05-36162B87D194}"/>
+                <a16:creationId xmlns:a16="http://schemas.microsoft.com/office/drawing/2014/main" id="{F50AB77B-88E8-48CB-BC1F-A6B551A15F41}"/>
               </a:ext>
             </a:extLst>
           </p:cNvPr>
-          <p:cNvSpPr>
-            <a:spLocks noChangeArrowheads="1"/>
-          </p:cNvSpPr>
+          <p:cNvPicPr>
+            <a:picLocks noChangeAspect="1"/>
+          </p:cNvPicPr>
           <p:nvPr/>
-        </p:nvSpPr>
-        <p:spPr bwMode="auto">
+        </p:nvPicPr>
+        <p:blipFill rotWithShape="1">
+          <a:blip r:embed="rId2"/>
+          <a:srcRect b="15083"/>
+          <a:stretch/>
+        </p:blipFill>
+        <p:spPr>
           <a:xfrm>
-            <a:off x="630857" y="3094699"/>
-            <a:ext cx="7882286" cy="2031325"/>
+            <a:off x="466077" y="1333987"/>
+            <a:ext cx="8211845" cy="3415567"/>
           </a:xfrm>
           <a:prstGeom prst="rect">
             <a:avLst/>
           </a:prstGeom>
-          <a:noFill/>
-          <a:ln>
-            <a:noFill/>
-          </a:ln>
-          <a:effectLst/>
-          <a:extLst>
-            <a:ext uri="{909E8E84-426E-40DD-AFC4-6F175D3DCCD1}">
-              <a14:hiddenFill xmlns:a14="http://schemas.microsoft.com/office/drawing/2010/main">
-                <a:solidFill>
-                  <a:schemeClr val="accent1"/>
-                </a:solidFill>
-              </a14:hiddenFill>
-            </a:ext>
-            <a:ext uri="{91240B29-F687-4F45-9708-019B960494DF}">
-              <a14:hiddenLine xmlns:a14="http://schemas.microsoft.com/office/drawing/2010/main" w="9525">
-                <a:solidFill>
-                  <a:schemeClr val="tx1"/>
-                </a:solidFill>
-                <a:miter lim="800000"/>
-                <a:headEnd/>
-                <a:tailEnd/>
-              </a14:hiddenLine>
-            </a:ext>
-            <a:ext uri="{AF507438-7753-43E0-B8FC-AC1667EBCBE1}">
-              <a14:hiddenEffects xmlns:a14="http://schemas.microsoft.com/office/drawing/2010/main">
-                <a:effectLst>
-                  <a:outerShdw dist="35921" dir="2700000" algn="ctr" rotWithShape="0">
-                    <a:schemeClr val="bg2"/>
-                  </a:outerShdw>
-                </a:effectLst>
-              </a14:hiddenEffects>
-            </a:ext>
-          </a:extLst>
+        </p:spPr>
+      </p:pic>
+      <p:sp>
+        <p:nvSpPr>
+          <p:cNvPr id="4" name="Rectangle 3">
+            <a:extLst>
+              <a:ext uri="{FF2B5EF4-FFF2-40B4-BE49-F238E27FC236}">
+                <a16:creationId xmlns:a16="http://schemas.microsoft.com/office/drawing/2014/main" id="{0B87087A-80B4-4FBB-B8FC-2EDD9F8B1C1F}"/>
+              </a:ext>
+            </a:extLst>
+          </p:cNvPr>
+          <p:cNvSpPr/>
+          <p:nvPr/>
+        </p:nvSpPr>
+        <p:spPr>
+          <a:xfrm>
+            <a:off x="648069" y="4882700"/>
+            <a:ext cx="8353888" cy="1703030"/>
+          </a:xfrm>
+          <a:prstGeom prst="rect">
+            <a:avLst/>
+          </a:prstGeom>
         </p:spPr>
         <p:txBody>
-          <a:bodyPr vert="horz" wrap="none" lIns="91440" tIns="45720" rIns="91440" bIns="45720" numCol="1" anchor="ctr" anchorCtr="0" compatLnSpc="1">
-            <a:prstTxWarp prst="textNoShape">
-              <a:avLst/>
-            </a:prstTxWarp>
+          <a:bodyPr wrap="square">
             <a:spAutoFit/>
           </a:bodyPr>
           <a:lstStyle/>
           <a:p>
-            <a:pPr marL="0" marR="0" lvl="0" indent="0" algn="l" defTabSz="914400" rtl="0" eaLnBrk="0" fontAlgn="base" latinLnBrk="0" hangingPunct="0">
+            <a:pPr marL="285750" lvl="0" indent="-285750" defTabSz="914400" eaLnBrk="0" fontAlgn="base" hangingPunct="0">
               <a:lnSpc>
-                <a:spcPct val="100000"/>
+                <a:spcPct val="150000"/>
               </a:lnSpc>
               <a:spcBef>
                 <a:spcPct val="0"/>
@@ -7261,30 +7279,20 @@
               <a:spcAft>
                 <a:spcPct val="0"/>
               </a:spcAft>
-              <a:buClrTx/>
-              <a:buSzTx/>
-              <a:buFontTx/>
-              <a:buChar char="•"/>
-              <a:tabLst/>
+              <a:buFont typeface="Courier New" panose="02070309020205020404" pitchFamily="49" charset="0"/>
+              <a:buChar char="o"/>
             </a:pPr>
             <a:r>
-              <a:rPr kumimoji="0" lang="fr-FR" altLang="fr-FR" sz="1800" b="0" i="0" u="none" strike="noStrike" cap="none" normalizeH="0" baseline="0" dirty="0">
-                <a:ln>
-                  <a:noFill/>
-                </a:ln>
-                <a:solidFill>
-                  <a:schemeClr val="tx1"/>
-                </a:solidFill>
-                <a:effectLst/>
+              <a:rPr lang="fr-FR" altLang="fr-FR" dirty="0">
                 <a:latin typeface="Arial" panose="020B0604020202020204" pitchFamily="34" charset="0"/>
               </a:rPr>
-              <a:t>Il est également possible de créer des branches pour travailler en parallèle</a:t>
-            </a:r>
-          </a:p>
-          <a:p>
-            <a:pPr marL="0" marR="0" lvl="0" indent="0" algn="l" defTabSz="914400" rtl="0" eaLnBrk="0" fontAlgn="base" latinLnBrk="0" hangingPunct="0">
+              <a:t>Tu peux revenir sur une précédente sauvegarde</a:t>
+            </a:r>
+          </a:p>
+          <a:p>
+            <a:pPr marL="285750" lvl="0" indent="-285750" defTabSz="914400" eaLnBrk="0" fontAlgn="base" hangingPunct="0">
               <a:lnSpc>
-                <a:spcPct val="100000"/>
+                <a:spcPct val="150000"/>
               </a:lnSpc>
               <a:spcBef>
                 <a:spcPct val="0"/>
@@ -7292,27 +7300,20 @@
               <a:spcAft>
                 <a:spcPct val="0"/>
               </a:spcAft>
-              <a:buClrTx/>
-              <a:buSzTx/>
-              <a:buFontTx/>
-              <a:buChar char="•"/>
-              <a:tabLst/>
+              <a:buFont typeface="Courier New" panose="02070309020205020404" pitchFamily="49" charset="0"/>
+              <a:buChar char="o"/>
             </a:pPr>
-            <a:endParaRPr kumimoji="0" lang="fr-FR" altLang="fr-FR" sz="1800" b="0" i="0" u="none" strike="noStrike" cap="none" normalizeH="0" baseline="0" dirty="0">
-              <a:ln>
-                <a:noFill/>
-              </a:ln>
-              <a:solidFill>
-                <a:schemeClr val="tx1"/>
-              </a:solidFill>
-              <a:effectLst/>
-              <a:latin typeface="Arial" panose="020B0604020202020204" pitchFamily="34" charset="0"/>
-            </a:endParaRPr>
-          </a:p>
-          <a:p>
-            <a:pPr marL="0" marR="0" lvl="0" indent="0" algn="l" defTabSz="914400" rtl="0" eaLnBrk="0" fontAlgn="base" latinLnBrk="0" hangingPunct="0">
+            <a:r>
+              <a:rPr lang="fr-FR" altLang="fr-FR" dirty="0">
+                <a:latin typeface="Arial" panose="020B0604020202020204" pitchFamily="34" charset="0"/>
+              </a:rPr>
+              <a:t>Tu peux récupérer un fichier spécifique dans une précédente sauvegarde</a:t>
+            </a:r>
+          </a:p>
+          <a:p>
+            <a:pPr marL="285750" indent="-285750" defTabSz="914400" eaLnBrk="0" fontAlgn="base" hangingPunct="0">
               <a:lnSpc>
-                <a:spcPct val="100000"/>
+                <a:spcPct val="150000"/>
               </a:lnSpc>
               <a:spcBef>
                 <a:spcPct val="0"/>
@@ -7320,30 +7321,20 @@
               <a:spcAft>
                 <a:spcPct val="0"/>
               </a:spcAft>
-              <a:buClrTx/>
-              <a:buSzTx/>
-              <a:buFontTx/>
-              <a:buChar char="•"/>
-              <a:tabLst/>
+              <a:buFont typeface="Courier New" panose="02070309020205020404" pitchFamily="49" charset="0"/>
+              <a:buChar char="o"/>
             </a:pPr>
             <a:r>
-              <a:rPr kumimoji="0" lang="fr-FR" altLang="fr-FR" sz="1800" b="0" i="0" u="none" strike="noStrike" cap="none" normalizeH="0" baseline="0" dirty="0">
-                <a:ln>
-                  <a:noFill/>
-                </a:ln>
-                <a:solidFill>
-                  <a:schemeClr val="tx1"/>
-                </a:solidFill>
-                <a:effectLst/>
+              <a:rPr lang="fr-FR" altLang="fr-FR" dirty="0">
                 <a:latin typeface="Arial" panose="020B0604020202020204" pitchFamily="34" charset="0"/>
               </a:rPr>
-              <a:t>Tu peux revenir sur une sauvegarde ultérieure</a:t>
-            </a:r>
-          </a:p>
-          <a:p>
-            <a:pPr marL="0" marR="0" lvl="0" indent="0" algn="l" defTabSz="914400" rtl="0" eaLnBrk="0" fontAlgn="base" latinLnBrk="0" hangingPunct="0">
+              <a:t>Il est également possible de créer des branches pour travailler en parallèle</a:t>
+            </a:r>
+          </a:p>
+          <a:p>
+            <a:pPr lvl="0" defTabSz="914400" eaLnBrk="0" fontAlgn="base" hangingPunct="0">
               <a:lnSpc>
-                <a:spcPct val="100000"/>
+                <a:spcPct val="150000"/>
               </a:lnSpc>
               <a:spcBef>
                 <a:spcPct val="0"/>
@@ -7351,135 +7342,101 @@
               <a:spcAft>
                 <a:spcPct val="0"/>
               </a:spcAft>
-              <a:buClrTx/>
-              <a:buSzTx/>
-              <a:buFontTx/>
-              <a:buChar char="•"/>
-              <a:tabLst/>
-            </a:pPr>
-            <a:endParaRPr kumimoji="0" lang="fr-FR" altLang="fr-FR" sz="1800" b="0" i="0" u="none" strike="noStrike" cap="none" normalizeH="0" baseline="0" dirty="0">
-              <a:ln>
-                <a:noFill/>
-              </a:ln>
-              <a:solidFill>
-                <a:schemeClr val="tx1"/>
-              </a:solidFill>
-              <a:effectLst/>
-              <a:latin typeface="Arial" panose="020B0604020202020204" pitchFamily="34" charset="0"/>
-            </a:endParaRPr>
-          </a:p>
-          <a:p>
-            <a:pPr marL="0" marR="0" lvl="0" indent="0" algn="l" defTabSz="914400" rtl="0" eaLnBrk="0" fontAlgn="base" latinLnBrk="0" hangingPunct="0">
-              <a:lnSpc>
-                <a:spcPct val="100000"/>
-              </a:lnSpc>
-              <a:spcBef>
-                <a:spcPct val="0"/>
-              </a:spcBef>
-              <a:spcAft>
-                <a:spcPct val="0"/>
-              </a:spcAft>
-              <a:buClrTx/>
-              <a:buSzTx/>
-              <a:buFontTx/>
-              <a:buChar char="•"/>
-              <a:tabLst/>
-            </a:pPr>
-            <a:r>
-              <a:rPr kumimoji="0" lang="fr-FR" altLang="fr-FR" sz="1800" b="0" i="0" u="none" strike="noStrike" cap="none" normalizeH="0" baseline="0" dirty="0">
-                <a:ln>
-                  <a:noFill/>
-                </a:ln>
-                <a:solidFill>
-                  <a:schemeClr val="tx1"/>
-                </a:solidFill>
-                <a:effectLst/>
-                <a:latin typeface="Arial" panose="020B0604020202020204" pitchFamily="34" charset="0"/>
-              </a:rPr>
-              <a:t>Tu peux récupérer un fichier spécifique dans une précédente sauvegarde</a:t>
-            </a:r>
-          </a:p>
-          <a:p>
-            <a:pPr marL="0" marR="0" lvl="0" indent="0" algn="l" defTabSz="914400" rtl="0" eaLnBrk="0" fontAlgn="base" latinLnBrk="0" hangingPunct="0">
-              <a:lnSpc>
-                <a:spcPct val="100000"/>
-              </a:lnSpc>
-              <a:spcBef>
-                <a:spcPct val="0"/>
-              </a:spcBef>
-              <a:spcAft>
-                <a:spcPct val="0"/>
-              </a:spcAft>
-              <a:buClrTx/>
-              <a:buSzTx/>
-              <a:buFontTx/>
-              <a:buChar char="•"/>
-              <a:tabLst/>
             </a:pPr>
             <a:endParaRPr lang="fr-FR" altLang="fr-FR" dirty="0">
               <a:latin typeface="Arial" panose="020B0604020202020204" pitchFamily="34" charset="0"/>
             </a:endParaRPr>
           </a:p>
-          <a:p>
-            <a:pPr marL="0" marR="0" lvl="0" indent="0" algn="l" defTabSz="914400" rtl="0" eaLnBrk="0" fontAlgn="base" latinLnBrk="0" hangingPunct="0">
-              <a:lnSpc>
-                <a:spcPct val="100000"/>
-              </a:lnSpc>
+        </p:txBody>
+      </p:sp>
+      <p:sp>
+        <p:nvSpPr>
+          <p:cNvPr id="5" name="Titre 1">
+            <a:extLst>
+              <a:ext uri="{FF2B5EF4-FFF2-40B4-BE49-F238E27FC236}">
+                <a16:creationId xmlns:a16="http://schemas.microsoft.com/office/drawing/2014/main" id="{22FDBDDC-2A42-4AC5-BAF0-6E814F6AF592}"/>
+              </a:ext>
+            </a:extLst>
+          </p:cNvPr>
+          <p:cNvSpPr txBox="1">
+            <a:spLocks/>
+          </p:cNvSpPr>
+          <p:nvPr/>
+        </p:nvSpPr>
+        <p:spPr>
+          <a:xfrm>
+            <a:off x="685800" y="142691"/>
+            <a:ext cx="7772400" cy="696804"/>
+          </a:xfrm>
+          <a:prstGeom prst="rect">
+            <a:avLst/>
+          </a:prstGeom>
+        </p:spPr>
+        <p:txBody>
+          <a:bodyPr>
+            <a:normAutofit fontScale="90000" lnSpcReduction="10000"/>
+          </a:bodyPr>
+          <a:lstStyle>
+            <a:lvl1pPr algn="ctr" defTabSz="457200" rtl="0" eaLnBrk="1" latinLnBrk="0" hangingPunct="1">
               <a:spcBef>
                 <a:spcPct val="0"/>
               </a:spcBef>
-              <a:spcAft>
-                <a:spcPct val="0"/>
-              </a:spcAft>
-              <a:buClrTx/>
-              <a:buSzTx/>
-              <a:buFontTx/>
-              <a:buChar char="•"/>
-              <a:tabLst/>
-            </a:pPr>
-            <a:endParaRPr kumimoji="0" lang="fr-FR" altLang="fr-FR" sz="1800" b="0" i="0" u="none" strike="noStrike" cap="none" normalizeH="0" baseline="0" dirty="0">
-              <a:ln>
-                <a:noFill/>
-              </a:ln>
-              <a:solidFill>
-                <a:schemeClr val="tx1"/>
-              </a:solidFill>
-              <a:effectLst/>
-              <a:latin typeface="Arial" panose="020B0604020202020204" pitchFamily="34" charset="0"/>
-            </a:endParaRPr>
+              <a:buNone/>
+              <a:defRPr sz="4400" kern="1200">
+                <a:solidFill>
+                  <a:srgbClr val="1FA22E"/>
+                </a:solidFill>
+                <a:latin typeface="+mj-lt"/>
+                <a:ea typeface="+mj-ea"/>
+                <a:cs typeface="+mj-cs"/>
+              </a:defRPr>
+            </a:lvl1pPr>
+          </a:lstStyle>
+          <a:p>
+            <a:r>
+              <a:rPr lang="fr-FR"/>
+              <a:t>Utilisation</a:t>
+            </a:r>
+            <a:endParaRPr lang="fr-FR" dirty="0"/>
           </a:p>
         </p:txBody>
       </p:sp>
-    </p:spTree>
-    <p:extLst>
-      <p:ext uri="{BB962C8B-B14F-4D97-AF65-F5344CB8AC3E}">
-        <p14:creationId xmlns:p14="http://schemas.microsoft.com/office/powerpoint/2010/main" val="2437506898"/>
-      </p:ext>
-    </p:extLst>
-  </p:cSld>
-  <p:clrMapOvr>
-    <a:masterClrMapping/>
-  </p:clrMapOvr>
-</p:sld>
-</file>
-
-<file path=ppt/slides/slide18.xml><?xml version="1.0" encoding="utf-8"?>
-<p:sld xmlns:a="http://schemas.openxmlformats.org/drawingml/2006/main" xmlns:r="http://schemas.openxmlformats.org/officeDocument/2006/relationships" xmlns:p="http://schemas.openxmlformats.org/presentationml/2006/main">
-  <p:cSld>
-    <p:spTree>
-      <p:nvGrpSpPr>
-        <p:cNvPr id="1" name=""/>
-        <p:cNvGrpSpPr/>
-        <p:nvPr/>
-      </p:nvGrpSpPr>
-      <p:grpSpPr>
-        <a:xfrm>
-          <a:off x="0" y="0"/>
-          <a:ext cx="0" cy="0"/>
-          <a:chOff x="0" y="0"/>
-          <a:chExt cx="0" cy="0"/>
-        </a:xfrm>
-      </p:grpSpPr>
+      <p:sp>
+        <p:nvSpPr>
+          <p:cNvPr id="6" name="ZoneTexte 5">
+            <a:extLst>
+              <a:ext uri="{FF2B5EF4-FFF2-40B4-BE49-F238E27FC236}">
+                <a16:creationId xmlns:a16="http://schemas.microsoft.com/office/drawing/2014/main" id="{C519FF1A-A19B-45D1-A5FB-38BA0EB5B7FF}"/>
+              </a:ext>
+            </a:extLst>
+          </p:cNvPr>
+          <p:cNvSpPr txBox="1"/>
+          <p:nvPr/>
+        </p:nvSpPr>
+        <p:spPr>
+          <a:xfrm>
+            <a:off x="1753339" y="848373"/>
+            <a:ext cx="5637320" cy="461665"/>
+          </a:xfrm>
+          <a:prstGeom prst="rect">
+            <a:avLst/>
+          </a:prstGeom>
+          <a:noFill/>
+        </p:spPr>
+        <p:txBody>
+          <a:bodyPr wrap="square" rtlCol="0">
+            <a:spAutoFit/>
+          </a:bodyPr>
+          <a:lstStyle/>
+          <a:p>
+            <a:pPr algn="ctr"/>
+            <a:r>
+              <a:rPr lang="fr-FR" sz="2400" b="1" dirty="0"/>
+              <a:t>L’historique (log)</a:t>
+            </a:r>
+          </a:p>
+        </p:txBody>
+      </p:sp>
     </p:spTree>
     <p:extLst>
       <p:ext uri="{BB962C8B-B14F-4D97-AF65-F5344CB8AC3E}">
@@ -7493,7 +7450,7 @@
 </p:sld>
 </file>
 
-<file path=ppt/slides/slide19.xml><?xml version="1.0" encoding="utf-8"?>
+<file path=ppt/slides/slide18.xml><?xml version="1.0" encoding="utf-8"?>
 <p:sld xmlns:a="http://schemas.openxmlformats.org/drawingml/2006/main" xmlns:r="http://schemas.openxmlformats.org/officeDocument/2006/relationships" xmlns:p="http://schemas.openxmlformats.org/presentationml/2006/main">
   <p:cSld>
     <p:spTree>

</xml_diff>

<commit_message>
Finalisation de la présentation et du README
</commit_message>
<xml_diff>
--- a/Présentation_gitlab_Rstudio.pptx
+++ b/Présentation_gitlab_Rstudio.pptx
@@ -5,10 +5,10 @@
     <p:sldMasterId id="2147483648" r:id="rId1"/>
   </p:sldMasterIdLst>
   <p:notesMasterIdLst>
-    <p:notesMasterId r:id="rId22"/>
+    <p:notesMasterId r:id="rId23"/>
   </p:notesMasterIdLst>
   <p:handoutMasterIdLst>
-    <p:handoutMasterId r:id="rId23"/>
+    <p:handoutMasterId r:id="rId24"/>
   </p:handoutMasterIdLst>
   <p:sldIdLst>
     <p:sldId id="265" r:id="rId2"/>
@@ -25,12 +25,13 @@
     <p:sldId id="287" r:id="rId13"/>
     <p:sldId id="290" r:id="rId14"/>
     <p:sldId id="288" r:id="rId15"/>
-    <p:sldId id="289" r:id="rId16"/>
-    <p:sldId id="291" r:id="rId17"/>
-    <p:sldId id="279" r:id="rId18"/>
-    <p:sldId id="280" r:id="rId19"/>
-    <p:sldId id="292" r:id="rId20"/>
-    <p:sldId id="293" r:id="rId21"/>
+    <p:sldId id="294" r:id="rId16"/>
+    <p:sldId id="289" r:id="rId17"/>
+    <p:sldId id="291" r:id="rId18"/>
+    <p:sldId id="279" r:id="rId19"/>
+    <p:sldId id="280" r:id="rId20"/>
+    <p:sldId id="292" r:id="rId21"/>
+    <p:sldId id="293" r:id="rId22"/>
   </p:sldIdLst>
   <p:sldSz cx="9144000" cy="6858000" type="screen4x3"/>
   <p:notesSz cx="6858000" cy="9144000"/>
@@ -256,7 +257,7 @@
           <a:p>
             <a:fld id="{9710DCA6-C2A9-4977-8F56-0AA0E9DFCD3E}" type="datetimeFigureOut">
               <a:rPr lang="fr-FR" smtClean="0"/>
-              <a:t>25/04/2022</a:t>
+              <a:t>01/05/2022</a:t>
             </a:fld>
             <a:endParaRPr lang="fr-FR"/>
           </a:p>
@@ -421,7 +422,7 @@
           <a:p>
             <a:fld id="{2E37451D-A5B0-4FAB-B03F-77829303E749}" type="datetimeFigureOut">
               <a:rPr lang="fr-FR" smtClean="0"/>
-              <a:t>25/04/2022</a:t>
+              <a:t>01/05/2022</a:t>
             </a:fld>
             <a:endParaRPr lang="fr-FR"/>
           </a:p>
@@ -1197,7 +1198,7 @@
           <a:p>
             <a:fld id="{141AC103-C553-3C40-80D1-8D13FB31BDBA}" type="datetimeFigureOut">
               <a:rPr lang="fr-FR" smtClean="0"/>
-              <a:t>25/04/2022</a:t>
+              <a:t>01/05/2022</a:t>
             </a:fld>
             <a:endParaRPr lang="fr-FR"/>
           </a:p>
@@ -3522,13 +3523,13 @@
         </p:spPr>
         <p:txBody>
           <a:bodyPr>
-            <a:normAutofit/>
+            <a:normAutofit fontScale="90000"/>
           </a:bodyPr>
           <a:lstStyle/>
           <a:p>
             <a:r>
               <a:rPr lang="fr-FR" dirty="0"/>
-              <a:t>Importer un projet GitLab existant</a:t>
+              <a:t>1. Importer un projet GitLab existant</a:t>
             </a:r>
           </a:p>
         </p:txBody>
@@ -3592,7 +3593,7 @@
             </a:pPr>
             <a:r>
               <a:rPr lang="fr-FR" dirty="0"/>
-              <a:t>Si le projet est privé, il faut que l’administrateur de rentre comme collaborateur</a:t>
+              <a:t>Si le projet est privé, il faut que l’administrateur te rentre comme collaborateur</a:t>
             </a:r>
           </a:p>
           <a:p>
@@ -3605,7 +3606,7 @@
             </a:r>
             <a:r>
               <a:rPr lang="fr-FR" dirty="0"/>
-              <a:t>Il faut copier l’adresse SSH du projet</a:t>
+              <a:t>Il faut copier l’adresse SSH / FTTPS du projet</a:t>
             </a:r>
           </a:p>
           <a:p>
@@ -3647,297 +3648,318 @@
           </a:p>
         </p:txBody>
       </p:sp>
-      <p:pic>
-        <p:nvPicPr>
-          <p:cNvPr id="5" name="Image 4">
+      <p:grpSp>
+        <p:nvGrpSpPr>
+          <p:cNvPr id="4" name="Groupe 3">
             <a:extLst>
               <a:ext uri="{FF2B5EF4-FFF2-40B4-BE49-F238E27FC236}">
-                <a16:creationId xmlns:a16="http://schemas.microsoft.com/office/drawing/2014/main" id="{7A8B4821-4F25-4ADF-985D-EF3184A381C5}"/>
+                <a16:creationId xmlns:a16="http://schemas.microsoft.com/office/drawing/2014/main" id="{81B38B94-F87E-42D6-8834-F244294D38B4}"/>
               </a:ext>
             </a:extLst>
           </p:cNvPr>
-          <p:cNvPicPr>
-            <a:picLocks noChangeAspect="1"/>
-          </p:cNvPicPr>
+          <p:cNvGrpSpPr/>
           <p:nvPr/>
-        </p:nvPicPr>
-        <p:blipFill>
-          <a:blip r:embed="rId2"/>
-          <a:stretch>
-            <a:fillRect/>
-          </a:stretch>
-        </p:blipFill>
-        <p:spPr>
+        </p:nvGrpSpPr>
+        <p:grpSpPr>
           <a:xfrm>
-            <a:off x="3986074" y="3134680"/>
-            <a:ext cx="4989251" cy="3556326"/>
+            <a:off x="2627791" y="3134680"/>
+            <a:ext cx="6516209" cy="3556326"/>
+            <a:chOff x="2627791" y="3134680"/>
+            <a:chExt cx="6516209" cy="3556326"/>
           </a:xfrm>
-          <a:prstGeom prst="rect">
-            <a:avLst/>
-          </a:prstGeom>
-        </p:spPr>
-      </p:pic>
-      <p:sp>
-        <p:nvSpPr>
-          <p:cNvPr id="6" name="ZoneTexte 5">
-            <a:extLst>
-              <a:ext uri="{FF2B5EF4-FFF2-40B4-BE49-F238E27FC236}">
-                <a16:creationId xmlns:a16="http://schemas.microsoft.com/office/drawing/2014/main" id="{85406A56-E139-45DB-B435-F6AC3029B41C}"/>
-              </a:ext>
-            </a:extLst>
-          </p:cNvPr>
-          <p:cNvSpPr txBox="1"/>
-          <p:nvPr/>
-        </p:nvSpPr>
-        <p:spPr>
-          <a:xfrm>
-            <a:off x="6915704" y="3710865"/>
-            <a:ext cx="2228296" cy="369332"/>
-          </a:xfrm>
-          <a:prstGeom prst="rect">
-            <a:avLst/>
-          </a:prstGeom>
-          <a:noFill/>
-        </p:spPr>
-        <p:txBody>
-          <a:bodyPr wrap="square" rtlCol="0">
-            <a:spAutoFit/>
-          </a:bodyPr>
-          <a:lstStyle/>
-          <a:p>
-            <a:r>
-              <a:rPr lang="fr-FR" dirty="0">
-                <a:solidFill>
-                  <a:srgbClr val="0000FF"/>
-                </a:solidFill>
-                <a:highlight>
-                  <a:srgbClr val="FFFF00"/>
-                </a:highlight>
-              </a:rPr>
-              <a:t>L’adresse SSH ici</a:t>
-            </a:r>
-          </a:p>
-        </p:txBody>
-      </p:sp>
-      <p:sp>
-        <p:nvSpPr>
-          <p:cNvPr id="7" name="ZoneTexte 6">
-            <a:extLst>
-              <a:ext uri="{FF2B5EF4-FFF2-40B4-BE49-F238E27FC236}">
-                <a16:creationId xmlns:a16="http://schemas.microsoft.com/office/drawing/2014/main" id="{42753A0D-5AAC-4722-B449-84D940F497A0}"/>
-              </a:ext>
-            </a:extLst>
-          </p:cNvPr>
-          <p:cNvSpPr txBox="1"/>
-          <p:nvPr/>
-        </p:nvSpPr>
-        <p:spPr>
-          <a:xfrm>
-            <a:off x="2627791" y="4355245"/>
-            <a:ext cx="2228296" cy="646331"/>
-          </a:xfrm>
-          <a:prstGeom prst="rect">
-            <a:avLst/>
-          </a:prstGeom>
-          <a:noFill/>
-        </p:spPr>
-        <p:txBody>
-          <a:bodyPr wrap="square" rtlCol="0">
-            <a:spAutoFit/>
-          </a:bodyPr>
-          <a:lstStyle/>
-          <a:p>
-            <a:r>
-              <a:rPr lang="fr-FR" dirty="0">
-                <a:solidFill>
-                  <a:srgbClr val="0000FF"/>
-                </a:solidFill>
-                <a:highlight>
-                  <a:srgbClr val="FFFF00"/>
-                </a:highlight>
-              </a:rPr>
-              <a:t>Le nom que tu veux donner au dossier</a:t>
-            </a:r>
-          </a:p>
-        </p:txBody>
-      </p:sp>
-      <p:sp>
-        <p:nvSpPr>
-          <p:cNvPr id="8" name="ZoneTexte 7">
-            <a:extLst>
-              <a:ext uri="{FF2B5EF4-FFF2-40B4-BE49-F238E27FC236}">
-                <a16:creationId xmlns:a16="http://schemas.microsoft.com/office/drawing/2014/main" id="{808B2BEE-6A47-4E4B-953A-C41CB1AE17D8}"/>
-              </a:ext>
-            </a:extLst>
-          </p:cNvPr>
-          <p:cNvSpPr txBox="1"/>
-          <p:nvPr/>
-        </p:nvSpPr>
-        <p:spPr>
-          <a:xfrm>
-            <a:off x="4856087" y="5665433"/>
-            <a:ext cx="4119238" cy="646331"/>
-          </a:xfrm>
-          <a:prstGeom prst="rect">
-            <a:avLst/>
-          </a:prstGeom>
-          <a:noFill/>
-        </p:spPr>
-        <p:txBody>
-          <a:bodyPr wrap="square" rtlCol="0">
-            <a:spAutoFit/>
-          </a:bodyPr>
-          <a:lstStyle/>
-          <a:p>
-            <a:r>
-              <a:rPr lang="fr-FR" dirty="0">
-                <a:solidFill>
-                  <a:srgbClr val="0000FF"/>
-                </a:solidFill>
-                <a:highlight>
-                  <a:srgbClr val="FFFF00"/>
-                </a:highlight>
-              </a:rPr>
-              <a:t>Pour sélectionner le chemin où tu veux l’enregistrer</a:t>
-            </a:r>
-          </a:p>
-        </p:txBody>
-      </p:sp>
-      <p:cxnSp>
-        <p:nvCxnSpPr>
-          <p:cNvPr id="10" name="Connecteur droit avec flèche 9">
-            <a:extLst>
-              <a:ext uri="{FF2B5EF4-FFF2-40B4-BE49-F238E27FC236}">
-                <a16:creationId xmlns:a16="http://schemas.microsoft.com/office/drawing/2014/main" id="{9535C69F-E6C7-47C2-915D-439CF2126E7D}"/>
-              </a:ext>
-            </a:extLst>
-          </p:cNvPr>
-          <p:cNvCxnSpPr>
-            <a:cxnSpLocks/>
-          </p:cNvCxnSpPr>
-          <p:nvPr/>
-        </p:nvCxnSpPr>
-        <p:spPr>
-          <a:xfrm>
-            <a:off x="4714046" y="4678409"/>
-            <a:ext cx="603678" cy="108000"/>
-          </a:xfrm>
-          <a:prstGeom prst="straightConnector1">
-            <a:avLst/>
-          </a:prstGeom>
-          <a:ln w="47625">
-            <a:solidFill>
-              <a:srgbClr val="0000FF"/>
-            </a:solidFill>
-            <a:tailEnd type="triangle"/>
-          </a:ln>
-          <a:effectLst/>
-        </p:spPr>
-        <p:style>
-          <a:lnRef idx="2">
-            <a:schemeClr val="accent1"/>
-          </a:lnRef>
-          <a:fillRef idx="0">
-            <a:schemeClr val="accent1"/>
-          </a:fillRef>
-          <a:effectRef idx="1">
-            <a:schemeClr val="accent1"/>
-          </a:effectRef>
-          <a:fontRef idx="minor">
-            <a:schemeClr val="tx1"/>
-          </a:fontRef>
-        </p:style>
-      </p:cxnSp>
-      <p:cxnSp>
-        <p:nvCxnSpPr>
-          <p:cNvPr id="12" name="Connecteur droit avec flèche 11">
-            <a:extLst>
-              <a:ext uri="{FF2B5EF4-FFF2-40B4-BE49-F238E27FC236}">
-                <a16:creationId xmlns:a16="http://schemas.microsoft.com/office/drawing/2014/main" id="{792BDF96-06BC-42AE-A7C7-B6437147BC40}"/>
-              </a:ext>
-            </a:extLst>
-          </p:cNvPr>
-          <p:cNvCxnSpPr>
-            <a:cxnSpLocks/>
-          </p:cNvCxnSpPr>
-          <p:nvPr/>
-        </p:nvCxnSpPr>
-        <p:spPr>
-          <a:xfrm flipV="1">
-            <a:off x="7901126" y="5300681"/>
-            <a:ext cx="266330" cy="364752"/>
-          </a:xfrm>
-          <a:prstGeom prst="straightConnector1">
-            <a:avLst/>
-          </a:prstGeom>
-          <a:ln w="47625">
-            <a:solidFill>
-              <a:srgbClr val="0000FF"/>
-            </a:solidFill>
-            <a:tailEnd type="triangle"/>
-          </a:ln>
-          <a:effectLst/>
-        </p:spPr>
-        <p:style>
-          <a:lnRef idx="2">
-            <a:schemeClr val="accent1"/>
-          </a:lnRef>
-          <a:fillRef idx="0">
-            <a:schemeClr val="accent1"/>
-          </a:fillRef>
-          <a:effectRef idx="1">
-            <a:schemeClr val="accent1"/>
-          </a:effectRef>
-          <a:fontRef idx="minor">
-            <a:schemeClr val="tx1"/>
-          </a:fontRef>
-        </p:style>
-      </p:cxnSp>
-      <p:cxnSp>
-        <p:nvCxnSpPr>
-          <p:cNvPr id="18" name="Connecteur droit avec flèche 17">
-            <a:extLst>
-              <a:ext uri="{FF2B5EF4-FFF2-40B4-BE49-F238E27FC236}">
-                <a16:creationId xmlns:a16="http://schemas.microsoft.com/office/drawing/2014/main" id="{EBC4D385-4805-4D31-94CA-B4D1C4A293F3}"/>
-              </a:ext>
-            </a:extLst>
-          </p:cNvPr>
-          <p:cNvCxnSpPr>
-            <a:cxnSpLocks/>
-          </p:cNvCxnSpPr>
-          <p:nvPr/>
-        </p:nvCxnSpPr>
-        <p:spPr>
-          <a:xfrm flipH="1">
-            <a:off x="5859262" y="3911362"/>
-            <a:ext cx="1101573" cy="443883"/>
-          </a:xfrm>
-          <a:prstGeom prst="straightConnector1">
-            <a:avLst/>
-          </a:prstGeom>
-          <a:ln w="47625">
-            <a:solidFill>
-              <a:srgbClr val="0000FF"/>
-            </a:solidFill>
-            <a:tailEnd type="triangle"/>
-          </a:ln>
-          <a:effectLst/>
-        </p:spPr>
-        <p:style>
-          <a:lnRef idx="2">
-            <a:schemeClr val="accent1"/>
-          </a:lnRef>
-          <a:fillRef idx="0">
-            <a:schemeClr val="accent1"/>
-          </a:fillRef>
-          <a:effectRef idx="1">
-            <a:schemeClr val="accent1"/>
-          </a:effectRef>
-          <a:fontRef idx="minor">
-            <a:schemeClr val="tx1"/>
-          </a:fontRef>
-        </p:style>
-      </p:cxnSp>
+        </p:grpSpPr>
+        <p:pic>
+          <p:nvPicPr>
+            <p:cNvPr id="5" name="Image 4">
+              <a:extLst>
+                <a:ext uri="{FF2B5EF4-FFF2-40B4-BE49-F238E27FC236}">
+                  <a16:creationId xmlns:a16="http://schemas.microsoft.com/office/drawing/2014/main" id="{7A8B4821-4F25-4ADF-985D-EF3184A381C5}"/>
+                </a:ext>
+              </a:extLst>
+            </p:cNvPr>
+            <p:cNvPicPr>
+              <a:picLocks noChangeAspect="1"/>
+            </p:cNvPicPr>
+            <p:nvPr/>
+          </p:nvPicPr>
+          <p:blipFill>
+            <a:blip r:embed="rId2"/>
+            <a:stretch>
+              <a:fillRect/>
+            </a:stretch>
+          </p:blipFill>
+          <p:spPr>
+            <a:xfrm>
+              <a:off x="3986074" y="3134680"/>
+              <a:ext cx="4989251" cy="3556326"/>
+            </a:xfrm>
+            <a:prstGeom prst="rect">
+              <a:avLst/>
+            </a:prstGeom>
+          </p:spPr>
+        </p:pic>
+        <p:sp>
+          <p:nvSpPr>
+            <p:cNvPr id="6" name="ZoneTexte 5">
+              <a:extLst>
+                <a:ext uri="{FF2B5EF4-FFF2-40B4-BE49-F238E27FC236}">
+                  <a16:creationId xmlns:a16="http://schemas.microsoft.com/office/drawing/2014/main" id="{85406A56-E139-45DB-B435-F6AC3029B41C}"/>
+                </a:ext>
+              </a:extLst>
+            </p:cNvPr>
+            <p:cNvSpPr txBox="1"/>
+            <p:nvPr/>
+          </p:nvSpPr>
+          <p:spPr>
+            <a:xfrm>
+              <a:off x="6915704" y="3710865"/>
+              <a:ext cx="2228296" cy="369332"/>
+            </a:xfrm>
+            <a:prstGeom prst="rect">
+              <a:avLst/>
+            </a:prstGeom>
+            <a:noFill/>
+          </p:spPr>
+          <p:txBody>
+            <a:bodyPr wrap="square" rtlCol="0">
+              <a:spAutoFit/>
+            </a:bodyPr>
+            <a:lstStyle/>
+            <a:p>
+              <a:r>
+                <a:rPr lang="fr-FR" dirty="0">
+                  <a:solidFill>
+                    <a:srgbClr val="0000FF"/>
+                  </a:solidFill>
+                  <a:highlight>
+                    <a:srgbClr val="FFFF00"/>
+                  </a:highlight>
+                </a:rPr>
+                <a:t>L’adresse SSH ici</a:t>
+              </a:r>
+            </a:p>
+          </p:txBody>
+        </p:sp>
+        <p:sp>
+          <p:nvSpPr>
+            <p:cNvPr id="7" name="ZoneTexte 6">
+              <a:extLst>
+                <a:ext uri="{FF2B5EF4-FFF2-40B4-BE49-F238E27FC236}">
+                  <a16:creationId xmlns:a16="http://schemas.microsoft.com/office/drawing/2014/main" id="{42753A0D-5AAC-4722-B449-84D940F497A0}"/>
+                </a:ext>
+              </a:extLst>
+            </p:cNvPr>
+            <p:cNvSpPr txBox="1"/>
+            <p:nvPr/>
+          </p:nvSpPr>
+          <p:spPr>
+            <a:xfrm>
+              <a:off x="2627791" y="4355245"/>
+              <a:ext cx="2228296" cy="646331"/>
+            </a:xfrm>
+            <a:prstGeom prst="rect">
+              <a:avLst/>
+            </a:prstGeom>
+            <a:noFill/>
+          </p:spPr>
+          <p:txBody>
+            <a:bodyPr wrap="square" rtlCol="0">
+              <a:spAutoFit/>
+            </a:bodyPr>
+            <a:lstStyle/>
+            <a:p>
+              <a:r>
+                <a:rPr lang="fr-FR" dirty="0">
+                  <a:solidFill>
+                    <a:srgbClr val="0000FF"/>
+                  </a:solidFill>
+                  <a:highlight>
+                    <a:srgbClr val="FFFF00"/>
+                  </a:highlight>
+                </a:rPr>
+                <a:t>Le nom que tu veux donner au dossier</a:t>
+              </a:r>
+            </a:p>
+          </p:txBody>
+        </p:sp>
+        <p:sp>
+          <p:nvSpPr>
+            <p:cNvPr id="8" name="ZoneTexte 7">
+              <a:extLst>
+                <a:ext uri="{FF2B5EF4-FFF2-40B4-BE49-F238E27FC236}">
+                  <a16:creationId xmlns:a16="http://schemas.microsoft.com/office/drawing/2014/main" id="{808B2BEE-6A47-4E4B-953A-C41CB1AE17D8}"/>
+                </a:ext>
+              </a:extLst>
+            </p:cNvPr>
+            <p:cNvSpPr txBox="1"/>
+            <p:nvPr/>
+          </p:nvSpPr>
+          <p:spPr>
+            <a:xfrm>
+              <a:off x="4856087" y="5665433"/>
+              <a:ext cx="4119238" cy="646331"/>
+            </a:xfrm>
+            <a:prstGeom prst="rect">
+              <a:avLst/>
+            </a:prstGeom>
+            <a:noFill/>
+          </p:spPr>
+          <p:txBody>
+            <a:bodyPr wrap="square" rtlCol="0">
+              <a:spAutoFit/>
+            </a:bodyPr>
+            <a:lstStyle/>
+            <a:p>
+              <a:r>
+                <a:rPr lang="fr-FR" dirty="0">
+                  <a:solidFill>
+                    <a:srgbClr val="0000FF"/>
+                  </a:solidFill>
+                  <a:highlight>
+                    <a:srgbClr val="FFFF00"/>
+                  </a:highlight>
+                </a:rPr>
+                <a:t>Pour sélectionner le chemin où tu veux l’enregistrer</a:t>
+              </a:r>
+            </a:p>
+          </p:txBody>
+        </p:sp>
+        <p:cxnSp>
+          <p:nvCxnSpPr>
+            <p:cNvPr id="10" name="Connecteur droit avec flèche 9">
+              <a:extLst>
+                <a:ext uri="{FF2B5EF4-FFF2-40B4-BE49-F238E27FC236}">
+                  <a16:creationId xmlns:a16="http://schemas.microsoft.com/office/drawing/2014/main" id="{9535C69F-E6C7-47C2-915D-439CF2126E7D}"/>
+                </a:ext>
+              </a:extLst>
+            </p:cNvPr>
+            <p:cNvCxnSpPr>
+              <a:cxnSpLocks/>
+            </p:cNvCxnSpPr>
+            <p:nvPr/>
+          </p:nvCxnSpPr>
+          <p:spPr>
+            <a:xfrm>
+              <a:off x="4714046" y="4678409"/>
+              <a:ext cx="603678" cy="108000"/>
+            </a:xfrm>
+            <a:prstGeom prst="straightConnector1">
+              <a:avLst/>
+            </a:prstGeom>
+            <a:ln w="47625">
+              <a:solidFill>
+                <a:srgbClr val="0000FF"/>
+              </a:solidFill>
+              <a:tailEnd type="triangle"/>
+            </a:ln>
+            <a:effectLst/>
+          </p:spPr>
+          <p:style>
+            <a:lnRef idx="2">
+              <a:schemeClr val="accent1"/>
+            </a:lnRef>
+            <a:fillRef idx="0">
+              <a:schemeClr val="accent1"/>
+            </a:fillRef>
+            <a:effectRef idx="1">
+              <a:schemeClr val="accent1"/>
+            </a:effectRef>
+            <a:fontRef idx="minor">
+              <a:schemeClr val="tx1"/>
+            </a:fontRef>
+          </p:style>
+        </p:cxnSp>
+        <p:cxnSp>
+          <p:nvCxnSpPr>
+            <p:cNvPr id="12" name="Connecteur droit avec flèche 11">
+              <a:extLst>
+                <a:ext uri="{FF2B5EF4-FFF2-40B4-BE49-F238E27FC236}">
+                  <a16:creationId xmlns:a16="http://schemas.microsoft.com/office/drawing/2014/main" id="{792BDF96-06BC-42AE-A7C7-B6437147BC40}"/>
+                </a:ext>
+              </a:extLst>
+            </p:cNvPr>
+            <p:cNvCxnSpPr>
+              <a:cxnSpLocks/>
+            </p:cNvCxnSpPr>
+            <p:nvPr/>
+          </p:nvCxnSpPr>
+          <p:spPr>
+            <a:xfrm flipV="1">
+              <a:off x="7901126" y="5300681"/>
+              <a:ext cx="266330" cy="364752"/>
+            </a:xfrm>
+            <a:prstGeom prst="straightConnector1">
+              <a:avLst/>
+            </a:prstGeom>
+            <a:ln w="47625">
+              <a:solidFill>
+                <a:srgbClr val="0000FF"/>
+              </a:solidFill>
+              <a:tailEnd type="triangle"/>
+            </a:ln>
+            <a:effectLst/>
+          </p:spPr>
+          <p:style>
+            <a:lnRef idx="2">
+              <a:schemeClr val="accent1"/>
+            </a:lnRef>
+            <a:fillRef idx="0">
+              <a:schemeClr val="accent1"/>
+            </a:fillRef>
+            <a:effectRef idx="1">
+              <a:schemeClr val="accent1"/>
+            </a:effectRef>
+            <a:fontRef idx="minor">
+              <a:schemeClr val="tx1"/>
+            </a:fontRef>
+          </p:style>
+        </p:cxnSp>
+        <p:cxnSp>
+          <p:nvCxnSpPr>
+            <p:cNvPr id="18" name="Connecteur droit avec flèche 17">
+              <a:extLst>
+                <a:ext uri="{FF2B5EF4-FFF2-40B4-BE49-F238E27FC236}">
+                  <a16:creationId xmlns:a16="http://schemas.microsoft.com/office/drawing/2014/main" id="{EBC4D385-4805-4D31-94CA-B4D1C4A293F3}"/>
+                </a:ext>
+              </a:extLst>
+            </p:cNvPr>
+            <p:cNvCxnSpPr>
+              <a:cxnSpLocks/>
+            </p:cNvCxnSpPr>
+            <p:nvPr/>
+          </p:nvCxnSpPr>
+          <p:spPr>
+            <a:xfrm flipH="1">
+              <a:off x="5859262" y="3911362"/>
+              <a:ext cx="1101573" cy="443883"/>
+            </a:xfrm>
+            <a:prstGeom prst="straightConnector1">
+              <a:avLst/>
+            </a:prstGeom>
+            <a:ln w="47625">
+              <a:solidFill>
+                <a:srgbClr val="0000FF"/>
+              </a:solidFill>
+              <a:tailEnd type="triangle"/>
+            </a:ln>
+            <a:effectLst/>
+          </p:spPr>
+          <p:style>
+            <a:lnRef idx="2">
+              <a:schemeClr val="accent1"/>
+            </a:lnRef>
+            <a:fillRef idx="0">
+              <a:schemeClr val="accent1"/>
+            </a:fillRef>
+            <a:effectRef idx="1">
+              <a:schemeClr val="accent1"/>
+            </a:effectRef>
+            <a:fontRef idx="minor">
+              <a:schemeClr val="tx1"/>
+            </a:fontRef>
+          </p:style>
+        </p:cxnSp>
+      </p:grpSp>
     </p:spTree>
     <p:extLst>
       <p:ext uri="{BB962C8B-B14F-4D97-AF65-F5344CB8AC3E}">
@@ -3992,13 +4014,13 @@
         </p:spPr>
         <p:txBody>
           <a:bodyPr>
-            <a:normAutofit/>
+            <a:normAutofit fontScale="90000"/>
           </a:bodyPr>
           <a:lstStyle/>
           <a:p>
             <a:r>
               <a:rPr lang="fr-FR" sz="4000" dirty="0"/>
-              <a:t>Nouveau projet connecté à GitLab</a:t>
+              <a:t>2. Nouveau projet connecté à GitLab</a:t>
             </a:r>
             <a:endParaRPr lang="fr-FR" dirty="0"/>
           </a:p>
@@ -4144,7 +4166,7 @@
           <a:p>
             <a:r>
               <a:rPr lang="fr-FR" sz="3600" dirty="0"/>
-              <a:t>Envoyer sur GitLab un projet que tu as déjà sur ton PC</a:t>
+              <a:t>3. Envoyer sur GitLab un projet que tu as déjà sur ton PC</a:t>
             </a:r>
           </a:p>
         </p:txBody>
@@ -4165,8 +4187,8 @@
         </p:nvSpPr>
         <p:spPr bwMode="auto">
           <a:xfrm>
-            <a:off x="1038687" y="4663470"/>
-            <a:ext cx="6460423" cy="1077218"/>
+            <a:off x="647257" y="4669032"/>
+            <a:ext cx="8154954" cy="1323439"/>
           </a:xfrm>
           <a:prstGeom prst="rect">
             <a:avLst/>
@@ -4216,37 +4238,13 @@
           </a:fontRef>
         </p:style>
         <p:txBody>
-          <a:bodyPr vert="horz" wrap="none" lIns="91440" tIns="45720" rIns="91440" bIns="45720" numCol="1" anchor="ctr" anchorCtr="0" compatLnSpc="1">
+          <a:bodyPr vert="horz" wrap="square" lIns="91440" tIns="45720" rIns="91440" bIns="45720" numCol="1" anchor="ctr" anchorCtr="0" compatLnSpc="1">
             <a:prstTxWarp prst="textNoShape">
               <a:avLst/>
             </a:prstTxWarp>
             <a:spAutoFit/>
           </a:bodyPr>
           <a:lstStyle/>
-          <a:p>
-            <a:pPr defTabSz="914400" eaLnBrk="0" fontAlgn="base" hangingPunct="0">
-              <a:spcBef>
-                <a:spcPct val="0"/>
-              </a:spcBef>
-              <a:spcAft>
-                <a:spcPct val="0"/>
-              </a:spcAft>
-            </a:pPr>
-            <a:r>
-              <a:rPr lang="fr-FR" sz="1600" dirty="0"/>
-              <a:t>git init</a:t>
-            </a:r>
-            <a:endParaRPr kumimoji="0" lang="fr-FR" altLang="fr-FR" sz="1600" b="0" i="0" u="none" strike="noStrike" cap="none" normalizeH="0" baseline="0" dirty="0">
-              <a:ln>
-                <a:noFill/>
-              </a:ln>
-              <a:solidFill>
-                <a:schemeClr val="tx1"/>
-              </a:solidFill>
-              <a:effectLst/>
-              <a:latin typeface="Arial Unicode MS" panose="020B0604020202020204" pitchFamily="34" charset="-128"/>
-            </a:endParaRPr>
-          </a:p>
           <a:p>
             <a:pPr lvl="0" defTabSz="914400" eaLnBrk="0" fontAlgn="base" hangingPunct="0">
               <a:spcBef>
@@ -4257,285 +4255,210 @@
               </a:spcAft>
             </a:pPr>
             <a:r>
-              <a:rPr kumimoji="0" lang="fr-FR" altLang="fr-FR" sz="1600" b="0" i="0" u="none" strike="noStrike" cap="none" normalizeH="0" baseline="0" dirty="0">
-                <a:ln>
-                  <a:noFill/>
-                </a:ln>
+              <a:rPr lang="fr-FR" altLang="fr-FR" sz="1600" dirty="0">
                 <a:solidFill>
                   <a:schemeClr val="tx1"/>
                 </a:solidFill>
-                <a:effectLst/>
                 <a:latin typeface="Arial Unicode MS" panose="020B0604020202020204" pitchFamily="34" charset="-128"/>
               </a:rPr>
-              <a:t>git </a:t>
-            </a:r>
-            <a:r>
-              <a:rPr kumimoji="0" lang="fr-FR" altLang="fr-FR" sz="1600" b="0" i="0" u="none" strike="noStrike" cap="none" normalizeH="0" baseline="0" dirty="0" err="1">
-                <a:ln>
-                  <a:noFill/>
-                </a:ln>
+              <a:t>git init --initial-</a:t>
+            </a:r>
+            <a:r>
+              <a:rPr lang="fr-FR" altLang="fr-FR" sz="1600" dirty="0" err="1">
                 <a:solidFill>
                   <a:schemeClr val="tx1"/>
                 </a:solidFill>
-                <a:effectLst/>
                 <a:latin typeface="Arial Unicode MS" panose="020B0604020202020204" pitchFamily="34" charset="-128"/>
               </a:rPr>
-              <a:t>remote</a:t>
-            </a:r>
-            <a:r>
-              <a:rPr kumimoji="0" lang="fr-FR" altLang="fr-FR" sz="1600" b="0" i="0" u="none" strike="noStrike" cap="none" normalizeH="0" baseline="0" dirty="0">
-                <a:ln>
-                  <a:noFill/>
-                </a:ln>
+              <a:t>branch</a:t>
+            </a:r>
+            <a:r>
+              <a:rPr lang="fr-FR" altLang="fr-FR" sz="1600" dirty="0">
                 <a:solidFill>
                   <a:schemeClr val="tx1"/>
                 </a:solidFill>
-                <a:effectLst/>
                 <a:latin typeface="Arial Unicode MS" panose="020B0604020202020204" pitchFamily="34" charset="-128"/>
               </a:rPr>
-              <a:t> </a:t>
-            </a:r>
-            <a:r>
-              <a:rPr kumimoji="0" lang="fr-FR" altLang="fr-FR" sz="1600" b="0" i="0" u="none" strike="noStrike" cap="none" normalizeH="0" baseline="0" dirty="0" err="1">
-                <a:ln>
-                  <a:noFill/>
-                </a:ln>
-                <a:solidFill>
-                  <a:schemeClr val="tx1"/>
-                </a:solidFill>
-                <a:effectLst/>
-                <a:latin typeface="Arial Unicode MS" panose="020B0604020202020204" pitchFamily="34" charset="-128"/>
-              </a:rPr>
-              <a:t>add</a:t>
-            </a:r>
-            <a:r>
-              <a:rPr kumimoji="0" lang="fr-FR" altLang="fr-FR" sz="1600" b="0" i="0" u="none" strike="noStrike" cap="none" normalizeH="0" baseline="0" dirty="0">
-                <a:ln>
-                  <a:noFill/>
-                </a:ln>
-                <a:solidFill>
-                  <a:schemeClr val="tx1"/>
-                </a:solidFill>
-                <a:effectLst/>
-                <a:latin typeface="Arial Unicode MS" panose="020B0604020202020204" pitchFamily="34" charset="-128"/>
-              </a:rPr>
-              <a:t> </a:t>
-            </a:r>
-            <a:r>
-              <a:rPr kumimoji="0" lang="fr-FR" altLang="fr-FR" sz="1600" b="0" i="0" u="none" strike="noStrike" cap="none" normalizeH="0" baseline="0" dirty="0" err="1">
-                <a:ln>
-                  <a:noFill/>
-                </a:ln>
-                <a:solidFill>
-                  <a:schemeClr val="tx1"/>
-                </a:solidFill>
-                <a:effectLst/>
-                <a:latin typeface="Arial Unicode MS" panose="020B0604020202020204" pitchFamily="34" charset="-128"/>
-              </a:rPr>
-              <a:t>origin</a:t>
-            </a:r>
-            <a:r>
-              <a:rPr kumimoji="0" lang="fr-FR" altLang="fr-FR" sz="1600" b="0" i="0" u="none" strike="noStrike" cap="none" normalizeH="0" dirty="0">
-                <a:ln>
-                  <a:noFill/>
-                </a:ln>
-                <a:solidFill>
-                  <a:schemeClr val="tx1"/>
-                </a:solidFill>
-                <a:effectLst/>
-                <a:latin typeface="Arial Unicode MS" panose="020B0604020202020204" pitchFamily="34" charset="-128"/>
-              </a:rPr>
-              <a:t> </a:t>
-            </a:r>
-            <a:r>
-              <a:rPr lang="fr-FR" altLang="fr-FR" sz="1600" dirty="0">
-                <a:solidFill>
-                  <a:srgbClr val="0000FF"/>
-                </a:solidFill>
-                <a:latin typeface="Arial Unicode MS" panose="020B0604020202020204" pitchFamily="34" charset="-128"/>
-              </a:rPr>
-              <a:t>ssh://git@gitlab.cirad.fr:</a:t>
-            </a:r>
-            <a:r>
-              <a:rPr kumimoji="0" lang="fr-FR" altLang="fr-FR" sz="1600" b="0" u="none" strike="noStrike" cap="none" normalizeH="0" dirty="0">
-                <a:ln>
-                  <a:noFill/>
-                </a:ln>
-                <a:solidFill>
-                  <a:srgbClr val="0000FF"/>
-                </a:solidFill>
-                <a:effectLst/>
-                <a:latin typeface="Arial Unicode MS" panose="020B0604020202020204" pitchFamily="34" charset="-128"/>
-              </a:rPr>
-              <a:t>adresse_SSH_du</a:t>
-            </a:r>
-            <a:r>
-              <a:rPr lang="fr-FR" altLang="fr-FR" sz="1600" dirty="0">
-                <a:solidFill>
-                  <a:srgbClr val="0000FF"/>
-                </a:solidFill>
-                <a:latin typeface="Arial Unicode MS" panose="020B0604020202020204" pitchFamily="34" charset="-128"/>
-              </a:rPr>
-              <a:t>_projet</a:t>
-            </a:r>
-            <a:endParaRPr kumimoji="0" lang="fr-FR" altLang="fr-FR" sz="1600" b="0" u="none" strike="noStrike" cap="none" normalizeH="0" baseline="0" dirty="0">
-              <a:ln>
-                <a:noFill/>
-              </a:ln>
-              <a:solidFill>
-                <a:srgbClr val="0000FF"/>
-              </a:solidFill>
-              <a:effectLst/>
-              <a:latin typeface="Arial Unicode MS" panose="020B0604020202020204" pitchFamily="34" charset="-128"/>
-            </a:endParaRPr>
-          </a:p>
-          <a:p>
-            <a:pPr marL="0" marR="0" lvl="0" indent="0" algn="l" defTabSz="914400" rtl="0" eaLnBrk="0" fontAlgn="base" latinLnBrk="0" hangingPunct="0">
-              <a:lnSpc>
-                <a:spcPct val="100000"/>
-              </a:lnSpc>
+              <a:t>=master </a:t>
+            </a:r>
+          </a:p>
+          <a:p>
+            <a:pPr lvl="0" defTabSz="914400" eaLnBrk="0" fontAlgn="base" hangingPunct="0">
               <a:spcBef>
                 <a:spcPct val="0"/>
               </a:spcBef>
               <a:spcAft>
                 <a:spcPct val="0"/>
               </a:spcAft>
-              <a:buClrTx/>
-              <a:buSzTx/>
-              <a:buFontTx/>
-              <a:buNone/>
-              <a:tabLst/>
             </a:pPr>
             <a:r>
-              <a:rPr kumimoji="0" lang="fr-FR" altLang="fr-FR" sz="1600" b="0" i="0" u="none" strike="noStrike" cap="none" normalizeH="0" baseline="0" dirty="0">
-                <a:ln>
-                  <a:noFill/>
-                </a:ln>
+              <a:rPr lang="fr-FR" altLang="fr-FR" sz="1600" dirty="0">
                 <a:solidFill>
                   <a:schemeClr val="tx1"/>
                 </a:solidFill>
-                <a:effectLst/>
                 <a:latin typeface="Arial Unicode MS" panose="020B0604020202020204" pitchFamily="34" charset="-128"/>
               </a:rPr>
               <a:t>git </a:t>
             </a:r>
             <a:r>
-              <a:rPr kumimoji="0" lang="fr-FR" altLang="fr-FR" sz="1600" b="0" i="0" u="none" strike="noStrike" cap="none" normalizeH="0" baseline="0" dirty="0" err="1">
-                <a:ln>
-                  <a:noFill/>
-                </a:ln>
+              <a:rPr lang="fr-FR" altLang="fr-FR" sz="1600" dirty="0" err="1">
                 <a:solidFill>
                   <a:schemeClr val="tx1"/>
                 </a:solidFill>
-                <a:effectLst/>
                 <a:latin typeface="Arial Unicode MS" panose="020B0604020202020204" pitchFamily="34" charset="-128"/>
               </a:rPr>
-              <a:t>branch</a:t>
-            </a:r>
-            <a:r>
-              <a:rPr kumimoji="0" lang="fr-FR" altLang="fr-FR" sz="1600" b="0" i="0" u="none" strike="noStrike" cap="none" normalizeH="0" baseline="0" dirty="0">
-                <a:ln>
-                  <a:noFill/>
-                </a:ln>
+              <a:t>remote</a:t>
+            </a:r>
+            <a:r>
+              <a:rPr lang="fr-FR" altLang="fr-FR" sz="1600" dirty="0">
                 <a:solidFill>
                   <a:schemeClr val="tx1"/>
                 </a:solidFill>
-                <a:effectLst/>
                 <a:latin typeface="Arial Unicode MS" panose="020B0604020202020204" pitchFamily="34" charset="-128"/>
               </a:rPr>
-              <a:t> -M master </a:t>
-            </a:r>
-          </a:p>
-          <a:p>
-            <a:pPr marL="0" marR="0" lvl="0" indent="0" algn="l" defTabSz="914400" rtl="0" eaLnBrk="0" fontAlgn="base" latinLnBrk="0" hangingPunct="0">
-              <a:lnSpc>
-                <a:spcPct val="100000"/>
-              </a:lnSpc>
+              <a:t> </a:t>
+            </a:r>
+            <a:r>
+              <a:rPr lang="fr-FR" altLang="fr-FR" sz="1600" dirty="0" err="1">
+                <a:solidFill>
+                  <a:schemeClr val="tx1"/>
+                </a:solidFill>
+                <a:latin typeface="Arial Unicode MS" panose="020B0604020202020204" pitchFamily="34" charset="-128"/>
+              </a:rPr>
+              <a:t>add</a:t>
+            </a:r>
+            <a:r>
+              <a:rPr lang="fr-FR" altLang="fr-FR" sz="1600" dirty="0">
+                <a:solidFill>
+                  <a:schemeClr val="tx1"/>
+                </a:solidFill>
+                <a:latin typeface="Arial Unicode MS" panose="020B0604020202020204" pitchFamily="34" charset="-128"/>
+              </a:rPr>
+              <a:t> </a:t>
+            </a:r>
+            <a:r>
+              <a:rPr lang="fr-FR" altLang="fr-FR" sz="1600" dirty="0" err="1">
+                <a:solidFill>
+                  <a:schemeClr val="tx1"/>
+                </a:solidFill>
+                <a:latin typeface="Arial Unicode MS" panose="020B0604020202020204" pitchFamily="34" charset="-128"/>
+              </a:rPr>
+              <a:t>origin</a:t>
+            </a:r>
+            <a:r>
+              <a:rPr lang="fr-FR" altLang="fr-FR" sz="1600" dirty="0">
+                <a:solidFill>
+                  <a:schemeClr val="tx1"/>
+                </a:solidFill>
+                <a:latin typeface="Arial Unicode MS" panose="020B0604020202020204" pitchFamily="34" charset="-128"/>
+              </a:rPr>
+              <a:t> ssh://git@gitlab.cirad.fr:2022/benjamin.heuclin/mon_projet.git </a:t>
+            </a:r>
+          </a:p>
+          <a:p>
+            <a:pPr lvl="0" defTabSz="914400" eaLnBrk="0" fontAlgn="base" hangingPunct="0">
               <a:spcBef>
                 <a:spcPct val="0"/>
               </a:spcBef>
               <a:spcAft>
                 <a:spcPct val="0"/>
               </a:spcAft>
-              <a:buClrTx/>
-              <a:buSzTx/>
-              <a:buFontTx/>
-              <a:buNone/>
-              <a:tabLst/>
             </a:pPr>
             <a:r>
-              <a:rPr kumimoji="0" lang="fr-FR" altLang="fr-FR" sz="1600" b="0" i="0" u="none" strike="noStrike" cap="none" normalizeH="0" baseline="0" dirty="0">
-                <a:ln>
-                  <a:noFill/>
-                </a:ln>
+              <a:rPr lang="fr-FR" altLang="fr-FR" sz="1600" dirty="0">
                 <a:solidFill>
                   <a:schemeClr val="tx1"/>
                 </a:solidFill>
-                <a:effectLst/>
                 <a:latin typeface="Arial Unicode MS" panose="020B0604020202020204" pitchFamily="34" charset="-128"/>
               </a:rPr>
-              <a:t>git push -</a:t>
-            </a:r>
-            <a:r>
-              <a:rPr kumimoji="0" lang="fr-FR" altLang="fr-FR" sz="1600" b="0" i="0" u="none" strike="noStrike" cap="none" normalizeH="0" baseline="0" dirty="0" err="1">
-                <a:ln>
-                  <a:noFill/>
-                </a:ln>
+              <a:t>git </a:t>
+            </a:r>
+            <a:r>
+              <a:rPr lang="fr-FR" altLang="fr-FR" sz="1600" dirty="0" err="1">
                 <a:solidFill>
                   <a:schemeClr val="tx1"/>
                 </a:solidFill>
-                <a:effectLst/>
                 <a:latin typeface="Arial Unicode MS" panose="020B0604020202020204" pitchFamily="34" charset="-128"/>
               </a:rPr>
-              <a:t>uf</a:t>
-            </a:r>
-            <a:r>
-              <a:rPr kumimoji="0" lang="fr-FR" altLang="fr-FR" sz="1600" b="0" i="0" u="none" strike="noStrike" cap="none" normalizeH="0" baseline="0" dirty="0">
-                <a:ln>
-                  <a:noFill/>
-                </a:ln>
+              <a:t>add</a:t>
+            </a:r>
+            <a:r>
+              <a:rPr lang="fr-FR" altLang="fr-FR" sz="1600" dirty="0">
                 <a:solidFill>
                   <a:schemeClr val="tx1"/>
                 </a:solidFill>
-                <a:effectLst/>
                 <a:latin typeface="Arial Unicode MS" panose="020B0604020202020204" pitchFamily="34" charset="-128"/>
               </a:rPr>
-              <a:t> </a:t>
-            </a:r>
-            <a:r>
-              <a:rPr kumimoji="0" lang="fr-FR" altLang="fr-FR" sz="1600" b="0" i="0" u="none" strike="noStrike" cap="none" normalizeH="0" baseline="0" dirty="0" err="1">
-                <a:ln>
-                  <a:noFill/>
-                </a:ln>
+              <a:t> . </a:t>
+            </a:r>
+          </a:p>
+          <a:p>
+            <a:pPr lvl="0" defTabSz="914400" eaLnBrk="0" fontAlgn="base" hangingPunct="0">
+              <a:spcBef>
+                <a:spcPct val="0"/>
+              </a:spcBef>
+              <a:spcAft>
+                <a:spcPct val="0"/>
+              </a:spcAft>
+            </a:pPr>
+            <a:r>
+              <a:rPr lang="fr-FR" altLang="fr-FR" sz="1600" dirty="0">
                 <a:solidFill>
                   <a:schemeClr val="tx1"/>
                 </a:solidFill>
-                <a:effectLst/>
+                <a:latin typeface="Arial Unicode MS" panose="020B0604020202020204" pitchFamily="34" charset="-128"/>
+              </a:rPr>
+              <a:t>git commit -m "Initial commit" </a:t>
+            </a:r>
+          </a:p>
+          <a:p>
+            <a:pPr lvl="0" defTabSz="914400" eaLnBrk="0" fontAlgn="base" hangingPunct="0">
+              <a:spcBef>
+                <a:spcPct val="0"/>
+              </a:spcBef>
+              <a:spcAft>
+                <a:spcPct val="0"/>
+              </a:spcAft>
+            </a:pPr>
+            <a:r>
+              <a:rPr lang="fr-FR" altLang="fr-FR" sz="1600" dirty="0">
+                <a:solidFill>
+                  <a:schemeClr val="tx1"/>
+                </a:solidFill>
+                <a:latin typeface="Arial Unicode MS" panose="020B0604020202020204" pitchFamily="34" charset="-128"/>
+              </a:rPr>
+              <a:t>git push -u </a:t>
+            </a:r>
+            <a:r>
+              <a:rPr lang="fr-FR" altLang="fr-FR" sz="1600" dirty="0" err="1">
+                <a:solidFill>
+                  <a:schemeClr val="tx1"/>
+                </a:solidFill>
                 <a:latin typeface="Arial Unicode MS" panose="020B0604020202020204" pitchFamily="34" charset="-128"/>
               </a:rPr>
               <a:t>origin</a:t>
             </a:r>
             <a:r>
-              <a:rPr kumimoji="0" lang="fr-FR" altLang="fr-FR" sz="1600" b="0" i="0" u="none" strike="noStrike" cap="none" normalizeH="0" baseline="0" dirty="0">
-                <a:ln>
-                  <a:noFill/>
-                </a:ln>
+              <a:rPr lang="fr-FR" altLang="fr-FR" sz="1600" dirty="0">
                 <a:solidFill>
                   <a:schemeClr val="tx1"/>
                 </a:solidFill>
-                <a:effectLst/>
                 <a:latin typeface="Arial Unicode MS" panose="020B0604020202020204" pitchFamily="34" charset="-128"/>
               </a:rPr>
-              <a:t> master </a:t>
-            </a:r>
-            <a:endParaRPr kumimoji="0" lang="fr-FR" altLang="fr-FR" sz="3600" b="0" i="0" u="none" strike="noStrike" cap="none" normalizeH="0" baseline="0" dirty="0">
-              <a:ln>
-                <a:noFill/>
-              </a:ln>
+              <a:t> master</a:t>
+            </a:r>
+            <a:r>
+              <a:rPr lang="fr-FR" altLang="fr-FR" sz="200" dirty="0">
+                <a:solidFill>
+                  <a:schemeClr val="tx1"/>
+                </a:solidFill>
+              </a:rPr>
+              <a:t> </a:t>
+            </a:r>
+            <a:endParaRPr lang="fr-FR" altLang="fr-FR" sz="3600" dirty="0">
               <a:solidFill>
                 <a:schemeClr val="tx1"/>
               </a:solidFill>
-              <a:effectLst/>
               <a:latin typeface="Arial" panose="020B0604020202020204" pitchFamily="34" charset="0"/>
             </a:endParaRPr>
           </a:p>
@@ -4606,8 +4529,17 @@
           <a:p>
             <a:r>
               <a:rPr lang="fr-FR" dirty="0"/>
-              <a:t>Il faut créer un nouveau projet dans GitLab</a:t>
-            </a:r>
+              <a:t>Il faut créer un nouveau projet dans GitLab </a:t>
+            </a:r>
+            <a:r>
+              <a:rPr lang="fr-FR" sz="1200" dirty="0">
+                <a:solidFill>
+                  <a:srgbClr val="E84B3C"/>
+                </a:solidFill>
+              </a:rPr>
+              <a:t>(Attention ! Il faut décocher la case initialisation du README)</a:t>
+            </a:r>
+            <a:endParaRPr lang="fr-FR" dirty="0"/>
           </a:p>
           <a:p>
             <a:pPr marL="285750" indent="-285750">
@@ -4697,7 +4629,7 @@
         </p:nvSpPr>
         <p:spPr>
           <a:xfrm>
-            <a:off x="754601" y="5877018"/>
+            <a:off x="1389082" y="6149036"/>
             <a:ext cx="8158579" cy="369332"/>
           </a:xfrm>
           <a:prstGeom prst="rect">
@@ -4837,6 +4769,56 @@
           </a:p>
         </p:txBody>
       </p:sp>
+      <p:sp>
+        <p:nvSpPr>
+          <p:cNvPr id="12" name="Ellipse 11">
+            <a:extLst>
+              <a:ext uri="{FF2B5EF4-FFF2-40B4-BE49-F238E27FC236}">
+                <a16:creationId xmlns:a16="http://schemas.microsoft.com/office/drawing/2014/main" id="{FFB30023-7E0D-4FC2-909C-EB4A6E8CDB58}"/>
+              </a:ext>
+            </a:extLst>
+          </p:cNvPr>
+          <p:cNvSpPr/>
+          <p:nvPr/>
+        </p:nvSpPr>
+        <p:spPr>
+          <a:xfrm>
+            <a:off x="3384331" y="1860331"/>
+            <a:ext cx="641131" cy="451945"/>
+          </a:xfrm>
+          <a:prstGeom prst="ellipse">
+            <a:avLst/>
+          </a:prstGeom>
+          <a:noFill/>
+          <a:ln w="38100">
+            <a:solidFill>
+              <a:srgbClr val="FF0000"/>
+            </a:solidFill>
+          </a:ln>
+        </p:spPr>
+        <p:style>
+          <a:lnRef idx="1">
+            <a:schemeClr val="accent1"/>
+          </a:lnRef>
+          <a:fillRef idx="3">
+            <a:schemeClr val="accent1"/>
+          </a:fillRef>
+          <a:effectRef idx="2">
+            <a:schemeClr val="accent1"/>
+          </a:effectRef>
+          <a:fontRef idx="minor">
+            <a:schemeClr val="lt1"/>
+          </a:fontRef>
+        </p:style>
+        <p:txBody>
+          <a:bodyPr rtlCol="0" anchor="ctr"/>
+          <a:lstStyle/>
+          <a:p>
+            <a:pPr algn="ctr"/>
+            <a:endParaRPr lang="fr-FR"/>
+          </a:p>
+        </p:txBody>
+      </p:sp>
     </p:spTree>
     <p:extLst>
       <p:ext uri="{BB962C8B-B14F-4D97-AF65-F5344CB8AC3E}">
@@ -4897,7 +4879,7 @@
           <a:p>
             <a:r>
               <a:rPr lang="fr-FR" dirty="0"/>
-              <a:t>Avant de commencer</a:t>
+              <a:t>Avant de commencer,</a:t>
             </a:r>
             <a:br>
               <a:rPr lang="fr-FR" dirty="0"/>
@@ -4923,8 +4905,8 @@
         </p:nvSpPr>
         <p:spPr>
           <a:xfrm>
-            <a:off x="834501" y="1529065"/>
-            <a:ext cx="7625918" cy="5216813"/>
+            <a:off x="834501" y="1678355"/>
+            <a:ext cx="7625918" cy="2862322"/>
           </a:xfrm>
           <a:prstGeom prst="rect">
             <a:avLst/>
@@ -5000,117 +4982,6 @@
           </a:p>
           <a:p>
             <a:endParaRPr lang="fr-FR" b="1" u="sng" dirty="0"/>
-          </a:p>
-          <a:p>
-            <a:r>
-              <a:rPr lang="fr-FR" b="1" u="sng" dirty="0"/>
-              <a:t>Le « README.md »</a:t>
-            </a:r>
-            <a:r>
-              <a:rPr lang="fr-FR" b="1" dirty="0"/>
-              <a:t> </a:t>
-            </a:r>
-            <a:r>
-              <a:rPr lang="fr-FR" dirty="0"/>
-              <a:t>(obligatoire)</a:t>
-            </a:r>
-          </a:p>
-          <a:p>
-            <a:pPr marL="285750" indent="-285750">
-              <a:lnSpc>
-                <a:spcPct val="150000"/>
-              </a:lnSpc>
-              <a:buFont typeface="Courier New" panose="02070309020205020404" pitchFamily="49" charset="0"/>
-              <a:buChar char="o"/>
-            </a:pPr>
-            <a:r>
-              <a:rPr lang="fr-FR" dirty="0"/>
-              <a:t>Ce fichier permet de décrire / présenter le projet</a:t>
-            </a:r>
-          </a:p>
-          <a:p>
-            <a:pPr marL="285750" indent="-285750">
-              <a:lnSpc>
-                <a:spcPct val="150000"/>
-              </a:lnSpc>
-              <a:buFont typeface="Courier New" panose="02070309020205020404" pitchFamily="49" charset="0"/>
-              <a:buChar char="o"/>
-            </a:pPr>
-            <a:r>
-              <a:rPr lang="fr-FR" dirty="0"/>
-              <a:t>Il est afficher sur la page d’</a:t>
-            </a:r>
-            <a:r>
-              <a:rPr lang="fr-FR" dirty="0" err="1"/>
-              <a:t>acceuil</a:t>
-            </a:r>
-            <a:r>
-              <a:rPr lang="fr-FR" dirty="0"/>
-              <a:t> du projet sur GitLab</a:t>
-            </a:r>
-          </a:p>
-          <a:p>
-            <a:pPr marL="285750" indent="-285750">
-              <a:lnSpc>
-                <a:spcPct val="150000"/>
-              </a:lnSpc>
-              <a:buFont typeface="Courier New" panose="02070309020205020404" pitchFamily="49" charset="0"/>
-              <a:buChar char="o"/>
-            </a:pPr>
-            <a:r>
-              <a:rPr lang="fr-FR" dirty="0"/>
-              <a:t>Très important lorsque tu partages ton projet avec le monde entier</a:t>
-            </a:r>
-          </a:p>
-          <a:p>
-            <a:pPr marL="285750" indent="-285750">
-              <a:lnSpc>
-                <a:spcPct val="150000"/>
-              </a:lnSpc>
-              <a:buFont typeface="Courier New" panose="02070309020205020404" pitchFamily="49" charset="0"/>
-              <a:buChar char="o"/>
-            </a:pPr>
-            <a:r>
-              <a:rPr lang="fr-FR" dirty="0"/>
-              <a:t>C’est du </a:t>
-            </a:r>
-            <a:r>
-              <a:rPr lang="fr-FR" dirty="0" err="1">
-                <a:hlinkClick r:id="rId2"/>
-              </a:rPr>
-              <a:t>Markdown</a:t>
-            </a:r>
-            <a:r>
-              <a:rPr lang="fr-FR" dirty="0"/>
-              <a:t>, tu peux l’éditer avec </a:t>
-            </a:r>
-            <a:r>
-              <a:rPr lang="fr-FR" dirty="0" err="1"/>
-              <a:t>Rstudio</a:t>
-            </a:r>
-            <a:r>
-              <a:rPr lang="fr-FR" dirty="0"/>
-              <a:t> : </a:t>
-            </a:r>
-          </a:p>
-          <a:p>
-            <a:pPr>
-              <a:lnSpc>
-                <a:spcPct val="150000"/>
-              </a:lnSpc>
-            </a:pPr>
-            <a:r>
-              <a:rPr lang="fr-FR" i="1" dirty="0"/>
-              <a:t>      -&gt; File &gt; New File &gt; </a:t>
-            </a:r>
-            <a:r>
-              <a:rPr lang="fr-FR" i="1" dirty="0" err="1"/>
-              <a:t>Markdown</a:t>
-            </a:r>
-            <a:r>
-              <a:rPr lang="fr-FR" i="1" dirty="0"/>
-              <a:t> File</a:t>
-            </a:r>
           </a:p>
           <a:p>
             <a:endParaRPr lang="fr-FR" dirty="0"/>
@@ -5136,7 +5007,7 @@
         </p:nvSpPr>
         <p:spPr bwMode="auto">
           <a:xfrm>
-            <a:off x="6485770" y="1762190"/>
+            <a:off x="1760314" y="4391387"/>
             <a:ext cx="1823729" cy="954107"/>
           </a:xfrm>
           <a:prstGeom prst="rect">
@@ -5322,89 +5193,392 @@
           </a:p>
         </p:txBody>
       </p:sp>
-      <p:pic>
-        <p:nvPicPr>
-          <p:cNvPr id="5" name="Image 4">
+      <p:grpSp>
+        <p:nvGrpSpPr>
+          <p:cNvPr id="4" name="Groupe 3">
             <a:extLst>
               <a:ext uri="{FF2B5EF4-FFF2-40B4-BE49-F238E27FC236}">
-                <a16:creationId xmlns:a16="http://schemas.microsoft.com/office/drawing/2014/main" id="{141FC88B-7C7B-44BB-94F1-4B2FDDCCC52F}"/>
+                <a16:creationId xmlns:a16="http://schemas.microsoft.com/office/drawing/2014/main" id="{D3CF9819-6EE8-422C-BE00-2D911DCCFEF8}"/>
               </a:ext>
             </a:extLst>
           </p:cNvPr>
-          <p:cNvPicPr>
-            <a:picLocks noChangeAspect="1"/>
-          </p:cNvPicPr>
+          <p:cNvGrpSpPr/>
           <p:nvPr/>
-        </p:nvPicPr>
-        <p:blipFill rotWithShape="1">
-          <a:blip r:embed="rId3"/>
-          <a:srcRect t="5462" b="17680"/>
-          <a:stretch/>
-        </p:blipFill>
-        <p:spPr>
+        </p:nvGrpSpPr>
+        <p:grpSpPr>
           <a:xfrm>
-            <a:off x="564366" y="2523478"/>
+            <a:off x="1357468" y="2784258"/>
             <a:ext cx="5486400" cy="1003177"/>
+            <a:chOff x="1357468" y="2784258"/>
+            <a:chExt cx="5486400" cy="1003177"/>
           </a:xfrm>
-          <a:prstGeom prst="rect">
-            <a:avLst/>
-          </a:prstGeom>
-        </p:spPr>
-      </p:pic>
+        </p:grpSpPr>
+        <p:pic>
+          <p:nvPicPr>
+            <p:cNvPr id="5" name="Image 4">
+              <a:extLst>
+                <a:ext uri="{FF2B5EF4-FFF2-40B4-BE49-F238E27FC236}">
+                  <a16:creationId xmlns:a16="http://schemas.microsoft.com/office/drawing/2014/main" id="{141FC88B-7C7B-44BB-94F1-4B2FDDCCC52F}"/>
+                </a:ext>
+              </a:extLst>
+            </p:cNvPr>
+            <p:cNvPicPr>
+              <a:picLocks noChangeAspect="1"/>
+            </p:cNvPicPr>
+            <p:nvPr/>
+          </p:nvPicPr>
+          <p:blipFill rotWithShape="1">
+            <a:blip r:embed="rId2"/>
+            <a:srcRect t="5462" b="17680"/>
+            <a:stretch/>
+          </p:blipFill>
+          <p:spPr>
+            <a:xfrm>
+              <a:off x="1357468" y="2784258"/>
+              <a:ext cx="5486400" cy="1003177"/>
+            </a:xfrm>
+            <a:prstGeom prst="rect">
+              <a:avLst/>
+            </a:prstGeom>
+          </p:spPr>
+        </p:pic>
+        <p:sp>
+          <p:nvSpPr>
+            <p:cNvPr id="7" name="Rectangle 6">
+              <a:extLst>
+                <a:ext uri="{FF2B5EF4-FFF2-40B4-BE49-F238E27FC236}">
+                  <a16:creationId xmlns:a16="http://schemas.microsoft.com/office/drawing/2014/main" id="{41CCFAB4-DB00-4527-8E4C-36199F3D8C72}"/>
+                </a:ext>
+              </a:extLst>
+            </p:cNvPr>
+            <p:cNvSpPr/>
+            <p:nvPr/>
+          </p:nvSpPr>
+          <p:spPr>
+            <a:xfrm>
+              <a:off x="3506680" y="3429000"/>
+              <a:ext cx="1065320" cy="286305"/>
+            </a:xfrm>
+            <a:prstGeom prst="rect">
+              <a:avLst/>
+            </a:prstGeom>
+            <a:noFill/>
+            <a:ln w="28575">
+              <a:solidFill>
+                <a:srgbClr val="FF0000"/>
+              </a:solidFill>
+            </a:ln>
+          </p:spPr>
+          <p:style>
+            <a:lnRef idx="1">
+              <a:schemeClr val="accent1"/>
+            </a:lnRef>
+            <a:fillRef idx="3">
+              <a:schemeClr val="accent1"/>
+            </a:fillRef>
+            <a:effectRef idx="2">
+              <a:schemeClr val="accent1"/>
+            </a:effectRef>
+            <a:fontRef idx="minor">
+              <a:schemeClr val="lt1"/>
+            </a:fontRef>
+          </p:style>
+          <p:txBody>
+            <a:bodyPr rtlCol="0" anchor="ctr"/>
+            <a:lstStyle/>
+            <a:p>
+              <a:pPr algn="ctr"/>
+              <a:endParaRPr lang="fr-FR"/>
+            </a:p>
+          </p:txBody>
+        </p:sp>
+      </p:grpSp>
+    </p:spTree>
+    <p:extLst>
+      <p:ext uri="{BB962C8B-B14F-4D97-AF65-F5344CB8AC3E}">
+        <p14:creationId xmlns:p14="http://schemas.microsoft.com/office/powerpoint/2010/main" val="299319166"/>
+      </p:ext>
+    </p:extLst>
+  </p:cSld>
+  <p:clrMapOvr>
+    <a:masterClrMapping/>
+  </p:clrMapOvr>
+</p:sld>
+</file>
+
+<file path=ppt/slides/slide15.xml><?xml version="1.0" encoding="utf-8"?>
+<p:sld xmlns:a="http://schemas.openxmlformats.org/drawingml/2006/main" xmlns:r="http://schemas.openxmlformats.org/officeDocument/2006/relationships" xmlns:p="http://schemas.openxmlformats.org/presentationml/2006/main">
+  <p:cSld>
+    <p:spTree>
+      <p:nvGrpSpPr>
+        <p:cNvPr id="1" name=""/>
+        <p:cNvGrpSpPr/>
+        <p:nvPr/>
+      </p:nvGrpSpPr>
+      <p:grpSpPr>
+        <a:xfrm>
+          <a:off x="0" y="0"/>
+          <a:ext cx="0" cy="0"/>
+          <a:chOff x="0" y="0"/>
+          <a:chExt cx="0" cy="0"/>
+        </a:xfrm>
+      </p:grpSpPr>
       <p:sp>
         <p:nvSpPr>
-          <p:cNvPr id="7" name="Rectangle 6">
+          <p:cNvPr id="2" name="Titre 1">
             <a:extLst>
               <a:ext uri="{FF2B5EF4-FFF2-40B4-BE49-F238E27FC236}">
-                <a16:creationId xmlns:a16="http://schemas.microsoft.com/office/drawing/2014/main" id="{41CCFAB4-DB00-4527-8E4C-36199F3D8C72}"/>
+                <a16:creationId xmlns:a16="http://schemas.microsoft.com/office/drawing/2014/main" id="{CD7C0836-7E96-438E-850F-452D1BABFEE9}"/>
               </a:ext>
             </a:extLst>
           </p:cNvPr>
-          <p:cNvSpPr/>
+          <p:cNvSpPr>
+            <a:spLocks noGrp="1"/>
+          </p:cNvSpPr>
+          <p:nvPr>
+            <p:ph type="title"/>
+          </p:nvPr>
+        </p:nvSpPr>
+        <p:spPr>
+          <a:xfrm>
+            <a:off x="457200" y="274638"/>
+            <a:ext cx="8229600" cy="1143000"/>
+          </a:xfrm>
+        </p:spPr>
+        <p:txBody>
+          <a:bodyPr>
+            <a:normAutofit fontScale="90000"/>
+          </a:bodyPr>
+          <a:lstStyle/>
+          <a:p>
+            <a:r>
+              <a:rPr lang="fr-FR" dirty="0"/>
+              <a:t>Avant de commencer,</a:t>
+            </a:r>
+            <a:br>
+              <a:rPr lang="fr-FR" dirty="0"/>
+            </a:br>
+            <a:r>
+              <a:rPr lang="fr-FR" dirty="0"/>
+              <a:t>Deux fichiers importants !</a:t>
+            </a:r>
+          </a:p>
+        </p:txBody>
+      </p:sp>
+      <p:sp>
+        <p:nvSpPr>
+          <p:cNvPr id="3" name="ZoneTexte 2">
+            <a:extLst>
+              <a:ext uri="{FF2B5EF4-FFF2-40B4-BE49-F238E27FC236}">
+                <a16:creationId xmlns:a16="http://schemas.microsoft.com/office/drawing/2014/main" id="{5CF8D48A-6D1D-4771-8131-1AA00994D4A6}"/>
+              </a:ext>
+            </a:extLst>
+          </p:cNvPr>
+          <p:cNvSpPr txBox="1"/>
           <p:nvPr/>
         </p:nvSpPr>
         <p:spPr>
           <a:xfrm>
-            <a:off x="2672179" y="3142695"/>
-            <a:ext cx="1065320" cy="286305"/>
+            <a:off x="834501" y="1529065"/>
+            <a:ext cx="7625918" cy="5078313"/>
           </a:xfrm>
           <a:prstGeom prst="rect">
             <a:avLst/>
           </a:prstGeom>
           <a:noFill/>
-          <a:ln w="28575">
-            <a:solidFill>
-              <a:srgbClr val="FF0000"/>
-            </a:solidFill>
-          </a:ln>
         </p:spPr>
-        <p:style>
-          <a:lnRef idx="1">
-            <a:schemeClr val="accent1"/>
-          </a:lnRef>
-          <a:fillRef idx="3">
-            <a:schemeClr val="accent1"/>
-          </a:fillRef>
-          <a:effectRef idx="2">
-            <a:schemeClr val="accent1"/>
-          </a:effectRef>
-          <a:fontRef idx="minor">
-            <a:schemeClr val="lt1"/>
-          </a:fontRef>
-        </p:style>
         <p:txBody>
-          <a:bodyPr rtlCol="0" anchor="ctr"/>
+          <a:bodyPr wrap="square" rtlCol="0">
+            <a:spAutoFit/>
+          </a:bodyPr>
           <a:lstStyle/>
           <a:p>
-            <a:pPr algn="ctr"/>
-            <a:endParaRPr lang="fr-FR"/>
+            <a:endParaRPr lang="fr-FR" dirty="0"/>
+          </a:p>
+          <a:p>
+            <a:r>
+              <a:rPr lang="fr-FR" b="1" u="sng" dirty="0"/>
+              <a:t>Le « README.md »</a:t>
+            </a:r>
+            <a:r>
+              <a:rPr lang="fr-FR" b="1" dirty="0"/>
+              <a:t> </a:t>
+            </a:r>
+            <a:r>
+              <a:rPr lang="fr-FR" dirty="0"/>
+              <a:t>(obligatoire)</a:t>
+            </a:r>
+          </a:p>
+          <a:p>
+            <a:pPr marL="285750" indent="-285750">
+              <a:lnSpc>
+                <a:spcPct val="150000"/>
+              </a:lnSpc>
+              <a:buFont typeface="Courier New" panose="02070309020205020404" pitchFamily="49" charset="0"/>
+              <a:buChar char="o"/>
+            </a:pPr>
+            <a:r>
+              <a:rPr lang="fr-FR" dirty="0"/>
+              <a:t>Ce fichier permet de décrire / présenter le projet</a:t>
+            </a:r>
+          </a:p>
+          <a:p>
+            <a:pPr marL="285750" indent="-285750">
+              <a:lnSpc>
+                <a:spcPct val="150000"/>
+              </a:lnSpc>
+              <a:buFont typeface="Courier New" panose="02070309020205020404" pitchFamily="49" charset="0"/>
+              <a:buChar char="o"/>
+            </a:pPr>
+            <a:r>
+              <a:rPr lang="fr-FR" dirty="0"/>
+              <a:t>Il est affiché sur la page d’accueil du projet sur GitLab</a:t>
+            </a:r>
+          </a:p>
+          <a:p>
+            <a:pPr marL="285750" indent="-285750">
+              <a:lnSpc>
+                <a:spcPct val="150000"/>
+              </a:lnSpc>
+              <a:buFont typeface="Courier New" panose="02070309020205020404" pitchFamily="49" charset="0"/>
+              <a:buChar char="o"/>
+            </a:pPr>
+            <a:r>
+              <a:rPr lang="fr-FR" dirty="0"/>
+              <a:t>Très important lorsque tu partages ton projet avec le monde entier</a:t>
+            </a:r>
+          </a:p>
+          <a:p>
+            <a:pPr marL="285750" indent="-285750">
+              <a:lnSpc>
+                <a:spcPct val="150000"/>
+              </a:lnSpc>
+              <a:buFont typeface="Courier New" panose="02070309020205020404" pitchFamily="49" charset="0"/>
+              <a:buChar char="o"/>
+            </a:pPr>
+            <a:r>
+              <a:rPr lang="fr-FR" dirty="0"/>
+              <a:t>C’est du </a:t>
+            </a:r>
+            <a:r>
+              <a:rPr lang="fr-FR" dirty="0" err="1">
+                <a:hlinkClick r:id="rId2"/>
+              </a:rPr>
+              <a:t>Markdown</a:t>
+            </a:r>
+            <a:r>
+              <a:rPr lang="fr-FR" dirty="0"/>
+              <a:t>, tu peux l’éditer avec </a:t>
+            </a:r>
+            <a:r>
+              <a:rPr lang="fr-FR" dirty="0" err="1"/>
+              <a:t>Rstudio</a:t>
+            </a:r>
+            <a:r>
+              <a:rPr lang="fr-FR" dirty="0"/>
+              <a:t> : </a:t>
+            </a:r>
+          </a:p>
+          <a:p>
+            <a:pPr>
+              <a:lnSpc>
+                <a:spcPct val="150000"/>
+              </a:lnSpc>
+            </a:pPr>
+            <a:r>
+              <a:rPr lang="fr-FR" i="1" dirty="0"/>
+              <a:t>      -&gt; File &gt; New File &gt; </a:t>
+            </a:r>
+            <a:r>
+              <a:rPr lang="fr-FR" i="1" dirty="0" err="1"/>
+              <a:t>Markdown</a:t>
+            </a:r>
+            <a:r>
+              <a:rPr lang="fr-FR" i="1" dirty="0"/>
+              <a:t> File</a:t>
+            </a:r>
+          </a:p>
+          <a:p>
+            <a:endParaRPr lang="fr-FR" dirty="0"/>
+          </a:p>
+          <a:p>
+            <a:r>
+              <a:rPr lang="fr-FR" dirty="0"/>
+              <a:t>Plus d’info :</a:t>
+            </a:r>
+          </a:p>
+          <a:p>
+            <a:pPr marL="285750" indent="-285750">
+              <a:lnSpc>
+                <a:spcPct val="150000"/>
+              </a:lnSpc>
+              <a:buFont typeface="Courier New" panose="02070309020205020404" pitchFamily="49" charset="0"/>
+              <a:buChar char="o"/>
+            </a:pPr>
+            <a:r>
+              <a:rPr lang="fr-FR" dirty="0">
+                <a:hlinkClick r:id="rId3"/>
+              </a:rPr>
+              <a:t>https://en.wikipedia.org/wiki/README</a:t>
+            </a:r>
+            <a:endParaRPr lang="fr-FR" dirty="0"/>
+          </a:p>
+          <a:p>
+            <a:pPr marL="285750" indent="-285750">
+              <a:lnSpc>
+                <a:spcPct val="150000"/>
+              </a:lnSpc>
+              <a:buFont typeface="Courier New" panose="02070309020205020404" pitchFamily="49" charset="0"/>
+              <a:buChar char="o"/>
+            </a:pPr>
+            <a:r>
+              <a:rPr lang="fr-FR" dirty="0">
+                <a:hlinkClick r:id="rId4"/>
+              </a:rPr>
+              <a:t>https://www.makeareadme.com/</a:t>
+            </a:r>
+            <a:endParaRPr lang="fr-FR" dirty="0"/>
+          </a:p>
+          <a:p>
+            <a:pPr marL="285750" indent="-285750">
+              <a:lnSpc>
+                <a:spcPct val="150000"/>
+              </a:lnSpc>
+              <a:buFont typeface="Courier New" panose="02070309020205020404" pitchFamily="49" charset="0"/>
+              <a:buChar char="o"/>
+            </a:pPr>
+            <a:r>
+              <a:rPr lang="fr-FR" dirty="0"/>
+              <a:t>Guide de référence </a:t>
+            </a:r>
+            <a:r>
+              <a:rPr lang="fr-FR" dirty="0" err="1"/>
+              <a:t>Markdown</a:t>
+            </a:r>
+            <a:r>
+              <a:rPr lang="fr-FR" dirty="0"/>
+              <a:t> : </a:t>
+            </a:r>
+            <a:r>
+              <a:rPr lang="fr-FR" dirty="0">
+                <a:hlinkClick r:id="rId5"/>
+              </a:rPr>
+              <a:t>https://commonmark.org/help/</a:t>
+            </a:r>
+            <a:endParaRPr lang="fr-FR" dirty="0"/>
+          </a:p>
+          <a:p>
+            <a:endParaRPr lang="fr-FR" dirty="0"/>
+          </a:p>
+          <a:p>
+            <a:endParaRPr lang="fr-FR" dirty="0"/>
           </a:p>
         </p:txBody>
       </p:sp>
     </p:spTree>
     <p:extLst>
       <p:ext uri="{BB962C8B-B14F-4D97-AF65-F5344CB8AC3E}">
-        <p14:creationId xmlns:p14="http://schemas.microsoft.com/office/powerpoint/2010/main" val="299319166"/>
+        <p14:creationId xmlns:p14="http://schemas.microsoft.com/office/powerpoint/2010/main" val="2552550447"/>
       </p:ext>
     </p:extLst>
   </p:cSld>
@@ -5447,7 +5621,7 @@
                                         <p:tgtEl>
                                           <p:spTgt spid="3">
                                             <p:txEl>
-                                              <p:pRg st="8" end="8"/>
+                                              <p:pRg st="1" end="1"/>
                                             </p:txEl>
                                           </p:spTgt>
                                         </p:tgtEl>
@@ -5478,7 +5652,7 @@
                                         <p:tgtEl>
                                           <p:spTgt spid="3">
                                             <p:txEl>
-                                              <p:pRg st="9" end="9"/>
+                                              <p:pRg st="2" end="2"/>
                                             </p:txEl>
                                           </p:spTgt>
                                         </p:tgtEl>
@@ -5509,7 +5683,7 @@
                                         <p:tgtEl>
                                           <p:spTgt spid="3">
                                             <p:txEl>
-                                              <p:pRg st="10" end="10"/>
+                                              <p:pRg st="3" end="3"/>
                                             </p:txEl>
                                           </p:spTgt>
                                         </p:tgtEl>
@@ -5540,7 +5714,7 @@
                                         <p:tgtEl>
                                           <p:spTgt spid="3">
                                             <p:txEl>
-                                              <p:pRg st="11" end="11"/>
+                                              <p:pRg st="4" end="4"/>
                                             </p:txEl>
                                           </p:spTgt>
                                         </p:tgtEl>
@@ -5571,7 +5745,7 @@
                                         <p:tgtEl>
                                           <p:spTgt spid="3">
                                             <p:txEl>
-                                              <p:pRg st="12" end="12"/>
+                                              <p:pRg st="5" end="5"/>
                                             </p:txEl>
                                           </p:spTgt>
                                         </p:tgtEl>
@@ -5602,7 +5776,131 @@
                                         <p:tgtEl>
                                           <p:spTgt spid="3">
                                             <p:txEl>
-                                              <p:pRg st="13" end="13"/>
+                                              <p:pRg st="6" end="6"/>
+                                            </p:txEl>
+                                          </p:spTgt>
+                                        </p:tgtEl>
+                                        <p:attrNameLst>
+                                          <p:attrName>style.visibility</p:attrName>
+                                        </p:attrNameLst>
+                                      </p:cBhvr>
+                                      <p:to>
+                                        <p:strVal val="visible"/>
+                                      </p:to>
+                                    </p:set>
+                                  </p:childTnLst>
+                                </p:cTn>
+                              </p:par>
+                              <p:par>
+                                <p:cTn id="17" presetID="1" presetClass="entr" presetSubtype="0" fill="hold" nodeType="withEffect">
+                                  <p:stCondLst>
+                                    <p:cond delay="0"/>
+                                  </p:stCondLst>
+                                  <p:childTnLst>
+                                    <p:set>
+                                      <p:cBhvr>
+                                        <p:cTn id="18" dur="1" fill="hold">
+                                          <p:stCondLst>
+                                            <p:cond delay="0"/>
+                                          </p:stCondLst>
+                                        </p:cTn>
+                                        <p:tgtEl>
+                                          <p:spTgt spid="3">
+                                            <p:txEl>
+                                              <p:pRg st="8" end="8"/>
+                                            </p:txEl>
+                                          </p:spTgt>
+                                        </p:tgtEl>
+                                        <p:attrNameLst>
+                                          <p:attrName>style.visibility</p:attrName>
+                                        </p:attrNameLst>
+                                      </p:cBhvr>
+                                      <p:to>
+                                        <p:strVal val="visible"/>
+                                      </p:to>
+                                    </p:set>
+                                  </p:childTnLst>
+                                </p:cTn>
+                              </p:par>
+                              <p:par>
+                                <p:cTn id="19" presetID="1" presetClass="entr" presetSubtype="0" fill="hold" nodeType="withEffect">
+                                  <p:stCondLst>
+                                    <p:cond delay="0"/>
+                                  </p:stCondLst>
+                                  <p:childTnLst>
+                                    <p:set>
+                                      <p:cBhvr>
+                                        <p:cTn id="20" dur="1" fill="hold">
+                                          <p:stCondLst>
+                                            <p:cond delay="0"/>
+                                          </p:stCondLst>
+                                        </p:cTn>
+                                        <p:tgtEl>
+                                          <p:spTgt spid="3">
+                                            <p:txEl>
+                                              <p:pRg st="9" end="9"/>
+                                            </p:txEl>
+                                          </p:spTgt>
+                                        </p:tgtEl>
+                                        <p:attrNameLst>
+                                          <p:attrName>style.visibility</p:attrName>
+                                        </p:attrNameLst>
+                                      </p:cBhvr>
+                                      <p:to>
+                                        <p:strVal val="visible"/>
+                                      </p:to>
+                                    </p:set>
+                                  </p:childTnLst>
+                                </p:cTn>
+                              </p:par>
+                              <p:par>
+                                <p:cTn id="21" presetID="1" presetClass="entr" presetSubtype="0" fill="hold" nodeType="withEffect">
+                                  <p:stCondLst>
+                                    <p:cond delay="0"/>
+                                  </p:stCondLst>
+                                  <p:childTnLst>
+                                    <p:set>
+                                      <p:cBhvr>
+                                        <p:cTn id="22" dur="1" fill="hold">
+                                          <p:stCondLst>
+                                            <p:cond delay="0"/>
+                                          </p:stCondLst>
+                                        </p:cTn>
+                                        <p:tgtEl>
+                                          <p:spTgt spid="3">
+                                            <p:txEl>
+                                              <p:pRg st="10" end="10"/>
+                                            </p:txEl>
+                                          </p:spTgt>
+                                        </p:tgtEl>
+                                        <p:attrNameLst>
+                                          <p:attrName>style.visibility</p:attrName>
+                                        </p:attrNameLst>
+                                      </p:cBhvr>
+                                      <p:to>
+                                        <p:strVal val="visible"/>
+                                      </p:to>
+                                    </p:set>
+                                  </p:childTnLst>
+                                </p:cTn>
+                              </p:par>
+                              <p:par>
+                                <p:cTn id="23" presetID="1" presetClass="entr" presetSubtype="0" fill="hold" nodeType="withEffect">
+                                  <p:stCondLst>
+                                    <p:cond delay="0"/>
+                                  </p:stCondLst>
+                                  <p:childTnLst>
+                                    <p:set>
+                                      <p:cBhvr>
+                                        <p:cTn id="24" dur="1" fill="hold">
+                                          <p:stCondLst>
+                                            <p:cond delay="0"/>
+                                          </p:stCondLst>
+                                        </p:cTn>
+                                        <p:tgtEl>
+                                          <p:spTgt spid="3">
+                                            <p:txEl>
+                                              <p:pRg st="11" end="11"/>
                                             </p:txEl>
                                           </p:spTgt>
                                         </p:tgtEl>
@@ -5648,7 +5946,7 @@
 </p:sld>
 </file>
 
-<file path=ppt/slides/slide15.xml><?xml version="1.0" encoding="utf-8"?>
+<file path=ppt/slides/slide16.xml><?xml version="1.0" encoding="utf-8"?>
 <p:sld xmlns:a="http://schemas.openxmlformats.org/drawingml/2006/main" xmlns:r="http://schemas.openxmlformats.org/officeDocument/2006/relationships" xmlns:p="http://schemas.openxmlformats.org/presentationml/2006/main">
   <p:cSld>
     <p:spTree>
@@ -5748,7 +6046,7 @@
             </a:r>
             <a:r>
               <a:rPr lang="fr-FR" sz="1400" dirty="0"/>
-              <a:t>” pour voir les fichiers qui ont été modifié depuis la dernière sauvegarde (commit)</a:t>
+              <a:t>” pour voir les fichiers qui ont été modifiés depuis la dernière sauvegarde (commit)</a:t>
             </a:r>
           </a:p>
           <a:p>
@@ -5777,7 +6075,7 @@
             </a:r>
             <a:r>
               <a:rPr lang="fr-FR" sz="1400" dirty="0"/>
-              <a:t>” pour sélectionner les fichiers avec lesquels tu veux faire une sauvegarde (mise en </a:t>
+              <a:t>” pour sélectionner les fichiers dont tu veux faire une sauvegarde (mise en </a:t>
             </a:r>
             <a:r>
               <a:rPr lang="fr-FR" sz="1400" b="1" dirty="0">
@@ -6085,7 +6383,7 @@
         </p:nvSpPr>
         <p:spPr>
           <a:xfrm>
-            <a:off x="3264474" y="2359590"/>
+            <a:off x="5340326" y="2154185"/>
             <a:ext cx="2640456" cy="430887"/>
           </a:xfrm>
           <a:prstGeom prst="rect">
@@ -6854,7 +7152,7 @@
 </p:sld>
 </file>
 
-<file path=ppt/slides/slide16.xml><?xml version="1.0" encoding="utf-8"?>
+<file path=ppt/slides/slide17.xml><?xml version="1.0" encoding="utf-8"?>
 <p:sld xmlns:a="http://schemas.openxmlformats.org/drawingml/2006/main" xmlns:r="http://schemas.openxmlformats.org/officeDocument/2006/relationships" xmlns:p="http://schemas.openxmlformats.org/presentationml/2006/main">
   <p:cSld>
     <p:spTree>
@@ -8058,7 +8356,7 @@
 </p:sld>
 </file>
 
-<file path=ppt/slides/slide17.xml><?xml version="1.0" encoding="utf-8"?>
+<file path=ppt/slides/slide18.xml><?xml version="1.0" encoding="utf-8"?>
 <p:sld xmlns:a="http://schemas.openxmlformats.org/drawingml/2006/main" xmlns:r="http://schemas.openxmlformats.org/officeDocument/2006/relationships" xmlns:p="http://schemas.openxmlformats.org/presentationml/2006/main">
   <p:cSld>
     <p:spTree>
@@ -8148,7 +8446,7 @@
               <a:rPr lang="fr-FR" altLang="fr-FR" dirty="0">
                 <a:latin typeface="Arial" panose="020B0604020202020204" pitchFamily="34" charset="0"/>
               </a:rPr>
-              <a:t>Tu peux revenir sur une précédente sauvegarde</a:t>
+              <a:t>Tu peux voir qui a fait des modifications</a:t>
             </a:r>
           </a:p>
           <a:p>
@@ -8169,11 +8467,11 @@
               <a:rPr lang="fr-FR" altLang="fr-FR" dirty="0">
                 <a:latin typeface="Arial" panose="020B0604020202020204" pitchFamily="34" charset="0"/>
               </a:rPr>
-              <a:t>Tu peux récupérer un fichier spécifique dans une précédente sauvegarde</a:t>
-            </a:r>
-          </a:p>
-          <a:p>
-            <a:pPr marL="285750" indent="-285750" defTabSz="914400" eaLnBrk="0" fontAlgn="base" hangingPunct="0">
+              <a:t>Tu peux voir ce qui a été modifié</a:t>
+            </a:r>
+          </a:p>
+          <a:p>
+            <a:pPr marL="285750" lvl="0" indent="-285750" defTabSz="914400" eaLnBrk="0" fontAlgn="base" hangingPunct="0">
               <a:lnSpc>
                 <a:spcPct val="150000"/>
               </a:lnSpc>
@@ -8190,7 +8488,7 @@
               <a:rPr lang="fr-FR" altLang="fr-FR" dirty="0">
                 <a:latin typeface="Arial" panose="020B0604020202020204" pitchFamily="34" charset="0"/>
               </a:rPr>
-              <a:t>Il est également possible de créer des branches pour travailler en parallèle</a:t>
+              <a:t>Tu peux récupérer un fichier spécifique dans une précédente sauvegarde</a:t>
             </a:r>
           </a:p>
           <a:p>
@@ -8311,7 +8609,7 @@
 </p:sld>
 </file>
 
-<file path=ppt/slides/slide18.xml><?xml version="1.0" encoding="utf-8"?>
+<file path=ppt/slides/slide19.xml><?xml version="1.0" encoding="utf-8"?>
 <p:sld xmlns:a="http://schemas.openxmlformats.org/drawingml/2006/main" xmlns:r="http://schemas.openxmlformats.org/officeDocument/2006/relationships" xmlns:p="http://schemas.openxmlformats.org/presentationml/2006/main">
   <p:cSld>
     <p:spTree>
@@ -8428,650 +8726,327 @@
           </a:p>
         </p:txBody>
       </p:sp>
-      <p:pic>
-        <p:nvPicPr>
-          <p:cNvPr id="4" name="Image 3">
+      <p:grpSp>
+        <p:nvGrpSpPr>
+          <p:cNvPr id="7" name="Groupe 6">
             <a:extLst>
               <a:ext uri="{FF2B5EF4-FFF2-40B4-BE49-F238E27FC236}">
-                <a16:creationId xmlns:a16="http://schemas.microsoft.com/office/drawing/2014/main" id="{29974FEB-50F5-41FE-81E8-361341447CB1}"/>
+                <a16:creationId xmlns:a16="http://schemas.microsoft.com/office/drawing/2014/main" id="{2BA3BBCC-DD1F-48E1-9195-5749F8BE4372}"/>
               </a:ext>
             </a:extLst>
           </p:cNvPr>
-          <p:cNvPicPr>
-            <a:picLocks noChangeAspect="1"/>
-          </p:cNvPicPr>
+          <p:cNvGrpSpPr/>
           <p:nvPr/>
-        </p:nvPicPr>
-        <p:blipFill>
-          <a:blip r:embed="rId2"/>
-          <a:stretch>
-            <a:fillRect/>
-          </a:stretch>
-        </p:blipFill>
-        <p:spPr>
+        </p:nvGrpSpPr>
+        <p:grpSpPr>
           <a:xfrm>
             <a:off x="647152" y="1705846"/>
             <a:ext cx="7849695" cy="4067743"/>
+            <a:chOff x="647152" y="1705846"/>
+            <a:chExt cx="7849695" cy="4067743"/>
           </a:xfrm>
-          <a:prstGeom prst="rect">
-            <a:avLst/>
-          </a:prstGeom>
-        </p:spPr>
-      </p:pic>
-      <p:sp>
-        <p:nvSpPr>
-          <p:cNvPr id="5" name="Rectangle 4">
-            <a:extLst>
-              <a:ext uri="{FF2B5EF4-FFF2-40B4-BE49-F238E27FC236}">
-                <a16:creationId xmlns:a16="http://schemas.microsoft.com/office/drawing/2014/main" id="{8DF75059-CDBF-4892-917F-9F5365CDF10F}"/>
-              </a:ext>
-            </a:extLst>
-          </p:cNvPr>
-          <p:cNvSpPr/>
-          <p:nvPr/>
-        </p:nvSpPr>
-        <p:spPr>
-          <a:xfrm>
-            <a:off x="6764784" y="2210540"/>
-            <a:ext cx="381740" cy="346229"/>
-          </a:xfrm>
-          <a:prstGeom prst="rect">
-            <a:avLst/>
-          </a:prstGeom>
-          <a:noFill/>
-          <a:ln w="28575">
-            <a:solidFill>
-              <a:srgbClr val="FF0000"/>
-            </a:solidFill>
-          </a:ln>
-        </p:spPr>
-        <p:style>
-          <a:lnRef idx="1">
-            <a:schemeClr val="accent1"/>
-          </a:lnRef>
-          <a:fillRef idx="3">
-            <a:schemeClr val="accent1"/>
-          </a:fillRef>
-          <a:effectRef idx="2">
-            <a:schemeClr val="accent1"/>
-          </a:effectRef>
-          <a:fontRef idx="minor">
-            <a:schemeClr val="lt1"/>
-          </a:fontRef>
-        </p:style>
-        <p:txBody>
-          <a:bodyPr rtlCol="0" anchor="ctr"/>
-          <a:lstStyle/>
-          <a:p>
-            <a:pPr algn="ctr"/>
-            <a:endParaRPr lang="fr-FR"/>
-          </a:p>
-        </p:txBody>
-      </p:sp>
-      <p:sp>
-        <p:nvSpPr>
-          <p:cNvPr id="6" name="Rectangle 5">
-            <a:extLst>
-              <a:ext uri="{FF2B5EF4-FFF2-40B4-BE49-F238E27FC236}">
-                <a16:creationId xmlns:a16="http://schemas.microsoft.com/office/drawing/2014/main" id="{B1C76EC1-50B1-4BA6-9F97-1DD62C2164C5}"/>
-              </a:ext>
-            </a:extLst>
-          </p:cNvPr>
-          <p:cNvSpPr/>
-          <p:nvPr/>
-        </p:nvSpPr>
-        <p:spPr>
-          <a:xfrm>
-            <a:off x="7260454" y="2210540"/>
-            <a:ext cx="658428" cy="346229"/>
-          </a:xfrm>
-          <a:prstGeom prst="rect">
-            <a:avLst/>
-          </a:prstGeom>
-          <a:noFill/>
-          <a:ln w="28575">
-            <a:solidFill>
-              <a:srgbClr val="FF0000"/>
-            </a:solidFill>
-          </a:ln>
-        </p:spPr>
-        <p:style>
-          <a:lnRef idx="1">
-            <a:schemeClr val="accent1"/>
-          </a:lnRef>
-          <a:fillRef idx="3">
-            <a:schemeClr val="accent1"/>
-          </a:fillRef>
-          <a:effectRef idx="2">
-            <a:schemeClr val="accent1"/>
-          </a:effectRef>
-          <a:fontRef idx="minor">
-            <a:schemeClr val="lt1"/>
-          </a:fontRef>
-        </p:style>
-        <p:txBody>
-          <a:bodyPr rtlCol="0" anchor="ctr"/>
-          <a:lstStyle/>
-          <a:p>
-            <a:pPr algn="ctr"/>
-            <a:endParaRPr lang="fr-FR"/>
-          </a:p>
-        </p:txBody>
-      </p:sp>
-      <p:cxnSp>
-        <p:nvCxnSpPr>
-          <p:cNvPr id="8" name="Connecteur droit avec flèche 7">
-            <a:extLst>
-              <a:ext uri="{FF2B5EF4-FFF2-40B4-BE49-F238E27FC236}">
-                <a16:creationId xmlns:a16="http://schemas.microsoft.com/office/drawing/2014/main" id="{84548203-6039-4F98-906E-CC0316E63052}"/>
-              </a:ext>
-            </a:extLst>
-          </p:cNvPr>
-          <p:cNvCxnSpPr>
-            <a:cxnSpLocks/>
-          </p:cNvCxnSpPr>
-          <p:nvPr/>
-        </p:nvCxnSpPr>
-        <p:spPr>
-          <a:xfrm flipV="1">
-            <a:off x="7416412" y="2632738"/>
-            <a:ext cx="94097" cy="484342"/>
-          </a:xfrm>
-          <a:prstGeom prst="straightConnector1">
-            <a:avLst/>
-          </a:prstGeom>
-          <a:ln>
-            <a:solidFill>
-              <a:srgbClr val="FF0000"/>
-            </a:solidFill>
-            <a:tailEnd type="triangle"/>
-          </a:ln>
-        </p:spPr>
-        <p:style>
-          <a:lnRef idx="2">
-            <a:schemeClr val="accent1"/>
-          </a:lnRef>
-          <a:fillRef idx="0">
-            <a:schemeClr val="accent1"/>
-          </a:fillRef>
-          <a:effectRef idx="1">
-            <a:schemeClr val="accent1"/>
-          </a:effectRef>
-          <a:fontRef idx="minor">
-            <a:schemeClr val="tx1"/>
-          </a:fontRef>
-        </p:style>
-      </p:cxnSp>
-      <p:sp>
-        <p:nvSpPr>
-          <p:cNvPr id="9" name="ZoneTexte 8">
-            <a:extLst>
-              <a:ext uri="{FF2B5EF4-FFF2-40B4-BE49-F238E27FC236}">
-                <a16:creationId xmlns:a16="http://schemas.microsoft.com/office/drawing/2014/main" id="{FF671DA4-B93C-4376-A799-81AF2E25EBC9}"/>
-              </a:ext>
-            </a:extLst>
-          </p:cNvPr>
-          <p:cNvSpPr txBox="1"/>
-          <p:nvPr/>
-        </p:nvSpPr>
-        <p:spPr>
-          <a:xfrm>
-            <a:off x="4908893" y="1855804"/>
-            <a:ext cx="1934415" cy="338554"/>
-          </a:xfrm>
-          <a:prstGeom prst="rect">
-            <a:avLst/>
-          </a:prstGeom>
-          <a:noFill/>
-        </p:spPr>
-        <p:txBody>
-          <a:bodyPr wrap="square" rtlCol="0">
-            <a:spAutoFit/>
-          </a:bodyPr>
-          <a:lstStyle/>
-          <a:p>
-            <a:r>
-              <a:rPr lang="fr-FR" sz="1600" dirty="0">
-                <a:solidFill>
-                  <a:srgbClr val="FF0000"/>
-                </a:solidFill>
-              </a:rPr>
-              <a:t>Créer une branche</a:t>
-            </a:r>
-          </a:p>
-        </p:txBody>
-      </p:sp>
-      <p:sp>
-        <p:nvSpPr>
-          <p:cNvPr id="10" name="ZoneTexte 9">
-            <a:extLst>
-              <a:ext uri="{FF2B5EF4-FFF2-40B4-BE49-F238E27FC236}">
-                <a16:creationId xmlns:a16="http://schemas.microsoft.com/office/drawing/2014/main" id="{7EF43477-0F51-43E0-993F-F176B0F3A953}"/>
-              </a:ext>
-            </a:extLst>
-          </p:cNvPr>
-          <p:cNvSpPr txBox="1"/>
-          <p:nvPr/>
-        </p:nvSpPr>
-        <p:spPr>
-          <a:xfrm>
-            <a:off x="6374625" y="3090446"/>
-            <a:ext cx="2083575" cy="338554"/>
-          </a:xfrm>
-          <a:prstGeom prst="rect">
-            <a:avLst/>
-          </a:prstGeom>
-          <a:noFill/>
-        </p:spPr>
-        <p:txBody>
-          <a:bodyPr wrap="square" rtlCol="0">
-            <a:spAutoFit/>
-          </a:bodyPr>
-          <a:lstStyle/>
-          <a:p>
-            <a:r>
-              <a:rPr lang="fr-FR" sz="1600" dirty="0">
-                <a:solidFill>
-                  <a:srgbClr val="FF0000"/>
-                </a:solidFill>
-              </a:rPr>
-              <a:t>Changer de branche</a:t>
-            </a:r>
-          </a:p>
-        </p:txBody>
-      </p:sp>
-      <p:cxnSp>
-        <p:nvCxnSpPr>
-          <p:cNvPr id="12" name="Connecteur droit avec flèche 11">
-            <a:extLst>
-              <a:ext uri="{FF2B5EF4-FFF2-40B4-BE49-F238E27FC236}">
-                <a16:creationId xmlns:a16="http://schemas.microsoft.com/office/drawing/2014/main" id="{C1F9E14A-2F3A-4304-B52F-12AB7544E00A}"/>
-              </a:ext>
-            </a:extLst>
-          </p:cNvPr>
-          <p:cNvCxnSpPr>
-            <a:cxnSpLocks/>
-          </p:cNvCxnSpPr>
-          <p:nvPr/>
-        </p:nvCxnSpPr>
-        <p:spPr>
-          <a:xfrm>
-            <a:off x="6267635" y="2136640"/>
-            <a:ext cx="414854" cy="207676"/>
-          </a:xfrm>
-          <a:prstGeom prst="straightConnector1">
-            <a:avLst/>
-          </a:prstGeom>
-          <a:ln>
-            <a:solidFill>
-              <a:srgbClr val="FF0000"/>
-            </a:solidFill>
-            <a:tailEnd type="triangle"/>
-          </a:ln>
-        </p:spPr>
-        <p:style>
-          <a:lnRef idx="2">
-            <a:schemeClr val="accent1"/>
-          </a:lnRef>
-          <a:fillRef idx="0">
-            <a:schemeClr val="accent1"/>
-          </a:fillRef>
-          <a:effectRef idx="1">
-            <a:schemeClr val="accent1"/>
-          </a:effectRef>
-          <a:fontRef idx="minor">
-            <a:schemeClr val="tx1"/>
-          </a:fontRef>
-        </p:style>
-      </p:cxnSp>
+        </p:grpSpPr>
+        <p:pic>
+          <p:nvPicPr>
+            <p:cNvPr id="4" name="Image 3">
+              <a:extLst>
+                <a:ext uri="{FF2B5EF4-FFF2-40B4-BE49-F238E27FC236}">
+                  <a16:creationId xmlns:a16="http://schemas.microsoft.com/office/drawing/2014/main" id="{29974FEB-50F5-41FE-81E8-361341447CB1}"/>
+                </a:ext>
+              </a:extLst>
+            </p:cNvPr>
+            <p:cNvPicPr>
+              <a:picLocks noChangeAspect="1"/>
+            </p:cNvPicPr>
+            <p:nvPr/>
+          </p:nvPicPr>
+          <p:blipFill>
+            <a:blip r:embed="rId2"/>
+            <a:stretch>
+              <a:fillRect/>
+            </a:stretch>
+          </p:blipFill>
+          <p:spPr>
+            <a:xfrm>
+              <a:off x="647152" y="1705846"/>
+              <a:ext cx="7849695" cy="4067743"/>
+            </a:xfrm>
+            <a:prstGeom prst="rect">
+              <a:avLst/>
+            </a:prstGeom>
+          </p:spPr>
+        </p:pic>
+        <p:sp>
+          <p:nvSpPr>
+            <p:cNvPr id="5" name="Rectangle 4">
+              <a:extLst>
+                <a:ext uri="{FF2B5EF4-FFF2-40B4-BE49-F238E27FC236}">
+                  <a16:creationId xmlns:a16="http://schemas.microsoft.com/office/drawing/2014/main" id="{8DF75059-CDBF-4892-917F-9F5365CDF10F}"/>
+                </a:ext>
+              </a:extLst>
+            </p:cNvPr>
+            <p:cNvSpPr/>
+            <p:nvPr/>
+          </p:nvSpPr>
+          <p:spPr>
+            <a:xfrm>
+              <a:off x="6764784" y="2210540"/>
+              <a:ext cx="381740" cy="346229"/>
+            </a:xfrm>
+            <a:prstGeom prst="rect">
+              <a:avLst/>
+            </a:prstGeom>
+            <a:noFill/>
+            <a:ln w="28575">
+              <a:solidFill>
+                <a:srgbClr val="FF0000"/>
+              </a:solidFill>
+            </a:ln>
+          </p:spPr>
+          <p:style>
+            <a:lnRef idx="1">
+              <a:schemeClr val="accent1"/>
+            </a:lnRef>
+            <a:fillRef idx="3">
+              <a:schemeClr val="accent1"/>
+            </a:fillRef>
+            <a:effectRef idx="2">
+              <a:schemeClr val="accent1"/>
+            </a:effectRef>
+            <a:fontRef idx="minor">
+              <a:schemeClr val="lt1"/>
+            </a:fontRef>
+          </p:style>
+          <p:txBody>
+            <a:bodyPr rtlCol="0" anchor="ctr"/>
+            <a:lstStyle/>
+            <a:p>
+              <a:pPr algn="ctr"/>
+              <a:endParaRPr lang="fr-FR"/>
+            </a:p>
+          </p:txBody>
+        </p:sp>
+        <p:sp>
+          <p:nvSpPr>
+            <p:cNvPr id="6" name="Rectangle 5">
+              <a:extLst>
+                <a:ext uri="{FF2B5EF4-FFF2-40B4-BE49-F238E27FC236}">
+                  <a16:creationId xmlns:a16="http://schemas.microsoft.com/office/drawing/2014/main" id="{B1C76EC1-50B1-4BA6-9F97-1DD62C2164C5}"/>
+                </a:ext>
+              </a:extLst>
+            </p:cNvPr>
+            <p:cNvSpPr/>
+            <p:nvPr/>
+          </p:nvSpPr>
+          <p:spPr>
+            <a:xfrm>
+              <a:off x="7260454" y="2210540"/>
+              <a:ext cx="658428" cy="346229"/>
+            </a:xfrm>
+            <a:prstGeom prst="rect">
+              <a:avLst/>
+            </a:prstGeom>
+            <a:noFill/>
+            <a:ln w="28575">
+              <a:solidFill>
+                <a:srgbClr val="FF0000"/>
+              </a:solidFill>
+            </a:ln>
+          </p:spPr>
+          <p:style>
+            <a:lnRef idx="1">
+              <a:schemeClr val="accent1"/>
+            </a:lnRef>
+            <a:fillRef idx="3">
+              <a:schemeClr val="accent1"/>
+            </a:fillRef>
+            <a:effectRef idx="2">
+              <a:schemeClr val="accent1"/>
+            </a:effectRef>
+            <a:fontRef idx="minor">
+              <a:schemeClr val="lt1"/>
+            </a:fontRef>
+          </p:style>
+          <p:txBody>
+            <a:bodyPr rtlCol="0" anchor="ctr"/>
+            <a:lstStyle/>
+            <a:p>
+              <a:pPr algn="ctr"/>
+              <a:endParaRPr lang="fr-FR"/>
+            </a:p>
+          </p:txBody>
+        </p:sp>
+        <p:cxnSp>
+          <p:nvCxnSpPr>
+            <p:cNvPr id="8" name="Connecteur droit avec flèche 7">
+              <a:extLst>
+                <a:ext uri="{FF2B5EF4-FFF2-40B4-BE49-F238E27FC236}">
+                  <a16:creationId xmlns:a16="http://schemas.microsoft.com/office/drawing/2014/main" id="{84548203-6039-4F98-906E-CC0316E63052}"/>
+                </a:ext>
+              </a:extLst>
+            </p:cNvPr>
+            <p:cNvCxnSpPr>
+              <a:cxnSpLocks/>
+            </p:cNvCxnSpPr>
+            <p:nvPr/>
+          </p:nvCxnSpPr>
+          <p:spPr>
+            <a:xfrm flipV="1">
+              <a:off x="7416412" y="2632738"/>
+              <a:ext cx="94097" cy="484342"/>
+            </a:xfrm>
+            <a:prstGeom prst="straightConnector1">
+              <a:avLst/>
+            </a:prstGeom>
+            <a:ln>
+              <a:solidFill>
+                <a:srgbClr val="FF0000"/>
+              </a:solidFill>
+              <a:tailEnd type="triangle"/>
+            </a:ln>
+          </p:spPr>
+          <p:style>
+            <a:lnRef idx="2">
+              <a:schemeClr val="accent1"/>
+            </a:lnRef>
+            <a:fillRef idx="0">
+              <a:schemeClr val="accent1"/>
+            </a:fillRef>
+            <a:effectRef idx="1">
+              <a:schemeClr val="accent1"/>
+            </a:effectRef>
+            <a:fontRef idx="minor">
+              <a:schemeClr val="tx1"/>
+            </a:fontRef>
+          </p:style>
+        </p:cxnSp>
+        <p:sp>
+          <p:nvSpPr>
+            <p:cNvPr id="9" name="ZoneTexte 8">
+              <a:extLst>
+                <a:ext uri="{FF2B5EF4-FFF2-40B4-BE49-F238E27FC236}">
+                  <a16:creationId xmlns:a16="http://schemas.microsoft.com/office/drawing/2014/main" id="{FF671DA4-B93C-4376-A799-81AF2E25EBC9}"/>
+                </a:ext>
+              </a:extLst>
+            </p:cNvPr>
+            <p:cNvSpPr txBox="1"/>
+            <p:nvPr/>
+          </p:nvSpPr>
+          <p:spPr>
+            <a:xfrm>
+              <a:off x="4908893" y="1855804"/>
+              <a:ext cx="1934415" cy="338554"/>
+            </a:xfrm>
+            <a:prstGeom prst="rect">
+              <a:avLst/>
+            </a:prstGeom>
+            <a:noFill/>
+          </p:spPr>
+          <p:txBody>
+            <a:bodyPr wrap="square" rtlCol="0">
+              <a:spAutoFit/>
+            </a:bodyPr>
+            <a:lstStyle/>
+            <a:p>
+              <a:r>
+                <a:rPr lang="fr-FR" sz="1600" dirty="0">
+                  <a:solidFill>
+                    <a:srgbClr val="FF0000"/>
+                  </a:solidFill>
+                </a:rPr>
+                <a:t>Créer une branche</a:t>
+              </a:r>
+            </a:p>
+          </p:txBody>
+        </p:sp>
+        <p:sp>
+          <p:nvSpPr>
+            <p:cNvPr id="10" name="ZoneTexte 9">
+              <a:extLst>
+                <a:ext uri="{FF2B5EF4-FFF2-40B4-BE49-F238E27FC236}">
+                  <a16:creationId xmlns:a16="http://schemas.microsoft.com/office/drawing/2014/main" id="{7EF43477-0F51-43E0-993F-F176B0F3A953}"/>
+                </a:ext>
+              </a:extLst>
+            </p:cNvPr>
+            <p:cNvSpPr txBox="1"/>
+            <p:nvPr/>
+          </p:nvSpPr>
+          <p:spPr>
+            <a:xfrm>
+              <a:off x="6374625" y="3090446"/>
+              <a:ext cx="2083575" cy="338554"/>
+            </a:xfrm>
+            <a:prstGeom prst="rect">
+              <a:avLst/>
+            </a:prstGeom>
+            <a:noFill/>
+          </p:spPr>
+          <p:txBody>
+            <a:bodyPr wrap="square" rtlCol="0">
+              <a:spAutoFit/>
+            </a:bodyPr>
+            <a:lstStyle/>
+            <a:p>
+              <a:r>
+                <a:rPr lang="fr-FR" sz="1600" dirty="0">
+                  <a:solidFill>
+                    <a:srgbClr val="FF0000"/>
+                  </a:solidFill>
+                </a:rPr>
+                <a:t>Changer de branche</a:t>
+              </a:r>
+            </a:p>
+          </p:txBody>
+        </p:sp>
+        <p:cxnSp>
+          <p:nvCxnSpPr>
+            <p:cNvPr id="12" name="Connecteur droit avec flèche 11">
+              <a:extLst>
+                <a:ext uri="{FF2B5EF4-FFF2-40B4-BE49-F238E27FC236}">
+                  <a16:creationId xmlns:a16="http://schemas.microsoft.com/office/drawing/2014/main" id="{C1F9E14A-2F3A-4304-B52F-12AB7544E00A}"/>
+                </a:ext>
+              </a:extLst>
+            </p:cNvPr>
+            <p:cNvCxnSpPr>
+              <a:cxnSpLocks/>
+            </p:cNvCxnSpPr>
+            <p:nvPr/>
+          </p:nvCxnSpPr>
+          <p:spPr>
+            <a:xfrm>
+              <a:off x="6267635" y="2136640"/>
+              <a:ext cx="414854" cy="207676"/>
+            </a:xfrm>
+            <a:prstGeom prst="straightConnector1">
+              <a:avLst/>
+            </a:prstGeom>
+            <a:ln>
+              <a:solidFill>
+                <a:srgbClr val="FF0000"/>
+              </a:solidFill>
+              <a:tailEnd type="triangle"/>
+            </a:ln>
+          </p:spPr>
+          <p:style>
+            <a:lnRef idx="2">
+              <a:schemeClr val="accent1"/>
+            </a:lnRef>
+            <a:fillRef idx="0">
+              <a:schemeClr val="accent1"/>
+            </a:fillRef>
+            <a:effectRef idx="1">
+              <a:schemeClr val="accent1"/>
+            </a:effectRef>
+            <a:fontRef idx="minor">
+              <a:schemeClr val="tx1"/>
+            </a:fontRef>
+          </p:style>
+        </p:cxnSp>
+      </p:grpSp>
     </p:spTree>
     <p:extLst>
       <p:ext uri="{BB962C8B-B14F-4D97-AF65-F5344CB8AC3E}">
         <p14:creationId xmlns:p14="http://schemas.microsoft.com/office/powerpoint/2010/main" val="1562335774"/>
-      </p:ext>
-    </p:extLst>
-  </p:cSld>
-  <p:clrMapOvr>
-    <a:masterClrMapping/>
-  </p:clrMapOvr>
-</p:sld>
-</file>
-
-<file path=ppt/slides/slide19.xml><?xml version="1.0" encoding="utf-8"?>
-<p:sld xmlns:a="http://schemas.openxmlformats.org/drawingml/2006/main" xmlns:r="http://schemas.openxmlformats.org/officeDocument/2006/relationships" xmlns:p="http://schemas.openxmlformats.org/presentationml/2006/main">
-  <p:cSld>
-    <p:spTree>
-      <p:nvGrpSpPr>
-        <p:cNvPr id="1" name=""/>
-        <p:cNvGrpSpPr/>
-        <p:nvPr/>
-      </p:nvGrpSpPr>
-      <p:grpSpPr>
-        <a:xfrm>
-          <a:off x="0" y="0"/>
-          <a:ext cx="0" cy="0"/>
-          <a:chOff x="0" y="0"/>
-          <a:chExt cx="0" cy="0"/>
-        </a:xfrm>
-      </p:grpSpPr>
-      <p:sp>
-        <p:nvSpPr>
-          <p:cNvPr id="2" name="Titre 1">
-            <a:extLst>
-              <a:ext uri="{FF2B5EF4-FFF2-40B4-BE49-F238E27FC236}">
-                <a16:creationId xmlns:a16="http://schemas.microsoft.com/office/drawing/2014/main" id="{82DCCFCF-06FD-45DE-889A-63E2262D044A}"/>
-              </a:ext>
-            </a:extLst>
-          </p:cNvPr>
-          <p:cNvSpPr>
-            <a:spLocks noGrp="1"/>
-          </p:cNvSpPr>
-          <p:nvPr>
-            <p:ph type="title"/>
-          </p:nvPr>
-        </p:nvSpPr>
-        <p:spPr/>
-        <p:txBody>
-          <a:bodyPr/>
-          <a:lstStyle/>
-          <a:p>
-            <a:r>
-              <a:rPr lang="fr-FR" dirty="0"/>
-              <a:t>Ressources</a:t>
-            </a:r>
-          </a:p>
-        </p:txBody>
-      </p:sp>
-      <p:sp>
-        <p:nvSpPr>
-          <p:cNvPr id="4" name="Rectangle 3">
-            <a:extLst>
-              <a:ext uri="{FF2B5EF4-FFF2-40B4-BE49-F238E27FC236}">
-                <a16:creationId xmlns:a16="http://schemas.microsoft.com/office/drawing/2014/main" id="{E1099CA2-3B5D-41A9-8632-80FC149620A8}"/>
-              </a:ext>
-            </a:extLst>
-          </p:cNvPr>
-          <p:cNvSpPr/>
-          <p:nvPr/>
-        </p:nvSpPr>
-        <p:spPr>
-          <a:xfrm>
-            <a:off x="363984" y="1790948"/>
-            <a:ext cx="9072978" cy="4708981"/>
-          </a:xfrm>
-          <a:prstGeom prst="rect">
-            <a:avLst/>
-          </a:prstGeom>
-        </p:spPr>
-        <p:txBody>
-          <a:bodyPr wrap="square">
-            <a:spAutoFit/>
-          </a:bodyPr>
-          <a:lstStyle/>
-          <a:p>
-            <a:pPr lvl="0" defTabSz="914400" eaLnBrk="0" fontAlgn="base" hangingPunct="0">
-              <a:spcBef>
-                <a:spcPct val="0"/>
-              </a:spcBef>
-              <a:spcAft>
-                <a:spcPct val="0"/>
-              </a:spcAft>
-            </a:pPr>
-            <a:r>
-              <a:rPr lang="fr-FR" altLang="fr-FR" b="1" dirty="0">
-                <a:latin typeface="Arial" panose="020B0604020202020204" pitchFamily="34" charset="0"/>
-                <a:hlinkClick r:id="rId2">
-                  <a:extLst>
-                    <a:ext uri="{A12FA001-AC4F-418D-AE19-62706E023703}">
-                      <ahyp:hlinkClr xmlns:ahyp="http://schemas.microsoft.com/office/drawing/2018/hyperlinkcolor" val="tx"/>
-                    </a:ext>
-                  </a:extLst>
-                </a:hlinkClick>
-              </a:rPr>
-              <a:t>Pour en apprendre plus :</a:t>
-            </a:r>
-          </a:p>
-          <a:p>
-            <a:pPr marL="285750" lvl="0" indent="-285750" defTabSz="914400" eaLnBrk="0" fontAlgn="base" hangingPunct="0">
-              <a:lnSpc>
-                <a:spcPct val="150000"/>
-              </a:lnSpc>
-              <a:spcBef>
-                <a:spcPct val="0"/>
-              </a:spcBef>
-              <a:spcAft>
-                <a:spcPct val="0"/>
-              </a:spcAft>
-              <a:buFont typeface="Courier New" panose="02070309020205020404" pitchFamily="49" charset="0"/>
-              <a:buChar char="o"/>
-            </a:pPr>
-            <a:r>
-              <a:rPr lang="fr-FR" altLang="fr-FR" sz="1600" dirty="0">
-                <a:solidFill>
-                  <a:srgbClr val="0000FF"/>
-                </a:solidFill>
-                <a:latin typeface="Arial" panose="020B0604020202020204" pitchFamily="34" charset="0"/>
-                <a:hlinkClick r:id="rId2">
-                  <a:extLst>
-                    <a:ext uri="{A12FA001-AC4F-418D-AE19-62706E023703}">
-                      <ahyp:hlinkClr xmlns:ahyp="http://schemas.microsoft.com/office/drawing/2018/hyperlinkcolor" val="tx"/>
-                    </a:ext>
-                  </a:extLst>
-                </a:hlinkClick>
-              </a:rPr>
-              <a:t>https://www.jesuisundev.com/comprendre-git-en-7-minutes/</a:t>
-            </a:r>
-            <a:endParaRPr lang="fr-FR" altLang="fr-FR" sz="1600" dirty="0">
-              <a:solidFill>
-                <a:srgbClr val="0000FF"/>
-              </a:solidFill>
-              <a:latin typeface="Arial" panose="020B0604020202020204" pitchFamily="34" charset="0"/>
-            </a:endParaRPr>
-          </a:p>
-          <a:p>
-            <a:pPr marL="285750" lvl="0" indent="-285750" defTabSz="914400" eaLnBrk="0" fontAlgn="base" hangingPunct="0">
-              <a:lnSpc>
-                <a:spcPct val="150000"/>
-              </a:lnSpc>
-              <a:spcBef>
-                <a:spcPct val="0"/>
-              </a:spcBef>
-              <a:spcAft>
-                <a:spcPct val="0"/>
-              </a:spcAft>
-              <a:buFont typeface="Courier New" panose="02070309020205020404" pitchFamily="49" charset="0"/>
-              <a:buChar char="o"/>
-            </a:pPr>
-            <a:r>
-              <a:rPr lang="fr-FR" altLang="fr-FR" sz="1600" dirty="0">
-                <a:latin typeface="Arial" panose="020B0604020202020204" pitchFamily="34" charset="0"/>
-                <a:hlinkClick r:id="rId3"/>
-              </a:rPr>
-              <a:t>https://thinkr.fr/travailler-avec-git-via-rstudio-et-versionner-son-code/#Git_et_RStudio</a:t>
-            </a:r>
-            <a:endParaRPr lang="fr-FR" altLang="fr-FR" sz="1600" dirty="0">
-              <a:latin typeface="Arial" panose="020B0604020202020204" pitchFamily="34" charset="0"/>
-            </a:endParaRPr>
-          </a:p>
-          <a:p>
-            <a:pPr lvl="0" defTabSz="914400" eaLnBrk="0" fontAlgn="base" hangingPunct="0">
-              <a:spcBef>
-                <a:spcPct val="0"/>
-              </a:spcBef>
-              <a:spcAft>
-                <a:spcPct val="0"/>
-              </a:spcAft>
-              <a:buFontTx/>
-              <a:buChar char="•"/>
-            </a:pPr>
-            <a:endParaRPr lang="fr-FR" altLang="fr-FR" dirty="0">
-              <a:latin typeface="Arial" panose="020B0604020202020204" pitchFamily="34" charset="0"/>
-            </a:endParaRPr>
-          </a:p>
-          <a:p>
-            <a:pPr lvl="0" defTabSz="914400" eaLnBrk="0" fontAlgn="base" hangingPunct="0">
-              <a:spcBef>
-                <a:spcPct val="0"/>
-              </a:spcBef>
-              <a:spcAft>
-                <a:spcPct val="0"/>
-              </a:spcAft>
-            </a:pPr>
-            <a:endParaRPr lang="fr-FR" altLang="fr-FR" dirty="0">
-              <a:latin typeface="Arial" panose="020B0604020202020204" pitchFamily="34" charset="0"/>
-            </a:endParaRPr>
-          </a:p>
-          <a:p>
-            <a:pPr lvl="0" defTabSz="914400" eaLnBrk="0" fontAlgn="base" hangingPunct="0">
-              <a:lnSpc>
-                <a:spcPct val="150000"/>
-              </a:lnSpc>
-              <a:spcBef>
-                <a:spcPct val="0"/>
-              </a:spcBef>
-              <a:spcAft>
-                <a:spcPct val="0"/>
-              </a:spcAft>
-            </a:pPr>
-            <a:r>
-              <a:rPr lang="fr-FR" altLang="fr-FR" b="1" u="sng" dirty="0">
-                <a:latin typeface="Arial" panose="020B0604020202020204" pitchFamily="34" charset="0"/>
-              </a:rPr>
-              <a:t>Vidéo pour l’installation, configurations et initialisation de projets :</a:t>
-            </a:r>
-          </a:p>
-          <a:p>
-            <a:pPr lvl="0" defTabSz="914400" eaLnBrk="0" fontAlgn="base" hangingPunct="0">
-              <a:lnSpc>
-                <a:spcPct val="150000"/>
-              </a:lnSpc>
-              <a:spcBef>
-                <a:spcPct val="0"/>
-              </a:spcBef>
-              <a:spcAft>
-                <a:spcPct val="0"/>
-              </a:spcAft>
-            </a:pPr>
-            <a:endParaRPr lang="fr-FR" altLang="fr-FR" dirty="0">
-              <a:latin typeface="Arial" panose="020B0604020202020204" pitchFamily="34" charset="0"/>
-            </a:endParaRPr>
-          </a:p>
-          <a:p>
-            <a:pPr lvl="0" defTabSz="914400" eaLnBrk="0" fontAlgn="base" hangingPunct="0">
-              <a:lnSpc>
-                <a:spcPct val="150000"/>
-              </a:lnSpc>
-              <a:spcBef>
-                <a:spcPct val="0"/>
-              </a:spcBef>
-              <a:spcAft>
-                <a:spcPct val="0"/>
-              </a:spcAft>
-              <a:buFontTx/>
-              <a:buChar char="•"/>
-            </a:pPr>
-            <a:endParaRPr lang="fr-FR" altLang="fr-FR" dirty="0">
-              <a:latin typeface="Arial" panose="020B0604020202020204" pitchFamily="34" charset="0"/>
-            </a:endParaRPr>
-          </a:p>
-          <a:p>
-            <a:pPr lvl="0" defTabSz="914400" eaLnBrk="0" fontAlgn="base" hangingPunct="0">
-              <a:lnSpc>
-                <a:spcPct val="150000"/>
-              </a:lnSpc>
-              <a:spcBef>
-                <a:spcPct val="0"/>
-              </a:spcBef>
-              <a:spcAft>
-                <a:spcPct val="0"/>
-              </a:spcAft>
-              <a:buFontTx/>
-              <a:buChar char="•"/>
-            </a:pPr>
-            <a:endParaRPr lang="fr-FR" altLang="fr-FR" dirty="0">
-              <a:latin typeface="Arial" panose="020B0604020202020204" pitchFamily="34" charset="0"/>
-            </a:endParaRPr>
-          </a:p>
-          <a:p>
-            <a:pPr defTabSz="914400" eaLnBrk="0" fontAlgn="base" hangingPunct="0">
-              <a:lnSpc>
-                <a:spcPct val="150000"/>
-              </a:lnSpc>
-              <a:spcBef>
-                <a:spcPct val="0"/>
-              </a:spcBef>
-              <a:spcAft>
-                <a:spcPct val="0"/>
-              </a:spcAft>
-            </a:pPr>
-            <a:r>
-              <a:rPr lang="fr-FR" altLang="fr-FR" b="1" u="sng" dirty="0">
-                <a:latin typeface="Arial" panose="020B0604020202020204" pitchFamily="34" charset="0"/>
-              </a:rPr>
-              <a:t>Page GitLab de ce projet :</a:t>
-            </a:r>
-          </a:p>
-          <a:p>
-            <a:pPr marL="285750" indent="-285750" defTabSz="914400" eaLnBrk="0" fontAlgn="base" hangingPunct="0">
-              <a:lnSpc>
-                <a:spcPct val="150000"/>
-              </a:lnSpc>
-              <a:spcBef>
-                <a:spcPct val="0"/>
-              </a:spcBef>
-              <a:spcAft>
-                <a:spcPct val="0"/>
-              </a:spcAft>
-              <a:buFont typeface="Courier New" panose="02070309020205020404" pitchFamily="49" charset="0"/>
-              <a:buChar char="o"/>
-            </a:pPr>
-            <a:r>
-              <a:rPr lang="fr-FR" altLang="fr-FR" u="sng" dirty="0">
-                <a:latin typeface="Arial" panose="020B0604020202020204" pitchFamily="34" charset="0"/>
-                <a:hlinkClick r:id="rId4"/>
-              </a:rPr>
-              <a:t>https://gitlab.cirad.fr/benjamin.heuclin/intro_git_sur_rstudio</a:t>
-            </a:r>
-            <a:endParaRPr lang="fr-FR" altLang="fr-FR" u="sng" dirty="0">
-              <a:latin typeface="Arial" panose="020B0604020202020204" pitchFamily="34" charset="0"/>
-            </a:endParaRPr>
-          </a:p>
-          <a:p>
-            <a:pPr lvl="0" defTabSz="914400" eaLnBrk="0" fontAlgn="base" hangingPunct="0">
-              <a:spcBef>
-                <a:spcPct val="0"/>
-              </a:spcBef>
-              <a:spcAft>
-                <a:spcPct val="0"/>
-              </a:spcAft>
-              <a:buFontTx/>
-              <a:buChar char="•"/>
-            </a:pPr>
-            <a:endParaRPr lang="fr-FR" altLang="fr-FR" dirty="0">
-              <a:latin typeface="Arial" panose="020B0604020202020204" pitchFamily="34" charset="0"/>
-            </a:endParaRPr>
-          </a:p>
-          <a:p>
-            <a:pPr lvl="0" defTabSz="914400" eaLnBrk="0" fontAlgn="base" hangingPunct="0">
-              <a:spcBef>
-                <a:spcPct val="0"/>
-              </a:spcBef>
-              <a:spcAft>
-                <a:spcPct val="0"/>
-              </a:spcAft>
-              <a:buFontTx/>
-              <a:buChar char="•"/>
-            </a:pPr>
-            <a:endParaRPr lang="fr-FR" altLang="fr-FR" dirty="0">
-              <a:latin typeface="Arial" panose="020B0604020202020204" pitchFamily="34" charset="0"/>
-            </a:endParaRPr>
-          </a:p>
-        </p:txBody>
-      </p:sp>
-    </p:spTree>
-    <p:extLst>
-      <p:ext uri="{BB962C8B-B14F-4D97-AF65-F5344CB8AC3E}">
-        <p14:creationId xmlns:p14="http://schemas.microsoft.com/office/powerpoint/2010/main" val="2773154443"/>
       </p:ext>
     </p:extLst>
   </p:cSld>
@@ -9192,6 +9167,455 @@
           <p:cNvPr id="2" name="Titre 1">
             <a:extLst>
               <a:ext uri="{FF2B5EF4-FFF2-40B4-BE49-F238E27FC236}">
+                <a16:creationId xmlns:a16="http://schemas.microsoft.com/office/drawing/2014/main" id="{82DCCFCF-06FD-45DE-889A-63E2262D044A}"/>
+              </a:ext>
+            </a:extLst>
+          </p:cNvPr>
+          <p:cNvSpPr>
+            <a:spLocks noGrp="1"/>
+          </p:cNvSpPr>
+          <p:nvPr>
+            <p:ph type="title"/>
+          </p:nvPr>
+        </p:nvSpPr>
+        <p:spPr>
+          <a:xfrm>
+            <a:off x="457200" y="104784"/>
+            <a:ext cx="8229600" cy="1143000"/>
+          </a:xfrm>
+        </p:spPr>
+        <p:txBody>
+          <a:bodyPr/>
+          <a:lstStyle/>
+          <a:p>
+            <a:r>
+              <a:rPr lang="fr-FR" dirty="0"/>
+              <a:t>Ressources</a:t>
+            </a:r>
+          </a:p>
+        </p:txBody>
+      </p:sp>
+      <p:sp>
+        <p:nvSpPr>
+          <p:cNvPr id="4" name="Rectangle 3">
+            <a:extLst>
+              <a:ext uri="{FF2B5EF4-FFF2-40B4-BE49-F238E27FC236}">
+                <a16:creationId xmlns:a16="http://schemas.microsoft.com/office/drawing/2014/main" id="{E1099CA2-3B5D-41A9-8632-80FC149620A8}"/>
+              </a:ext>
+            </a:extLst>
+          </p:cNvPr>
+          <p:cNvSpPr/>
+          <p:nvPr/>
+        </p:nvSpPr>
+        <p:spPr>
+          <a:xfrm>
+            <a:off x="722629" y="1261640"/>
+            <a:ext cx="9072978" cy="5262979"/>
+          </a:xfrm>
+          <a:prstGeom prst="rect">
+            <a:avLst/>
+          </a:prstGeom>
+        </p:spPr>
+        <p:txBody>
+          <a:bodyPr wrap="square">
+            <a:spAutoFit/>
+          </a:bodyPr>
+          <a:lstStyle/>
+          <a:p>
+            <a:pPr lvl="0" defTabSz="914400" eaLnBrk="0" fontAlgn="base" hangingPunct="0">
+              <a:spcBef>
+                <a:spcPct val="0"/>
+              </a:spcBef>
+              <a:spcAft>
+                <a:spcPct val="0"/>
+              </a:spcAft>
+            </a:pPr>
+            <a:r>
+              <a:rPr lang="fr-FR" altLang="fr-FR" b="1" dirty="0">
+                <a:latin typeface="Arial" panose="020B0604020202020204" pitchFamily="34" charset="0"/>
+                <a:hlinkClick r:id="rId2">
+                  <a:extLst>
+                    <a:ext uri="{A12FA001-AC4F-418D-AE19-62706E023703}">
+                      <ahyp:hlinkClr xmlns:ahyp="http://schemas.microsoft.com/office/drawing/2018/hyperlinkcolor" val="tx"/>
+                    </a:ext>
+                  </a:extLst>
+                </a:hlinkClick>
+              </a:rPr>
+              <a:t>Pour en apprendre plus :</a:t>
+            </a:r>
+          </a:p>
+          <a:p>
+            <a:pPr marL="285750" lvl="0" indent="-285750" defTabSz="914400" eaLnBrk="0" fontAlgn="base" hangingPunct="0">
+              <a:spcBef>
+                <a:spcPct val="0"/>
+              </a:spcBef>
+              <a:spcAft>
+                <a:spcPct val="0"/>
+              </a:spcAft>
+              <a:buFont typeface="Courier New" panose="02070309020205020404" pitchFamily="49" charset="0"/>
+              <a:buChar char="o"/>
+            </a:pPr>
+            <a:r>
+              <a:rPr lang="fr-FR" altLang="fr-FR" sz="1600" dirty="0">
+                <a:solidFill>
+                  <a:srgbClr val="0000FF"/>
+                </a:solidFill>
+                <a:latin typeface="Arial" panose="020B0604020202020204" pitchFamily="34" charset="0"/>
+                <a:hlinkClick r:id="rId2">
+                  <a:extLst>
+                    <a:ext uri="{A12FA001-AC4F-418D-AE19-62706E023703}">
+                      <ahyp:hlinkClr xmlns:ahyp="http://schemas.microsoft.com/office/drawing/2018/hyperlinkcolor" val="tx"/>
+                    </a:ext>
+                  </a:extLst>
+                </a:hlinkClick>
+              </a:rPr>
+              <a:t>https://www.jesuisundev.com/comprendre-git-en-7-minutes/</a:t>
+            </a:r>
+            <a:endParaRPr lang="fr-FR" altLang="fr-FR" sz="1600" dirty="0">
+              <a:solidFill>
+                <a:srgbClr val="0000FF"/>
+              </a:solidFill>
+              <a:latin typeface="Arial" panose="020B0604020202020204" pitchFamily="34" charset="0"/>
+            </a:endParaRPr>
+          </a:p>
+          <a:p>
+            <a:pPr marL="285750" lvl="0" indent="-285750" defTabSz="914400" eaLnBrk="0" fontAlgn="base" hangingPunct="0">
+              <a:spcBef>
+                <a:spcPct val="0"/>
+              </a:spcBef>
+              <a:spcAft>
+                <a:spcPct val="0"/>
+              </a:spcAft>
+              <a:buFont typeface="Courier New" panose="02070309020205020404" pitchFamily="49" charset="0"/>
+              <a:buChar char="o"/>
+            </a:pPr>
+            <a:r>
+              <a:rPr lang="fr-FR" altLang="fr-FR" sz="1600" dirty="0">
+                <a:latin typeface="Arial" panose="020B0604020202020204" pitchFamily="34" charset="0"/>
+                <a:hlinkClick r:id="rId3"/>
+              </a:rPr>
+              <a:t>https://thinkr.fr/travailler-avec-git-via-rstudio-et-versionner-son-code/#Git_et_RStudio</a:t>
+            </a:r>
+            <a:endParaRPr lang="fr-FR" altLang="fr-FR" sz="1600" dirty="0">
+              <a:latin typeface="Arial" panose="020B0604020202020204" pitchFamily="34" charset="0"/>
+            </a:endParaRPr>
+          </a:p>
+          <a:p>
+            <a:pPr lvl="0" defTabSz="914400" eaLnBrk="0" fontAlgn="base" hangingPunct="0">
+              <a:lnSpc>
+                <a:spcPct val="150000"/>
+              </a:lnSpc>
+              <a:spcBef>
+                <a:spcPct val="0"/>
+              </a:spcBef>
+              <a:spcAft>
+                <a:spcPct val="0"/>
+              </a:spcAft>
+            </a:pPr>
+            <a:endParaRPr lang="fr-FR" altLang="fr-FR" sz="1600" b="1" u="sng" dirty="0">
+              <a:latin typeface="Arial" panose="020B0604020202020204" pitchFamily="34" charset="0"/>
+            </a:endParaRPr>
+          </a:p>
+          <a:p>
+            <a:pPr lvl="0" defTabSz="914400" eaLnBrk="0" fontAlgn="base" hangingPunct="0">
+              <a:lnSpc>
+                <a:spcPct val="150000"/>
+              </a:lnSpc>
+              <a:spcBef>
+                <a:spcPct val="0"/>
+              </a:spcBef>
+              <a:spcAft>
+                <a:spcPct val="0"/>
+              </a:spcAft>
+            </a:pPr>
+            <a:r>
+              <a:rPr lang="fr-FR" altLang="fr-FR" b="1" u="sng" dirty="0">
+                <a:latin typeface="Arial" panose="020B0604020202020204" pitchFamily="34" charset="0"/>
+              </a:rPr>
+              <a:t>Pour le README :</a:t>
+            </a:r>
+          </a:p>
+          <a:p>
+            <a:pPr marL="285750" indent="-285750">
+              <a:buFont typeface="Courier New" panose="02070309020205020404" pitchFamily="49" charset="0"/>
+              <a:buChar char="o"/>
+            </a:pPr>
+            <a:r>
+              <a:rPr lang="fr-FR" sz="1600" dirty="0">
+                <a:hlinkClick r:id="rId4"/>
+              </a:rPr>
+              <a:t>https://en.wikipedia.org/wiki/README</a:t>
+            </a:r>
+            <a:endParaRPr lang="fr-FR" sz="1600" dirty="0"/>
+          </a:p>
+          <a:p>
+            <a:pPr marL="285750" indent="-285750">
+              <a:buFont typeface="Courier New" panose="02070309020205020404" pitchFamily="49" charset="0"/>
+              <a:buChar char="o"/>
+            </a:pPr>
+            <a:r>
+              <a:rPr lang="fr-FR" sz="1600" dirty="0">
+                <a:hlinkClick r:id="rId5"/>
+              </a:rPr>
+              <a:t>https://www.makeareadme.com/</a:t>
+            </a:r>
+            <a:endParaRPr lang="fr-FR" sz="1600" dirty="0"/>
+          </a:p>
+          <a:p>
+            <a:pPr marL="285750" indent="-285750">
+              <a:buFont typeface="Courier New" panose="02070309020205020404" pitchFamily="49" charset="0"/>
+              <a:buChar char="o"/>
+            </a:pPr>
+            <a:r>
+              <a:rPr lang="fr-FR" sz="1600" dirty="0"/>
+              <a:t>Guide de référence </a:t>
+            </a:r>
+            <a:r>
+              <a:rPr lang="fr-FR" sz="1600" dirty="0" err="1"/>
+              <a:t>Markdown</a:t>
+            </a:r>
+            <a:r>
+              <a:rPr lang="fr-FR" sz="1600" dirty="0"/>
+              <a:t> : </a:t>
+            </a:r>
+            <a:r>
+              <a:rPr lang="fr-FR" sz="1600" dirty="0">
+                <a:hlinkClick r:id="rId6"/>
+              </a:rPr>
+              <a:t>https://commonmark.org/help/</a:t>
+            </a:r>
+            <a:endParaRPr lang="fr-FR" sz="1600" dirty="0"/>
+          </a:p>
+          <a:p>
+            <a:pPr marL="285750" indent="-285750">
+              <a:buFont typeface="Courier New" panose="02070309020205020404" pitchFamily="49" charset="0"/>
+              <a:buChar char="o"/>
+            </a:pPr>
+            <a:endParaRPr lang="fr-FR" altLang="fr-FR" sz="1600" dirty="0">
+              <a:latin typeface="Arial" panose="020B0604020202020204" pitchFamily="34" charset="0"/>
+            </a:endParaRPr>
+          </a:p>
+          <a:p>
+            <a:pPr lvl="0" defTabSz="914400" eaLnBrk="0" fontAlgn="base" hangingPunct="0">
+              <a:lnSpc>
+                <a:spcPct val="150000"/>
+              </a:lnSpc>
+              <a:spcBef>
+                <a:spcPct val="0"/>
+              </a:spcBef>
+              <a:spcAft>
+                <a:spcPct val="0"/>
+              </a:spcAft>
+            </a:pPr>
+            <a:r>
+              <a:rPr lang="fr-FR" altLang="fr-FR" b="1" u="sng" dirty="0">
+                <a:latin typeface="Arial" panose="020B0604020202020204" pitchFamily="34" charset="0"/>
+              </a:rPr>
+              <a:t>Documentation </a:t>
+            </a:r>
+            <a:r>
+              <a:rPr lang="fr-FR" altLang="fr-FR" b="1" u="sng" dirty="0" err="1">
+                <a:latin typeface="Arial" panose="020B0604020202020204" pitchFamily="34" charset="0"/>
+              </a:rPr>
+              <a:t>Cirad</a:t>
+            </a:r>
+            <a:r>
+              <a:rPr lang="fr-FR" altLang="fr-FR" b="1" u="sng" dirty="0">
+                <a:latin typeface="Arial" panose="020B0604020202020204" pitchFamily="34" charset="0"/>
+              </a:rPr>
+              <a:t> </a:t>
+            </a:r>
+            <a:r>
+              <a:rPr lang="fr-FR" altLang="fr-FR" b="1" dirty="0">
+                <a:latin typeface="Arial" panose="020B0604020202020204" pitchFamily="34" charset="0"/>
+              </a:rPr>
+              <a:t>:</a:t>
+            </a:r>
+            <a:r>
+              <a:rPr lang="fr-FR" altLang="fr-FR" dirty="0">
+                <a:latin typeface="Arial" panose="020B0604020202020204" pitchFamily="34" charset="0"/>
+              </a:rPr>
+              <a:t> </a:t>
+            </a:r>
+            <a:r>
+              <a:rPr lang="fr-FR" altLang="fr-FR" sz="1600" dirty="0">
+                <a:latin typeface="Arial" panose="020B0604020202020204" pitchFamily="34" charset="0"/>
+                <a:hlinkClick r:id="rId7"/>
+              </a:rPr>
+              <a:t>https://gitlab.cirad.fr/cirad/documentation   </a:t>
+            </a:r>
+            <a:endParaRPr lang="fr-FR" altLang="fr-FR" sz="1600" dirty="0">
+              <a:latin typeface="Arial" panose="020B0604020202020204" pitchFamily="34" charset="0"/>
+            </a:endParaRPr>
+          </a:p>
+          <a:p>
+            <a:pPr lvl="0" defTabSz="914400" eaLnBrk="0" fontAlgn="base" hangingPunct="0">
+              <a:spcBef>
+                <a:spcPct val="0"/>
+              </a:spcBef>
+              <a:spcAft>
+                <a:spcPct val="0"/>
+              </a:spcAft>
+            </a:pPr>
+            <a:endParaRPr lang="fr-FR" altLang="fr-FR" dirty="0">
+              <a:latin typeface="Arial" panose="020B0604020202020204" pitchFamily="34" charset="0"/>
+            </a:endParaRPr>
+          </a:p>
+          <a:p>
+            <a:pPr lvl="0" defTabSz="914400" eaLnBrk="0" fontAlgn="base" hangingPunct="0">
+              <a:lnSpc>
+                <a:spcPct val="150000"/>
+              </a:lnSpc>
+              <a:spcBef>
+                <a:spcPct val="0"/>
+              </a:spcBef>
+              <a:spcAft>
+                <a:spcPct val="0"/>
+              </a:spcAft>
+            </a:pPr>
+            <a:r>
+              <a:rPr lang="fr-FR" altLang="fr-FR" b="1" u="sng" dirty="0">
+                <a:latin typeface="Arial" panose="020B0604020202020204" pitchFamily="34" charset="0"/>
+              </a:rPr>
+              <a:t>Vidéo d’initialisation de projet :</a:t>
+            </a:r>
+            <a:r>
+              <a:rPr lang="fr-FR" altLang="fr-FR" dirty="0">
+                <a:latin typeface="Arial" panose="020B0604020202020204" pitchFamily="34" charset="0"/>
+              </a:rPr>
+              <a:t> </a:t>
+            </a:r>
+            <a:r>
+              <a:rPr lang="fr-FR" dirty="0">
+                <a:hlinkClick r:id="rId8"/>
+              </a:rPr>
+              <a:t>https://youtu.be/Ly30zu8epwI</a:t>
+            </a:r>
+            <a:endParaRPr lang="fr-FR" dirty="0">
+              <a:latin typeface="Arial" panose="020B0604020202020204" pitchFamily="34" charset="0"/>
+            </a:endParaRPr>
+          </a:p>
+          <a:p>
+            <a:pPr lvl="0" defTabSz="914400" eaLnBrk="0" fontAlgn="base" hangingPunct="0">
+              <a:lnSpc>
+                <a:spcPct val="150000"/>
+              </a:lnSpc>
+              <a:spcBef>
+                <a:spcPct val="0"/>
+              </a:spcBef>
+              <a:spcAft>
+                <a:spcPct val="0"/>
+              </a:spcAft>
+            </a:pPr>
+            <a:endParaRPr lang="fr-FR" altLang="fr-FR" dirty="0">
+              <a:latin typeface="Arial" panose="020B0604020202020204" pitchFamily="34" charset="0"/>
+            </a:endParaRPr>
+          </a:p>
+          <a:p>
+            <a:pPr defTabSz="914400" eaLnBrk="0" fontAlgn="base" hangingPunct="0">
+              <a:spcBef>
+                <a:spcPct val="0"/>
+              </a:spcBef>
+              <a:spcAft>
+                <a:spcPct val="0"/>
+              </a:spcAft>
+            </a:pPr>
+            <a:r>
+              <a:rPr lang="fr-FR" altLang="fr-FR" b="1" u="sng" dirty="0">
+                <a:latin typeface="Arial" panose="020B0604020202020204" pitchFamily="34" charset="0"/>
+              </a:rPr>
+              <a:t>Page GitLab de ce projet :</a:t>
+            </a:r>
+          </a:p>
+          <a:p>
+            <a:pPr marL="285750" indent="-285750" defTabSz="914400" eaLnBrk="0" fontAlgn="base" hangingPunct="0">
+              <a:spcBef>
+                <a:spcPct val="0"/>
+              </a:spcBef>
+              <a:spcAft>
+                <a:spcPct val="0"/>
+              </a:spcAft>
+              <a:buFont typeface="Courier New" panose="02070309020205020404" pitchFamily="49" charset="0"/>
+              <a:buChar char="o"/>
+            </a:pPr>
+            <a:r>
+              <a:rPr lang="fr-FR" altLang="fr-FR" u="sng" dirty="0">
+                <a:latin typeface="Arial" panose="020B0604020202020204" pitchFamily="34" charset="0"/>
+                <a:hlinkClick r:id="rId9"/>
+              </a:rPr>
+              <a:t>https://gitlab.cirad.fr/benjamin.heuclin/intro_git_sur_rstudio</a:t>
+            </a:r>
+            <a:endParaRPr lang="fr-FR" altLang="fr-FR" u="sng" dirty="0">
+              <a:latin typeface="Arial" panose="020B0604020202020204" pitchFamily="34" charset="0"/>
+            </a:endParaRPr>
+          </a:p>
+          <a:p>
+            <a:pPr lvl="0" defTabSz="914400" eaLnBrk="0" fontAlgn="base" hangingPunct="0">
+              <a:spcBef>
+                <a:spcPct val="0"/>
+              </a:spcBef>
+              <a:spcAft>
+                <a:spcPct val="0"/>
+              </a:spcAft>
+              <a:buFontTx/>
+              <a:buChar char="•"/>
+            </a:pPr>
+            <a:endParaRPr lang="fr-FR" altLang="fr-FR" dirty="0">
+              <a:latin typeface="Arial" panose="020B0604020202020204" pitchFamily="34" charset="0"/>
+            </a:endParaRPr>
+          </a:p>
+          <a:p>
+            <a:pPr lvl="0" defTabSz="914400" eaLnBrk="0" fontAlgn="base" hangingPunct="0">
+              <a:spcBef>
+                <a:spcPct val="0"/>
+              </a:spcBef>
+              <a:spcAft>
+                <a:spcPct val="0"/>
+              </a:spcAft>
+              <a:buFontTx/>
+              <a:buChar char="•"/>
+            </a:pPr>
+            <a:endParaRPr lang="fr-FR" altLang="fr-FR" dirty="0">
+              <a:latin typeface="Arial" panose="020B0604020202020204" pitchFamily="34" charset="0"/>
+            </a:endParaRPr>
+          </a:p>
+        </p:txBody>
+      </p:sp>
+    </p:spTree>
+    <p:extLst>
+      <p:ext uri="{BB962C8B-B14F-4D97-AF65-F5344CB8AC3E}">
+        <p14:creationId xmlns:p14="http://schemas.microsoft.com/office/powerpoint/2010/main" val="2773154443"/>
+      </p:ext>
+    </p:extLst>
+  </p:cSld>
+  <p:clrMapOvr>
+    <a:masterClrMapping/>
+  </p:clrMapOvr>
+</p:sld>
+</file>
+
+<file path=ppt/slides/slide21.xml><?xml version="1.0" encoding="utf-8"?>
+<p:sld xmlns:a="http://schemas.openxmlformats.org/drawingml/2006/main" xmlns:r="http://schemas.openxmlformats.org/officeDocument/2006/relationships" xmlns:p="http://schemas.openxmlformats.org/presentationml/2006/main">
+  <p:cSld>
+    <p:spTree>
+      <p:nvGrpSpPr>
+        <p:cNvPr id="1" name=""/>
+        <p:cNvGrpSpPr/>
+        <p:nvPr/>
+      </p:nvGrpSpPr>
+      <p:grpSpPr>
+        <a:xfrm>
+          <a:off x="0" y="0"/>
+          <a:ext cx="0" cy="0"/>
+          <a:chOff x="0" y="0"/>
+          <a:chExt cx="0" cy="0"/>
+        </a:xfrm>
+      </p:grpSpPr>
+      <p:sp>
+        <p:nvSpPr>
+          <p:cNvPr id="2" name="Titre 1">
+            <a:extLst>
+              <a:ext uri="{FF2B5EF4-FFF2-40B4-BE49-F238E27FC236}">
                 <a16:creationId xmlns:a16="http://schemas.microsoft.com/office/drawing/2014/main" id="{2E3698B5-E756-4EAA-96D0-FECA2404539B}"/>
               </a:ext>
             </a:extLst>
@@ -9385,7 +9809,7 @@
             <a:pPr algn="ctr"/>
             <a:r>
               <a:rPr lang="fr-FR" sz="2400" b="1" dirty="0"/>
-              <a:t>Alors passe aux outils collaboratif de versionnage</a:t>
+              <a:t>Alors passe aux outils collaboratifs de versionnage</a:t>
             </a:r>
           </a:p>
           <a:p>
@@ -9561,7 +9985,7 @@
           <a:lstStyle/>
           <a:p>
             <a:r>
-              <a:rPr lang="fr-FR" b="1" dirty="0"/>
+              <a:rPr lang="fr-FR" sz="2000" b="1" dirty="0"/>
               <a:t>Grace à cet outil, tu vas pouvoir :</a:t>
             </a:r>
           </a:p>
@@ -9643,29 +10067,7 @@
                   </a:schemeClr>
                 </a:solidFill>
               </a:rPr>
-              <a:t>Pratique si ton ordi se transforme en </a:t>
-            </a:r>
-            <a:r>
-              <a:rPr lang="fr-FR" sz="1200" dirty="0" err="1">
-                <a:solidFill>
-                  <a:schemeClr val="tx1">
-                    <a:lumMod val="65000"/>
-                    <a:lumOff val="35000"/>
-                  </a:schemeClr>
-                </a:solidFill>
-              </a:rPr>
-              <a:t>barbeuk</a:t>
-            </a:r>
-            <a:r>
-              <a:rPr lang="fr-FR" sz="1200" dirty="0">
-                <a:solidFill>
-                  <a:schemeClr val="tx1">
-                    <a:lumMod val="65000"/>
-                    <a:lumOff val="35000"/>
-                  </a:schemeClr>
-                </a:solidFill>
-              </a:rPr>
-              <a:t> ! 🔥🔥🔥</a:t>
+              <a:t>Pratique si ton ordi se transforme en barbecue ! 🔥🔥🔥</a:t>
             </a:r>
             <a:endParaRPr lang="fr-FR" dirty="0">
               <a:solidFill>
@@ -9828,7 +10230,7 @@
             <a:pPr algn="ctr"/>
             <a:r>
               <a:rPr lang="fr-FR" sz="2800" b="1" dirty="0"/>
-              <a:t>Donc pas d’excuse 😍</a:t>
+              <a:t>Donc pas d’excuse 🤩</a:t>
             </a:r>
           </a:p>
         </p:txBody>
@@ -10020,7 +10422,7 @@
             </a:r>
             <a:r>
               <a:rPr lang="fr-FR" dirty="0"/>
-              <a:t>est un logiciel open source de gestion de version en local</a:t>
+              <a:t>est un logiciel open source de gestion de versions en local</a:t>
             </a:r>
             <a:endParaRPr lang="fr-FR" sz="2000" dirty="0"/>
           </a:p>
@@ -10034,7 +10436,7 @@
             </a:pPr>
             <a:r>
               <a:rPr lang="fr-FR" dirty="0"/>
-              <a:t>Il permet de faire des sauvegarde de ton projet sur ton ordi</a:t>
+              <a:t>Il permet de faire des sauvegardes de ton projet sur ton ordi</a:t>
             </a:r>
           </a:p>
           <a:p>
@@ -10095,7 +10497,7 @@
             </a:r>
             <a:r>
               <a:rPr lang="fr-FR" dirty="0"/>
-              <a:t> est un logiciel open source de gestion de version sur serveur </a:t>
+              <a:t> est un logiciel open source de gestion de versions sur serveur </a:t>
             </a:r>
           </a:p>
           <a:p>
@@ -10112,7 +10514,7 @@
             </a:r>
             <a:r>
               <a:rPr lang="fr-FR" dirty="0"/>
-              <a:t> propose se service : </a:t>
+              <a:t> propose ce service : </a:t>
             </a:r>
             <a:r>
               <a:rPr lang="fr-FR" dirty="0">
@@ -10787,7 +11189,7 @@
         <p:spPr>
           <a:xfrm>
             <a:off x="568910" y="1248962"/>
-            <a:ext cx="8615779" cy="8156079"/>
+            <a:ext cx="8615779" cy="8463855"/>
           </a:xfrm>
           <a:prstGeom prst="rect">
             <a:avLst/>
@@ -10804,7 +11206,53 @@
               <a:rPr lang="fr-FR" sz="2000" b="1" u="sng" dirty="0"/>
               <a:t>Installation de Git :</a:t>
             </a:r>
-            <a:endParaRPr lang="fr-FR" sz="2000" b="1" dirty="0"/>
+            <a:r>
+              <a:rPr lang="fr-FR" sz="2000" dirty="0"/>
+              <a:t>                                               </a:t>
+            </a:r>
+            <a:r>
+              <a:rPr lang="fr-FR" sz="2000" dirty="0">
+                <a:solidFill>
+                  <a:srgbClr val="E84B3C"/>
+                </a:solidFill>
+              </a:rPr>
+              <a:t>-&gt; </a:t>
+            </a:r>
+            <a:r>
+              <a:rPr lang="fr-FR" sz="2000" dirty="0">
+                <a:solidFill>
+                  <a:srgbClr val="E84B3C"/>
+                </a:solidFill>
+                <a:hlinkClick r:id="rId2">
+                  <a:extLst>
+                    <a:ext uri="{A12FA001-AC4F-418D-AE19-62706E023703}">
+                      <ahyp:hlinkClr xmlns:ahyp="http://schemas.microsoft.com/office/drawing/2018/hyperlinkcolor" val="tx"/>
+                    </a:ext>
+                  </a:extLst>
+                </a:hlinkClick>
+              </a:rPr>
+              <a:t>Documentation </a:t>
+            </a:r>
+            <a:r>
+              <a:rPr lang="fr-FR" sz="2000" dirty="0" err="1">
+                <a:solidFill>
+                  <a:srgbClr val="E84B3C"/>
+                </a:solidFill>
+                <a:hlinkClick r:id="rId2">
+                  <a:extLst>
+                    <a:ext uri="{A12FA001-AC4F-418D-AE19-62706E023703}">
+                      <ahyp:hlinkClr xmlns:ahyp="http://schemas.microsoft.com/office/drawing/2018/hyperlinkcolor" val="tx"/>
+                    </a:ext>
+                  </a:extLst>
+                </a:hlinkClick>
+              </a:rPr>
+              <a:t>Cirad</a:t>
+            </a:r>
+            <a:endParaRPr lang="fr-FR" sz="2000" dirty="0">
+              <a:solidFill>
+                <a:srgbClr val="E84B3C"/>
+              </a:solidFill>
+            </a:endParaRPr>
           </a:p>
           <a:p>
             <a:pPr marL="285750" indent="-285750">
@@ -10828,7 +11276,7 @@
             </a:r>
             <a:r>
               <a:rPr lang="fr-FR" sz="1600" dirty="0">
-                <a:hlinkClick r:id="rId2"/>
+                <a:hlinkClick r:id="rId3"/>
               </a:rPr>
               <a:t>http://git-scm.com/download/win</a:t>
             </a:r>
@@ -10848,7 +11296,7 @@
             </a:r>
             <a:r>
               <a:rPr lang="fr-FR" sz="1600" dirty="0">
-                <a:hlinkClick r:id="rId3"/>
+                <a:hlinkClick r:id="rId4"/>
               </a:rPr>
               <a:t>http://git-scm.com/download/mac</a:t>
             </a:r>
@@ -10868,7 +11316,7 @@
             </a:r>
             <a:r>
               <a:rPr lang="fr-FR" sz="1600" dirty="0">
-                <a:hlinkClick r:id="rId4"/>
+                <a:hlinkClick r:id="rId5"/>
               </a:rPr>
               <a:t>https://git-scm.com/book/fr/v2/D%C3%A9marrage-rapide-Installation-de-Git</a:t>
             </a:r>
@@ -10878,10 +11326,18 @@
             <a:endParaRPr lang="fr-FR" dirty="0"/>
           </a:p>
           <a:p>
+            <a:endParaRPr lang="fr-FR" dirty="0"/>
+          </a:p>
+          <a:p>
             <a:r>
               <a:rPr lang="fr-FR" sz="2000" b="1" u="sng" dirty="0"/>
-              <a:t>Configuration de Git (à faire une seul fois) :</a:t>
-            </a:r>
+              <a:t>Configuration de Git (à faire une seule fois) :</a:t>
+            </a:r>
+            <a:r>
+              <a:rPr lang="fr-FR" sz="2000" dirty="0"/>
+              <a:t>    </a:t>
+            </a:r>
+            <a:endParaRPr lang="fr-FR" sz="2000" b="1" u="sng" dirty="0"/>
           </a:p>
           <a:p>
             <a:endParaRPr lang="fr-FR" u="sng" dirty="0"/>
@@ -10910,7 +11366,15 @@
             </a:pPr>
             <a:r>
               <a:rPr lang="fr-FR" dirty="0"/>
-              <a:t>Pour configurer ton nom, il faut rentrer la commande :</a:t>
+              <a:t>Pour configurer ton nom, il faut rentrer la commande</a:t>
+            </a:r>
+            <a:r>
+              <a:rPr lang="fr-FR" sz="1400" dirty="0"/>
+              <a:t> </a:t>
+            </a:r>
+            <a:r>
+              <a:rPr lang="fr-FR" dirty="0"/>
+              <a:t>:</a:t>
             </a:r>
           </a:p>
           <a:p>
@@ -10918,7 +11382,22 @@
               <a:rPr lang="fr-FR" altLang="fr-FR" dirty="0">
                 <a:latin typeface="Arial Unicode MS" panose="020B0604020202020204" pitchFamily="34" charset="-128"/>
               </a:rPr>
-              <a:t>        git config --global user.name "Toto"</a:t>
+              <a:t>        git config --global user.name "</a:t>
+            </a:r>
+            <a:r>
+              <a:rPr lang="fr-FR" altLang="fr-FR" dirty="0">
+                <a:solidFill>
+                  <a:srgbClr val="FF0000"/>
+                </a:solidFill>
+                <a:latin typeface="Arial Unicode MS" panose="020B0604020202020204" pitchFamily="34" charset="-128"/>
+              </a:rPr>
+              <a:t>Prénom Nom</a:t>
+            </a:r>
+            <a:r>
+              <a:rPr lang="fr-FR" altLang="fr-FR" dirty="0">
+                <a:latin typeface="Arial Unicode MS" panose="020B0604020202020204" pitchFamily="34" charset="-128"/>
+              </a:rPr>
+              <a:t>"</a:t>
             </a:r>
             <a:r>
               <a:rPr lang="fr-FR" altLang="fr-FR" sz="800" dirty="0"/>
@@ -10966,7 +11445,22 @@
               <a:rPr lang="fr-FR" altLang="fr-FR" dirty="0">
                 <a:latin typeface="Arial Unicode MS" panose="020B0604020202020204" pitchFamily="34" charset="-128"/>
               </a:rPr>
-              <a:t> "toto@cirad.fr"</a:t>
+              <a:t> "</a:t>
+            </a:r>
+            <a:r>
+              <a:rPr lang="fr-FR" altLang="fr-FR" dirty="0">
+                <a:solidFill>
+                  <a:srgbClr val="FF0000"/>
+                </a:solidFill>
+                <a:latin typeface="Arial Unicode MS" panose="020B0604020202020204" pitchFamily="34" charset="-128"/>
+              </a:rPr>
+              <a:t>email@cirad.fr</a:t>
+            </a:r>
+            <a:r>
+              <a:rPr lang="fr-FR" altLang="fr-FR" dirty="0">
+                <a:latin typeface="Arial Unicode MS" panose="020B0604020202020204" pitchFamily="34" charset="-128"/>
+              </a:rPr>
+              <a:t>"</a:t>
             </a:r>
             <a:r>
               <a:rPr lang="fr-FR" altLang="fr-FR" sz="800" dirty="0"/>
@@ -11098,7 +11592,7 @@
         <p:spPr>
           <a:xfrm>
             <a:off x="457201" y="1136342"/>
-            <a:ext cx="8598022" cy="4893647"/>
+            <a:ext cx="8598022" cy="4924425"/>
           </a:xfrm>
           <a:prstGeom prst="rect">
             <a:avLst/>
@@ -11113,7 +11607,7 @@
           <a:p>
             <a:pPr algn="ctr"/>
             <a:r>
-              <a:rPr lang="fr-FR" b="1" dirty="0"/>
+              <a:rPr lang="fr-FR" sz="2000" b="1" dirty="0"/>
               <a:t>Configuration de la connexion entre ton ordi et le serveur GitLab : </a:t>
             </a:r>
           </a:p>
@@ -11135,13 +11629,7 @@
           <a:p>
             <a:r>
               <a:rPr lang="fr-FR" dirty="0"/>
-              <a:t>Cet étape est à faire une seul fois pour permettre la connexion entre ton ordi et ton compte GitLab. </a:t>
-            </a:r>
-          </a:p>
-          <a:p>
-            <a:r>
-              <a:rPr lang="fr-FR" dirty="0"/>
-              <a:t>Pas besoin de la refaire pour chaque projet.</a:t>
+              <a:t>Cette étape est à faire une seul fois pour permettre la connexion entre ton ordi et ton compte GitLab.  Pas besoin de la refaire pour chaque projet.</a:t>
             </a:r>
             <a:r>
               <a:rPr lang="fr-FR" b="1" dirty="0"/>
@@ -11199,14 +11687,14 @@
             <a:pPr lvl="1"/>
             <a:r>
               <a:rPr lang="fr-FR" sz="1600" dirty="0"/>
-              <a:t>Cette clé sera enregistré sur ton ordi à l’adresse qui est proposée. </a:t>
+              <a:t>Cette clé sera enregistrée sur ton ordi à l’adresse qui est proposée. </a:t>
             </a:r>
           </a:p>
           <a:p>
             <a:pPr lvl="1"/>
             <a:r>
               <a:rPr lang="fr-FR" sz="1600" dirty="0"/>
-              <a:t>Une fois créer, clique sur “</a:t>
+              <a:t>Une fois la clé créée, clique sur “</a:t>
             </a:r>
             <a:r>
               <a:rPr lang="fr-FR" sz="1600" dirty="0" err="1"/>
@@ -11214,7 +11702,7 @@
             </a:r>
             <a:r>
               <a:rPr lang="fr-FR" sz="1600" dirty="0"/>
-              <a:t> public key” et copie le contenue.</a:t>
+              <a:t> public key” et copie le contenu.</a:t>
             </a:r>
           </a:p>
           <a:p>
@@ -11227,15 +11715,7 @@
             </a:pPr>
             <a:r>
               <a:rPr lang="fr-FR" dirty="0"/>
-              <a:t>Ensuite dans </a:t>
-            </a:r>
-            <a:r>
-              <a:rPr lang="fr-FR" dirty="0" err="1"/>
-              <a:t>Gitlab</a:t>
-            </a:r>
-            <a:r>
-              <a:rPr lang="fr-FR" dirty="0"/>
-              <a:t> :</a:t>
+              <a:t>Ensuite dans GitLab :</a:t>
             </a:r>
           </a:p>
           <a:p>
@@ -11254,7 +11734,15 @@
             </a:r>
             <a:r>
               <a:rPr lang="fr-FR" sz="1600" i="1" dirty="0"/>
-              <a:t>&gt; Edit profile &gt; onglet SSH Keys. </a:t>
+              <a:t>&gt; Edit profile &gt; </a:t>
+            </a:r>
+            <a:r>
+              <a:rPr lang="fr-FR" sz="1600" dirty="0"/>
+              <a:t>onglet</a:t>
+            </a:r>
+            <a:r>
+              <a:rPr lang="fr-FR" sz="1600" i="1" dirty="0"/>
+              <a:t> SSH Keys. </a:t>
             </a:r>
           </a:p>
           <a:p>
@@ -11278,6 +11766,44 @@
           </a:p>
           <a:p>
             <a:endParaRPr lang="fr-FR" dirty="0"/>
+          </a:p>
+          <a:p>
+            <a:pPr algn="ctr"/>
+            <a:r>
+              <a:rPr lang="fr-FR" dirty="0">
+                <a:solidFill>
+                  <a:srgbClr val="E84B3C"/>
+                </a:solidFill>
+                <a:hlinkClick r:id="rId2">
+                  <a:extLst>
+                    <a:ext uri="{A12FA001-AC4F-418D-AE19-62706E023703}">
+                      <ahyp:hlinkClr xmlns:ahyp="http://schemas.microsoft.com/office/drawing/2018/hyperlinkcolor" val="tx"/>
+                    </a:ext>
+                  </a:extLst>
+                </a:hlinkClick>
+              </a:rPr>
+              <a:t>-&gt; Documentation </a:t>
+            </a:r>
+            <a:r>
+              <a:rPr lang="fr-FR" dirty="0" err="1">
+                <a:solidFill>
+                  <a:srgbClr val="E84B3C"/>
+                </a:solidFill>
+                <a:hlinkClick r:id="rId2">
+                  <a:extLst>
+                    <a:ext uri="{A12FA001-AC4F-418D-AE19-62706E023703}">
+                      <ahyp:hlinkClr xmlns:ahyp="http://schemas.microsoft.com/office/drawing/2018/hyperlinkcolor" val="tx"/>
+                    </a:ext>
+                  </a:extLst>
+                </a:hlinkClick>
+              </a:rPr>
+              <a:t>Cirad</a:t>
+            </a:r>
+            <a:endParaRPr lang="fr-FR" dirty="0">
+              <a:solidFill>
+                <a:srgbClr val="E84B3C"/>
+              </a:solidFill>
+            </a:endParaRPr>
           </a:p>
         </p:txBody>
       </p:sp>
@@ -11341,8 +11867,13 @@
           <a:p>
             <a:r>
               <a:rPr lang="fr-FR" dirty="0"/>
-              <a:t>Comment on initialiser la connexion avec GitLab ?</a:t>
-            </a:r>
+              <a:t>Comment initialiser Git et GitLab sur </a:t>
+            </a:r>
+            <a:r>
+              <a:rPr lang="fr-FR"/>
+              <a:t>un projet ?</a:t>
+            </a:r>
+            <a:endParaRPr lang="fr-FR" dirty="0"/>
           </a:p>
         </p:txBody>
       </p:sp>
@@ -11361,7 +11892,7 @@
         <p:spPr>
           <a:xfrm>
             <a:off x="781236" y="2461334"/>
-            <a:ext cx="8575828" cy="1703030"/>
+            <a:ext cx="8575828" cy="2534027"/>
           </a:xfrm>
           <a:prstGeom prst="rect">
             <a:avLst/>
@@ -11381,7 +11912,46 @@
             </a:pPr>
             <a:r>
               <a:rPr lang="fr-FR" b="1" u="sng" dirty="0"/>
-              <a:t>Plusieurs cas de figures existes :</a:t>
+              <a:t>Plusieurs cas de figure existent :</a:t>
+            </a:r>
+          </a:p>
+          <a:p>
+            <a:pPr marL="342900" indent="-342900">
+              <a:lnSpc>
+                <a:spcPct val="150000"/>
+              </a:lnSpc>
+              <a:buFont typeface="+mj-lt"/>
+              <a:buAutoNum type="arabicPeriod"/>
+            </a:pPr>
+            <a:r>
+              <a:rPr lang="fr-FR" dirty="0"/>
+              <a:t>Tu veux importer un projet GitLab existant</a:t>
+            </a:r>
+          </a:p>
+          <a:p>
+            <a:pPr marL="342900" indent="-342900">
+              <a:lnSpc>
+                <a:spcPct val="150000"/>
+              </a:lnSpc>
+              <a:buFont typeface="+mj-lt"/>
+              <a:buAutoNum type="arabicPeriod"/>
+            </a:pPr>
+            <a:r>
+              <a:rPr lang="fr-FR" dirty="0"/>
+              <a:t>Tu commences un nouveau projet et tu veux le synchroniser avec GitLab</a:t>
+            </a:r>
+          </a:p>
+          <a:p>
+            <a:pPr marL="342900" indent="-342900">
+              <a:lnSpc>
+                <a:spcPct val="150000"/>
+              </a:lnSpc>
+              <a:buFont typeface="+mj-lt"/>
+              <a:buAutoNum type="arabicPeriod"/>
+            </a:pPr>
+            <a:r>
+              <a:rPr lang="fr-FR" dirty="0"/>
+              <a:t>Tu veux envoyer sur GitLab un projet que tu as déjà sur ton PC</a:t>
             </a:r>
           </a:p>
           <a:p>
@@ -11392,36 +11962,25 @@
               <a:buFont typeface="Courier New" panose="02070309020205020404" pitchFamily="49" charset="0"/>
               <a:buChar char="o"/>
             </a:pPr>
-            <a:r>
-              <a:rPr lang="fr-FR" dirty="0"/>
-              <a:t>Tu veux importer un projet GitLab existant</a:t>
-            </a:r>
-          </a:p>
-          <a:p>
-            <a:pPr marL="285750" indent="-285750">
+            <a:endParaRPr lang="fr-FR" dirty="0"/>
+          </a:p>
+          <a:p>
+            <a:pPr>
               <a:lnSpc>
                 <a:spcPct val="150000"/>
               </a:lnSpc>
-              <a:buFont typeface="Courier New" panose="02070309020205020404" pitchFamily="49" charset="0"/>
-              <a:buChar char="o"/>
             </a:pPr>
             <a:r>
               <a:rPr lang="fr-FR" dirty="0"/>
-              <a:t>Tu commences un nouveau projet et tu veux le synchroniser avec GitLab</a:t>
-            </a:r>
-          </a:p>
-          <a:p>
-            <a:pPr marL="285750" indent="-285750">
-              <a:lnSpc>
-                <a:spcPct val="150000"/>
-              </a:lnSpc>
-              <a:buFont typeface="Courier New" panose="02070309020205020404" pitchFamily="49" charset="0"/>
-              <a:buChar char="o"/>
-            </a:pPr>
-            <a:r>
-              <a:rPr lang="fr-FR" dirty="0"/>
-              <a:t>Tu veux envoyer sur GitLab un projet que tu as déjà sur ton PC</a:t>
-            </a:r>
+              <a:t>Vidéo -&gt; </a:t>
+            </a:r>
+            <a:r>
+              <a:rPr lang="fr-FR" dirty="0">
+                <a:hlinkClick r:id="rId2"/>
+              </a:rPr>
+              <a:t>https://youtu.be/Ly30zu8epwI</a:t>
+            </a:r>
+            <a:endParaRPr lang="fr-FR" dirty="0"/>
           </a:p>
         </p:txBody>
       </p:sp>

</xml_diff>

<commit_message>
Ajout licence et pied de page sur le ppt
</commit_message>
<xml_diff>
--- a/Présentation_gitlab_Rstudio.pptx
+++ b/Présentation_gitlab_Rstudio.pptx
@@ -1,6 +1,6 @@
 
 <file path=ppt/presentation.xml><?xml version="1.0" encoding="utf-8"?>
-<p:presentation xmlns:a="http://schemas.openxmlformats.org/drawingml/2006/main" xmlns:r="http://schemas.openxmlformats.org/officeDocument/2006/relationships" xmlns:p="http://schemas.openxmlformats.org/presentationml/2006/main" saveSubsetFonts="1" autoCompressPictures="0">
+<p:presentation xmlns:a="http://schemas.openxmlformats.org/drawingml/2006/main" xmlns:r="http://schemas.openxmlformats.org/officeDocument/2006/relationships" xmlns:p="http://schemas.openxmlformats.org/presentationml/2006/main" showSpecialPlsOnTitleSld="0" saveSubsetFonts="1" autoCompressPictures="0">
   <p:sldMasterIdLst>
     <p:sldMasterId id="2147483648" r:id="rId1"/>
   </p:sldMasterIdLst>
@@ -12,7 +12,7 @@
   </p:handoutMasterIdLst>
   <p:sldIdLst>
     <p:sldId id="265" r:id="rId2"/>
-    <p:sldId id="272" r:id="rId3"/>
+    <p:sldId id="295" r:id="rId3"/>
     <p:sldId id="274" r:id="rId4"/>
     <p:sldId id="276" r:id="rId5"/>
     <p:sldId id="275" r:id="rId6"/>
@@ -257,7 +257,7 @@
           <a:p>
             <a:fld id="{9710DCA6-C2A9-4977-8F56-0AA0E9DFCD3E}" type="datetimeFigureOut">
               <a:rPr lang="fr-FR" smtClean="0"/>
-              <a:t>01/05/2022</a:t>
+              <a:t>07/06/2022</a:t>
             </a:fld>
             <a:endParaRPr lang="fr-FR"/>
           </a:p>
@@ -422,7 +422,7 @@
           <a:p>
             <a:fld id="{2E37451D-A5B0-4FAB-B03F-77829303E749}" type="datetimeFigureOut">
               <a:rPr lang="fr-FR" smtClean="0"/>
-              <a:t>01/05/2022</a:t>
+              <a:t>07/06/2022</a:t>
             </a:fld>
             <a:endParaRPr lang="fr-FR"/>
           </a:p>
@@ -689,6 +689,426 @@
 </p:notesMaster>
 </file>
 
+<file path=ppt/notesSlides/notesSlide1.xml><?xml version="1.0" encoding="utf-8"?>
+<p:notes xmlns:a="http://schemas.openxmlformats.org/drawingml/2006/main" xmlns:r="http://schemas.openxmlformats.org/officeDocument/2006/relationships" xmlns:p="http://schemas.openxmlformats.org/presentationml/2006/main">
+  <p:cSld>
+    <p:spTree>
+      <p:nvGrpSpPr>
+        <p:cNvPr id="1" name=""/>
+        <p:cNvGrpSpPr/>
+        <p:nvPr/>
+      </p:nvGrpSpPr>
+      <p:grpSpPr>
+        <a:xfrm>
+          <a:off x="0" y="0"/>
+          <a:ext cx="0" cy="0"/>
+          <a:chOff x="0" y="0"/>
+          <a:chExt cx="0" cy="0"/>
+        </a:xfrm>
+      </p:grpSpPr>
+      <p:sp>
+        <p:nvSpPr>
+          <p:cNvPr id="2" name="Espace réservé de l'image des diapositives 1"/>
+          <p:cNvSpPr>
+            <a:spLocks noGrp="1" noRot="1" noChangeAspect="1"/>
+          </p:cNvSpPr>
+          <p:nvPr>
+            <p:ph type="sldImg"/>
+          </p:nvPr>
+        </p:nvSpPr>
+        <p:spPr/>
+      </p:sp>
+      <p:sp>
+        <p:nvSpPr>
+          <p:cNvPr id="3" name="Espace réservé des notes 2"/>
+          <p:cNvSpPr>
+            <a:spLocks noGrp="1"/>
+          </p:cNvSpPr>
+          <p:nvPr>
+            <p:ph type="body" idx="1"/>
+          </p:nvPr>
+        </p:nvSpPr>
+        <p:spPr/>
+        <p:txBody>
+          <a:bodyPr/>
+          <a:lstStyle/>
+          <a:p>
+            <a:endParaRPr lang="fr-FR"/>
+          </a:p>
+        </p:txBody>
+      </p:sp>
+      <p:sp>
+        <p:nvSpPr>
+          <p:cNvPr id="4" name="Espace réservé du numéro de diapositive 3"/>
+          <p:cNvSpPr>
+            <a:spLocks noGrp="1"/>
+          </p:cNvSpPr>
+          <p:nvPr>
+            <p:ph type="sldNum" sz="quarter" idx="5"/>
+          </p:nvPr>
+        </p:nvSpPr>
+        <p:spPr/>
+        <p:txBody>
+          <a:bodyPr/>
+          <a:lstStyle/>
+          <a:p>
+            <a:fld id="{FB590517-EA39-4362-A53C-627CE19DB192}" type="slidenum">
+              <a:rPr lang="fr-FR" smtClean="0"/>
+              <a:t>1</a:t>
+            </a:fld>
+            <a:endParaRPr lang="fr-FR"/>
+          </a:p>
+        </p:txBody>
+      </p:sp>
+    </p:spTree>
+    <p:extLst>
+      <p:ext uri="{BB962C8B-B14F-4D97-AF65-F5344CB8AC3E}">
+        <p14:creationId xmlns:p14="http://schemas.microsoft.com/office/powerpoint/2010/main" val="3409317296"/>
+      </p:ext>
+    </p:extLst>
+  </p:cSld>
+  <p:clrMapOvr>
+    <a:masterClrMapping/>
+  </p:clrMapOvr>
+</p:notes>
+</file>
+
+<file path=ppt/notesSlides/notesSlide2.xml><?xml version="1.0" encoding="utf-8"?>
+<p:notes xmlns:a="http://schemas.openxmlformats.org/drawingml/2006/main" xmlns:r="http://schemas.openxmlformats.org/officeDocument/2006/relationships" xmlns:p="http://schemas.openxmlformats.org/presentationml/2006/main">
+  <p:cSld>
+    <p:spTree>
+      <p:nvGrpSpPr>
+        <p:cNvPr id="1" name=""/>
+        <p:cNvGrpSpPr/>
+        <p:nvPr/>
+      </p:nvGrpSpPr>
+      <p:grpSpPr>
+        <a:xfrm>
+          <a:off x="0" y="0"/>
+          <a:ext cx="0" cy="0"/>
+          <a:chOff x="0" y="0"/>
+          <a:chExt cx="0" cy="0"/>
+        </a:xfrm>
+      </p:grpSpPr>
+      <p:sp>
+        <p:nvSpPr>
+          <p:cNvPr id="2" name="Espace réservé de l'image des diapositives 1"/>
+          <p:cNvSpPr>
+            <a:spLocks noGrp="1" noRot="1" noChangeAspect="1"/>
+          </p:cNvSpPr>
+          <p:nvPr>
+            <p:ph type="sldImg"/>
+          </p:nvPr>
+        </p:nvSpPr>
+        <p:spPr/>
+      </p:sp>
+      <p:sp>
+        <p:nvSpPr>
+          <p:cNvPr id="3" name="Espace réservé des notes 2"/>
+          <p:cNvSpPr>
+            <a:spLocks noGrp="1"/>
+          </p:cNvSpPr>
+          <p:nvPr>
+            <p:ph type="body" idx="1"/>
+          </p:nvPr>
+        </p:nvSpPr>
+        <p:spPr/>
+        <p:txBody>
+          <a:bodyPr/>
+          <a:lstStyle/>
+          <a:p>
+            <a:endParaRPr lang="fr-FR"/>
+          </a:p>
+        </p:txBody>
+      </p:sp>
+      <p:sp>
+        <p:nvSpPr>
+          <p:cNvPr id="4" name="Espace réservé du numéro de diapositive 3"/>
+          <p:cNvSpPr>
+            <a:spLocks noGrp="1"/>
+          </p:cNvSpPr>
+          <p:nvPr>
+            <p:ph type="sldNum" sz="quarter" idx="5"/>
+          </p:nvPr>
+        </p:nvSpPr>
+        <p:spPr/>
+        <p:txBody>
+          <a:bodyPr/>
+          <a:lstStyle/>
+          <a:p>
+            <a:fld id="{FB590517-EA39-4362-A53C-627CE19DB192}" type="slidenum">
+              <a:rPr lang="fr-FR" smtClean="0"/>
+              <a:t>3</a:t>
+            </a:fld>
+            <a:endParaRPr lang="fr-FR"/>
+          </a:p>
+        </p:txBody>
+      </p:sp>
+    </p:spTree>
+    <p:extLst>
+      <p:ext uri="{BB962C8B-B14F-4D97-AF65-F5344CB8AC3E}">
+        <p14:creationId xmlns:p14="http://schemas.microsoft.com/office/powerpoint/2010/main" val="1047800557"/>
+      </p:ext>
+    </p:extLst>
+  </p:cSld>
+  <p:clrMapOvr>
+    <a:masterClrMapping/>
+  </p:clrMapOvr>
+</p:notes>
+</file>
+
+<file path=ppt/notesSlides/notesSlide3.xml><?xml version="1.0" encoding="utf-8"?>
+<p:notes xmlns:a="http://schemas.openxmlformats.org/drawingml/2006/main" xmlns:r="http://schemas.openxmlformats.org/officeDocument/2006/relationships" xmlns:p="http://schemas.openxmlformats.org/presentationml/2006/main">
+  <p:cSld>
+    <p:spTree>
+      <p:nvGrpSpPr>
+        <p:cNvPr id="1" name=""/>
+        <p:cNvGrpSpPr/>
+        <p:nvPr/>
+      </p:nvGrpSpPr>
+      <p:grpSpPr>
+        <a:xfrm>
+          <a:off x="0" y="0"/>
+          <a:ext cx="0" cy="0"/>
+          <a:chOff x="0" y="0"/>
+          <a:chExt cx="0" cy="0"/>
+        </a:xfrm>
+      </p:grpSpPr>
+      <p:sp>
+        <p:nvSpPr>
+          <p:cNvPr id="2" name="Espace réservé de l'image des diapositives 1"/>
+          <p:cNvSpPr>
+            <a:spLocks noGrp="1" noRot="1" noChangeAspect="1"/>
+          </p:cNvSpPr>
+          <p:nvPr>
+            <p:ph type="sldImg"/>
+          </p:nvPr>
+        </p:nvSpPr>
+        <p:spPr/>
+      </p:sp>
+      <p:sp>
+        <p:nvSpPr>
+          <p:cNvPr id="3" name="Espace réservé des notes 2"/>
+          <p:cNvSpPr>
+            <a:spLocks noGrp="1"/>
+          </p:cNvSpPr>
+          <p:nvPr>
+            <p:ph type="body" idx="1"/>
+          </p:nvPr>
+        </p:nvSpPr>
+        <p:spPr/>
+        <p:txBody>
+          <a:bodyPr/>
+          <a:lstStyle/>
+          <a:p>
+            <a:endParaRPr lang="fr-FR"/>
+          </a:p>
+        </p:txBody>
+      </p:sp>
+      <p:sp>
+        <p:nvSpPr>
+          <p:cNvPr id="4" name="Espace réservé du numéro de diapositive 3"/>
+          <p:cNvSpPr>
+            <a:spLocks noGrp="1"/>
+          </p:cNvSpPr>
+          <p:nvPr>
+            <p:ph type="sldNum" sz="quarter" idx="5"/>
+          </p:nvPr>
+        </p:nvSpPr>
+        <p:spPr/>
+        <p:txBody>
+          <a:bodyPr/>
+          <a:lstStyle/>
+          <a:p>
+            <a:fld id="{FB590517-EA39-4362-A53C-627CE19DB192}" type="slidenum">
+              <a:rPr lang="fr-FR" smtClean="0"/>
+              <a:t>4</a:t>
+            </a:fld>
+            <a:endParaRPr lang="fr-FR"/>
+          </a:p>
+        </p:txBody>
+      </p:sp>
+    </p:spTree>
+    <p:extLst>
+      <p:ext uri="{BB962C8B-B14F-4D97-AF65-F5344CB8AC3E}">
+        <p14:creationId xmlns:p14="http://schemas.microsoft.com/office/powerpoint/2010/main" val="4159857264"/>
+      </p:ext>
+    </p:extLst>
+  </p:cSld>
+  <p:clrMapOvr>
+    <a:masterClrMapping/>
+  </p:clrMapOvr>
+</p:notes>
+</file>
+
+<file path=ppt/notesSlides/notesSlide4.xml><?xml version="1.0" encoding="utf-8"?>
+<p:notes xmlns:a="http://schemas.openxmlformats.org/drawingml/2006/main" xmlns:r="http://schemas.openxmlformats.org/officeDocument/2006/relationships" xmlns:p="http://schemas.openxmlformats.org/presentationml/2006/main">
+  <p:cSld>
+    <p:spTree>
+      <p:nvGrpSpPr>
+        <p:cNvPr id="1" name=""/>
+        <p:cNvGrpSpPr/>
+        <p:nvPr/>
+      </p:nvGrpSpPr>
+      <p:grpSpPr>
+        <a:xfrm>
+          <a:off x="0" y="0"/>
+          <a:ext cx="0" cy="0"/>
+          <a:chOff x="0" y="0"/>
+          <a:chExt cx="0" cy="0"/>
+        </a:xfrm>
+      </p:grpSpPr>
+      <p:sp>
+        <p:nvSpPr>
+          <p:cNvPr id="2" name="Espace réservé de l'image des diapositives 1"/>
+          <p:cNvSpPr>
+            <a:spLocks noGrp="1" noRot="1" noChangeAspect="1"/>
+          </p:cNvSpPr>
+          <p:nvPr>
+            <p:ph type="sldImg"/>
+          </p:nvPr>
+        </p:nvSpPr>
+        <p:spPr/>
+      </p:sp>
+      <p:sp>
+        <p:nvSpPr>
+          <p:cNvPr id="3" name="Espace réservé des notes 2"/>
+          <p:cNvSpPr>
+            <a:spLocks noGrp="1"/>
+          </p:cNvSpPr>
+          <p:nvPr>
+            <p:ph type="body" idx="1"/>
+          </p:nvPr>
+        </p:nvSpPr>
+        <p:spPr/>
+        <p:txBody>
+          <a:bodyPr/>
+          <a:lstStyle/>
+          <a:p>
+            <a:endParaRPr lang="fr-FR"/>
+          </a:p>
+        </p:txBody>
+      </p:sp>
+      <p:sp>
+        <p:nvSpPr>
+          <p:cNvPr id="4" name="Espace réservé du numéro de diapositive 3"/>
+          <p:cNvSpPr>
+            <a:spLocks noGrp="1"/>
+          </p:cNvSpPr>
+          <p:nvPr>
+            <p:ph type="sldNum" sz="quarter" idx="5"/>
+          </p:nvPr>
+        </p:nvSpPr>
+        <p:spPr/>
+        <p:txBody>
+          <a:bodyPr/>
+          <a:lstStyle/>
+          <a:p>
+            <a:fld id="{FB590517-EA39-4362-A53C-627CE19DB192}" type="slidenum">
+              <a:rPr lang="fr-FR" smtClean="0"/>
+              <a:t>5</a:t>
+            </a:fld>
+            <a:endParaRPr lang="fr-FR"/>
+          </a:p>
+        </p:txBody>
+      </p:sp>
+    </p:spTree>
+    <p:extLst>
+      <p:ext uri="{BB962C8B-B14F-4D97-AF65-F5344CB8AC3E}">
+        <p14:creationId xmlns:p14="http://schemas.microsoft.com/office/powerpoint/2010/main" val="2068691912"/>
+      </p:ext>
+    </p:extLst>
+  </p:cSld>
+  <p:clrMapOvr>
+    <a:masterClrMapping/>
+  </p:clrMapOvr>
+</p:notes>
+</file>
+
+<file path=ppt/notesSlides/notesSlide5.xml><?xml version="1.0" encoding="utf-8"?>
+<p:notes xmlns:a="http://schemas.openxmlformats.org/drawingml/2006/main" xmlns:r="http://schemas.openxmlformats.org/officeDocument/2006/relationships" xmlns:p="http://schemas.openxmlformats.org/presentationml/2006/main">
+  <p:cSld>
+    <p:spTree>
+      <p:nvGrpSpPr>
+        <p:cNvPr id="1" name=""/>
+        <p:cNvGrpSpPr/>
+        <p:nvPr/>
+      </p:nvGrpSpPr>
+      <p:grpSpPr>
+        <a:xfrm>
+          <a:off x="0" y="0"/>
+          <a:ext cx="0" cy="0"/>
+          <a:chOff x="0" y="0"/>
+          <a:chExt cx="0" cy="0"/>
+        </a:xfrm>
+      </p:grpSpPr>
+      <p:sp>
+        <p:nvSpPr>
+          <p:cNvPr id="2" name="Espace réservé de l'image des diapositives 1"/>
+          <p:cNvSpPr>
+            <a:spLocks noGrp="1" noRot="1" noChangeAspect="1"/>
+          </p:cNvSpPr>
+          <p:nvPr>
+            <p:ph type="sldImg"/>
+          </p:nvPr>
+        </p:nvSpPr>
+        <p:spPr/>
+      </p:sp>
+      <p:sp>
+        <p:nvSpPr>
+          <p:cNvPr id="3" name="Espace réservé des notes 2"/>
+          <p:cNvSpPr>
+            <a:spLocks noGrp="1"/>
+          </p:cNvSpPr>
+          <p:nvPr>
+            <p:ph type="body" idx="1"/>
+          </p:nvPr>
+        </p:nvSpPr>
+        <p:spPr/>
+        <p:txBody>
+          <a:bodyPr/>
+          <a:lstStyle/>
+          <a:p>
+            <a:endParaRPr lang="fr-FR"/>
+          </a:p>
+        </p:txBody>
+      </p:sp>
+      <p:sp>
+        <p:nvSpPr>
+          <p:cNvPr id="4" name="Espace réservé du numéro de diapositive 3"/>
+          <p:cNvSpPr>
+            <a:spLocks noGrp="1"/>
+          </p:cNvSpPr>
+          <p:nvPr>
+            <p:ph type="sldNum" sz="quarter" idx="5"/>
+          </p:nvPr>
+        </p:nvSpPr>
+        <p:spPr/>
+        <p:txBody>
+          <a:bodyPr/>
+          <a:lstStyle/>
+          <a:p>
+            <a:fld id="{FB590517-EA39-4362-A53C-627CE19DB192}" type="slidenum">
+              <a:rPr lang="fr-FR" smtClean="0"/>
+              <a:t>6</a:t>
+            </a:fld>
+            <a:endParaRPr lang="fr-FR"/>
+          </a:p>
+        </p:txBody>
+      </p:sp>
+    </p:spTree>
+    <p:extLst>
+      <p:ext uri="{BB962C8B-B14F-4D97-AF65-F5344CB8AC3E}">
+        <p14:creationId xmlns:p14="http://schemas.microsoft.com/office/powerpoint/2010/main" val="3887723335"/>
+      </p:ext>
+    </p:extLst>
+  </p:cSld>
+  <p:clrMapOvr>
+    <a:masterClrMapping/>
+  </p:clrMapOvr>
+</p:notes>
+</file>
+
 <file path=ppt/slideLayouts/slideLayout1.xml><?xml version="1.0" encoding="utf-8"?>
 <p:sldLayout xmlns:a="http://schemas.openxmlformats.org/drawingml/2006/main" xmlns:r="http://schemas.openxmlformats.org/officeDocument/2006/relationships" xmlns:p="http://schemas.openxmlformats.org/presentationml/2006/main" type="title" preserve="1">
   <p:cSld name="Diapositive de titre">
@@ -882,6 +1302,64 @@
           </a:prstGeom>
         </p:spPr>
       </p:pic>
+      <p:sp>
+        <p:nvSpPr>
+          <p:cNvPr id="6" name="Espace réservé du pied de page 5">
+            <a:extLst>
+              <a:ext uri="{FF2B5EF4-FFF2-40B4-BE49-F238E27FC236}">
+                <a16:creationId xmlns:a16="http://schemas.microsoft.com/office/drawing/2014/main" id="{DE918464-1E52-477F-A86F-441A922529F9}"/>
+              </a:ext>
+            </a:extLst>
+          </p:cNvPr>
+          <p:cNvSpPr>
+            <a:spLocks noGrp="1"/>
+          </p:cNvSpPr>
+          <p:nvPr>
+            <p:ph type="ftr" sz="quarter" idx="10"/>
+          </p:nvPr>
+        </p:nvSpPr>
+        <p:spPr/>
+        <p:txBody>
+          <a:bodyPr/>
+          <a:lstStyle/>
+          <a:p>
+            <a:r>
+              <a:rPr lang="fr-FR"/>
+              <a:t>Benjamin Heuclin, Axe transversal TIM, UPR AÏDA, Cirad</a:t>
+            </a:r>
+            <a:endParaRPr lang="fr-FR" dirty="0"/>
+          </a:p>
+        </p:txBody>
+      </p:sp>
+      <p:sp>
+        <p:nvSpPr>
+          <p:cNvPr id="8" name="Espace réservé du numéro de diapositive 7">
+            <a:extLst>
+              <a:ext uri="{FF2B5EF4-FFF2-40B4-BE49-F238E27FC236}">
+                <a16:creationId xmlns:a16="http://schemas.microsoft.com/office/drawing/2014/main" id="{146E5507-DA58-4C80-B118-C97C52622A4B}"/>
+              </a:ext>
+            </a:extLst>
+          </p:cNvPr>
+          <p:cNvSpPr>
+            <a:spLocks noGrp="1"/>
+          </p:cNvSpPr>
+          <p:nvPr>
+            <p:ph type="sldNum" sz="quarter" idx="11"/>
+          </p:nvPr>
+        </p:nvSpPr>
+        <p:spPr/>
+        <p:txBody>
+          <a:bodyPr/>
+          <a:lstStyle/>
+          <a:p>
+            <a:fld id="{7161DBD5-FC76-3842-B5FF-1B83B7554A96}" type="slidenum">
+              <a:rPr lang="fr-FR" smtClean="0"/>
+              <a:t>‹N°›</a:t>
+            </a:fld>
+            <a:endParaRPr lang="fr-FR"/>
+          </a:p>
+        </p:txBody>
+      </p:sp>
     </p:spTree>
   </p:cSld>
   <p:clrMapOvr>
@@ -944,7 +1422,10 @@
           <a:bodyPr/>
           <a:lstStyle/>
           <a:p>
-            <a:endParaRPr lang="fr-FR"/>
+            <a:r>
+              <a:rPr lang="fr-FR"/>
+              <a:t>Benjamin Heuclin, Axe transversal TIM, UPR AÏDA, Cirad</a:t>
+            </a:r>
           </a:p>
         </p:txBody>
       </p:sp>
@@ -1196,10 +1677,6 @@
           <a:bodyPr/>
           <a:lstStyle/>
           <a:p>
-            <a:fld id="{141AC103-C553-3C40-80D1-8D13FB31BDBA}" type="datetimeFigureOut">
-              <a:rPr lang="fr-FR" smtClean="0"/>
-              <a:t>01/05/2022</a:t>
-            </a:fld>
             <a:endParaRPr lang="fr-FR"/>
           </a:p>
         </p:txBody>
@@ -1219,7 +1696,10 @@
           <a:bodyPr/>
           <a:lstStyle/>
           <a:p>
-            <a:endParaRPr lang="fr-FR"/>
+            <a:r>
+              <a:rPr lang="fr-FR"/>
+              <a:t>Benjamin Heuclin, Axe transversal TIM, UPR AÏDA, Cirad</a:t>
+            </a:r>
           </a:p>
         </p:txBody>
       </p:sp>
@@ -1536,7 +2016,10 @@
           <a:bodyPr/>
           <a:lstStyle/>
           <a:p>
-            <a:endParaRPr lang="fr-FR"/>
+            <a:r>
+              <a:rPr lang="fr-FR"/>
+              <a:t>Benjamin Heuclin, Axe transversal TIM, UPR AÏDA, Cirad</a:t>
+            </a:r>
           </a:p>
         </p:txBody>
       </p:sp>
@@ -1963,7 +2446,10 @@
           <a:bodyPr/>
           <a:lstStyle/>
           <a:p>
-            <a:endParaRPr lang="fr-FR"/>
+            <a:r>
+              <a:rPr lang="fr-FR"/>
+              <a:t>Benjamin Heuclin, Axe transversal TIM, UPR AÏDA, Cirad</a:t>
+            </a:r>
           </a:p>
         </p:txBody>
       </p:sp>
@@ -2076,7 +2562,10 @@
           <a:bodyPr/>
           <a:lstStyle/>
           <a:p>
-            <a:endParaRPr lang="fr-FR"/>
+            <a:r>
+              <a:rPr lang="fr-FR"/>
+              <a:t>Benjamin Heuclin, Axe transversal TIM, UPR AÏDA, Cirad</a:t>
+            </a:r>
           </a:p>
         </p:txBody>
       </p:sp>
@@ -2167,7 +2656,10 @@
           <a:bodyPr/>
           <a:lstStyle/>
           <a:p>
-            <a:endParaRPr lang="fr-FR"/>
+            <a:r>
+              <a:rPr lang="fr-FR"/>
+              <a:t>Benjamin Heuclin, Axe transversal TIM, UPR AÏDA, Cirad</a:t>
+            </a:r>
           </a:p>
         </p:txBody>
       </p:sp>
@@ -2420,7 +2912,10 @@
           <a:bodyPr/>
           <a:lstStyle/>
           <a:p>
-            <a:endParaRPr lang="fr-FR"/>
+            <a:r>
+              <a:rPr lang="fr-FR"/>
+              <a:t>Benjamin Heuclin, Axe transversal TIM, UPR AÏDA, Cirad</a:t>
+            </a:r>
           </a:p>
         </p:txBody>
       </p:sp>
@@ -2650,7 +3145,10 @@
           <a:bodyPr/>
           <a:lstStyle/>
           <a:p>
-            <a:endParaRPr lang="fr-FR"/>
+            <a:r>
+              <a:rPr lang="fr-FR"/>
+              <a:t>Benjamin Heuclin, Axe transversal TIM, UPR AÏDA, Cirad</a:t>
+            </a:r>
           </a:p>
         </p:txBody>
       </p:sp>
@@ -2772,6 +3270,10 @@
             </a:lvl1pPr>
           </a:lstStyle>
           <a:p>
+            <a:r>
+              <a:rPr lang="fr-FR"/>
+              <a:t>Benjamin Heuclin, Axe transversal TIM, UPR AÏDA, Cirad</a:t>
+            </a:r>
             <a:endParaRPr lang="fr-FR" dirty="0"/>
           </a:p>
         </p:txBody>
@@ -2927,6 +3429,7 @@
     <p:sldLayoutId id="2147483656" r:id="rId8"/>
     <p:sldLayoutId id="2147483657" r:id="rId9"/>
   </p:sldLayoutIdLst>
+  <p:hf hdr="0" dt="0"/>
   <p:txStyles>
     <p:titleStyle>
       <a:lvl1pPr algn="ctr" defTabSz="457200" rtl="0" eaLnBrk="1" latinLnBrk="0" hangingPunct="1">
@@ -3253,7 +3756,7 @@
           <p:nvPr/>
         </p:nvPicPr>
         <p:blipFill>
-          <a:blip r:embed="rId2"/>
+          <a:blip r:embed="rId3"/>
           <a:stretch>
             <a:fillRect/>
           </a:stretch>
@@ -3277,7 +3780,7 @@
           <p:nvPr/>
         </p:nvPicPr>
         <p:blipFill>
-          <a:blip r:embed="rId3" cstate="screen">
+          <a:blip r:embed="rId4" cstate="screen">
             <a:extLst>
               <a:ext uri="{28A0092B-C50C-407E-A947-70E740481C1C}">
                 <a14:useLocalDpi xmlns:a14="http://schemas.microsoft.com/office/drawing/2010/main"/>
@@ -3313,7 +3816,7 @@
           <p:nvPr/>
         </p:nvPicPr>
         <p:blipFill>
-          <a:blip r:embed="rId4" cstate="screen">
+          <a:blip r:embed="rId5" cstate="screen">
             <a:extLst>
               <a:ext uri="{28A0092B-C50C-407E-A947-70E740481C1C}">
                 <a14:useLocalDpi xmlns:a14="http://schemas.microsoft.com/office/drawing/2010/main"/>
@@ -3389,10 +3892,10 @@
           <p:nvPr/>
         </p:nvPicPr>
         <p:blipFill>
-          <a:blip r:embed="rId5">
+          <a:blip r:embed="rId6">
             <a:extLst>
               <a:ext uri="{96DAC541-7B7A-43D3-8B79-37D633B846F1}">
-                <asvg:svgBlip xmlns:asvg="http://schemas.microsoft.com/office/drawing/2016/SVG/main" r:embed="rId6"/>
+                <asvg:svgBlip xmlns:asvg="http://schemas.microsoft.com/office/drawing/2016/SVG/main" r:embed="rId7"/>
               </a:ext>
             </a:extLst>
           </a:blip>
@@ -3424,8 +3927,8 @@
         </p:nvSpPr>
         <p:spPr>
           <a:xfrm>
-            <a:off x="491501" y="5795792"/>
-            <a:ext cx="8160996" cy="1015663"/>
+            <a:off x="491501" y="5408586"/>
+            <a:ext cx="8160996" cy="1323439"/>
           </a:xfrm>
           <a:prstGeom prst="rect">
             <a:avLst/>
@@ -3443,21 +3946,25 @@
               <a:rPr lang="fr-FR" sz="2000" b="1" dirty="0"/>
               <a:t>Benjamin Heuclin</a:t>
             </a:r>
+          </a:p>
+          <a:p>
+            <a:pPr lvl="1" algn="ctr"/>
             <a:r>
               <a:rPr lang="fr-FR" sz="2000" dirty="0"/>
-              <a:t>, </a:t>
+              <a:t>Axe transversal TIM </a:t>
             </a:r>
           </a:p>
           <a:p>
             <a:pPr lvl="1" algn="ctr"/>
+            <a:r>
+              <a:rPr lang="fr-FR" sz="2000" dirty="0"/>
+              <a:t>UPR AÏDA, </a:t>
+            </a:r>
             <a:r>
               <a:rPr lang="fr-FR" sz="2000" dirty="0" err="1"/>
               <a:t>Cirad</a:t>
             </a:r>
-            <a:r>
-              <a:rPr lang="fr-FR" sz="2000" dirty="0"/>
-              <a:t>, UPR AÏDA</a:t>
-            </a:r>
+            <a:endParaRPr lang="fr-FR" sz="2000" dirty="0"/>
           </a:p>
           <a:p>
             <a:pPr lvl="1" algn="ctr"/>
@@ -3469,6 +3976,36 @@
           </a:p>
         </p:txBody>
       </p:sp>
+      <p:pic>
+        <p:nvPicPr>
+          <p:cNvPr id="6" name="Image 5">
+            <a:extLst>
+              <a:ext uri="{FF2B5EF4-FFF2-40B4-BE49-F238E27FC236}">
+                <a16:creationId xmlns:a16="http://schemas.microsoft.com/office/drawing/2014/main" id="{8B99A946-930B-4D25-86D0-BEA93BE685E6}"/>
+              </a:ext>
+            </a:extLst>
+          </p:cNvPr>
+          <p:cNvPicPr>
+            <a:picLocks noChangeAspect="1"/>
+          </p:cNvPicPr>
+          <p:nvPr/>
+        </p:nvPicPr>
+        <p:blipFill>
+          <a:blip r:embed="rId8"/>
+          <a:stretch>
+            <a:fillRect/>
+          </a:stretch>
+        </p:blipFill>
+        <p:spPr>
+          <a:xfrm>
+            <a:off x="8165607" y="6436750"/>
+            <a:ext cx="838200" cy="295275"/>
+          </a:xfrm>
+          <a:prstGeom prst="rect">
+            <a:avLst/>
+          </a:prstGeom>
+        </p:spPr>
+      </p:pic>
     </p:spTree>
     <p:extLst>
       <p:ext uri="{BB962C8B-B14F-4D97-AF65-F5344CB8AC3E}">
@@ -3960,6 +4497,73 @@
           </p:style>
         </p:cxnSp>
       </p:grpSp>
+      <p:sp>
+        <p:nvSpPr>
+          <p:cNvPr id="14" name="Espace réservé du numéro de diapositive 13">
+            <a:extLst>
+              <a:ext uri="{FF2B5EF4-FFF2-40B4-BE49-F238E27FC236}">
+                <a16:creationId xmlns:a16="http://schemas.microsoft.com/office/drawing/2014/main" id="{A0DAA14A-5D32-4505-8E23-D6D119EB1A0D}"/>
+              </a:ext>
+            </a:extLst>
+          </p:cNvPr>
+          <p:cNvSpPr>
+            <a:spLocks noGrp="1"/>
+          </p:cNvSpPr>
+          <p:nvPr>
+            <p:ph type="sldNum" sz="quarter" idx="12"/>
+          </p:nvPr>
+        </p:nvSpPr>
+        <p:spPr/>
+        <p:txBody>
+          <a:bodyPr/>
+          <a:lstStyle/>
+          <a:p>
+            <a:fld id="{7161DBD5-FC76-3842-B5FF-1B83B7554A96}" type="slidenum">
+              <a:rPr lang="fr-FR" smtClean="0"/>
+              <a:t>10</a:t>
+            </a:fld>
+            <a:endParaRPr lang="fr-FR"/>
+          </a:p>
+        </p:txBody>
+      </p:sp>
+      <p:sp>
+        <p:nvSpPr>
+          <p:cNvPr id="16" name="Espace réservé du pied de page 1">
+            <a:extLst>
+              <a:ext uri="{FF2B5EF4-FFF2-40B4-BE49-F238E27FC236}">
+                <a16:creationId xmlns:a16="http://schemas.microsoft.com/office/drawing/2014/main" id="{BAB4F378-51C4-4333-9DF7-6001C95596DE}"/>
+              </a:ext>
+            </a:extLst>
+          </p:cNvPr>
+          <p:cNvSpPr>
+            <a:spLocks noGrp="1"/>
+          </p:cNvSpPr>
+          <p:nvPr>
+            <p:ph type="ftr" sz="quarter" idx="11"/>
+          </p:nvPr>
+        </p:nvSpPr>
+        <p:spPr>
+          <a:xfrm>
+            <a:off x="2383283" y="6501691"/>
+            <a:ext cx="4377431" cy="365125"/>
+          </a:xfrm>
+        </p:spPr>
+        <p:txBody>
+          <a:bodyPr/>
+          <a:lstStyle/>
+          <a:p>
+            <a:r>
+              <a:rPr lang="fr-FR" dirty="0"/>
+              <a:t>Benjamin Heuclin, Axe transversal TIM, UPR AÏDA, </a:t>
+            </a:r>
+            <a:r>
+              <a:rPr lang="fr-FR" dirty="0" err="1"/>
+              <a:t>Cirad</a:t>
+            </a:r>
+            <a:endParaRPr lang="fr-FR" dirty="0"/>
+          </a:p>
+        </p:txBody>
+      </p:sp>
     </p:spTree>
     <p:extLst>
       <p:ext uri="{BB962C8B-B14F-4D97-AF65-F5344CB8AC3E}">
@@ -4103,6 +4707,73 @@
               <a:rPr lang="fr-FR" dirty="0"/>
               <a:t>Maintenant, le projet existe sur GitLab (il est vide), tu peux donc le cloner sur ton PC en suivant la procédure précédente</a:t>
             </a:r>
+          </a:p>
+        </p:txBody>
+      </p:sp>
+      <p:sp>
+        <p:nvSpPr>
+          <p:cNvPr id="7" name="Espace réservé du numéro de diapositive 6">
+            <a:extLst>
+              <a:ext uri="{FF2B5EF4-FFF2-40B4-BE49-F238E27FC236}">
+                <a16:creationId xmlns:a16="http://schemas.microsoft.com/office/drawing/2014/main" id="{77D3DD6A-D177-4FB5-9DF1-C70C924F7F99}"/>
+              </a:ext>
+            </a:extLst>
+          </p:cNvPr>
+          <p:cNvSpPr>
+            <a:spLocks noGrp="1"/>
+          </p:cNvSpPr>
+          <p:nvPr>
+            <p:ph type="sldNum" sz="quarter" idx="12"/>
+          </p:nvPr>
+        </p:nvSpPr>
+        <p:spPr/>
+        <p:txBody>
+          <a:bodyPr/>
+          <a:lstStyle/>
+          <a:p>
+            <a:fld id="{7161DBD5-FC76-3842-B5FF-1B83B7554A96}" type="slidenum">
+              <a:rPr lang="fr-FR" smtClean="0"/>
+              <a:t>11</a:t>
+            </a:fld>
+            <a:endParaRPr lang="fr-FR"/>
+          </a:p>
+        </p:txBody>
+      </p:sp>
+      <p:sp>
+        <p:nvSpPr>
+          <p:cNvPr id="8" name="Espace réservé du pied de page 1">
+            <a:extLst>
+              <a:ext uri="{FF2B5EF4-FFF2-40B4-BE49-F238E27FC236}">
+                <a16:creationId xmlns:a16="http://schemas.microsoft.com/office/drawing/2014/main" id="{85620C00-22BD-4861-9996-43486376F8F1}"/>
+              </a:ext>
+            </a:extLst>
+          </p:cNvPr>
+          <p:cNvSpPr>
+            <a:spLocks noGrp="1"/>
+          </p:cNvSpPr>
+          <p:nvPr>
+            <p:ph type="ftr" sz="quarter" idx="11"/>
+          </p:nvPr>
+        </p:nvSpPr>
+        <p:spPr>
+          <a:xfrm>
+            <a:off x="2383283" y="6501691"/>
+            <a:ext cx="4377431" cy="365125"/>
+          </a:xfrm>
+        </p:spPr>
+        <p:txBody>
+          <a:bodyPr/>
+          <a:lstStyle/>
+          <a:p>
+            <a:r>
+              <a:rPr lang="fr-FR" dirty="0"/>
+              <a:t>Benjamin Heuclin, Axe transversal TIM, UPR AÏDA, </a:t>
+            </a:r>
+            <a:r>
+              <a:rPr lang="fr-FR" dirty="0" err="1"/>
+              <a:t>Cirad</a:t>
+            </a:r>
+            <a:endParaRPr lang="fr-FR" dirty="0"/>
           </a:p>
         </p:txBody>
       </p:sp>
@@ -4352,7 +5023,16 @@
                 </a:solidFill>
                 <a:latin typeface="Arial Unicode MS" panose="020B0604020202020204" pitchFamily="34" charset="-128"/>
               </a:rPr>
-              <a:t> ssh://git@gitlab.cirad.fr:2022/benjamin.heuclin/mon_projet.git </a:t>
+              <a:t> </a:t>
+            </a:r>
+            <a:r>
+              <a:rPr lang="fr-FR" altLang="fr-FR" sz="1600" dirty="0">
+                <a:solidFill>
+                  <a:srgbClr val="FF0000"/>
+                </a:solidFill>
+                <a:latin typeface="Arial Unicode MS" panose="020B0604020202020204" pitchFamily="34" charset="-128"/>
+              </a:rPr>
+              <a:t>ssh://git@gitlab.cirad.fr:2022/benjamin.heuclin/mon_projet.git </a:t>
             </a:r>
           </a:p>
           <a:p>
@@ -4661,6 +5341,73 @@
               <a:t>Rproj</a:t>
             </a:r>
             <a:endParaRPr lang="fr-FR" b="1" dirty="0"/>
+          </a:p>
+        </p:txBody>
+      </p:sp>
+      <p:sp>
+        <p:nvSpPr>
+          <p:cNvPr id="9" name="Espace réservé du numéro de diapositive 8">
+            <a:extLst>
+              <a:ext uri="{FF2B5EF4-FFF2-40B4-BE49-F238E27FC236}">
+                <a16:creationId xmlns:a16="http://schemas.microsoft.com/office/drawing/2014/main" id="{70F8E7B1-8687-4CCA-B310-06D41A32C6CE}"/>
+              </a:ext>
+            </a:extLst>
+          </p:cNvPr>
+          <p:cNvSpPr>
+            <a:spLocks noGrp="1"/>
+          </p:cNvSpPr>
+          <p:nvPr>
+            <p:ph type="sldNum" sz="quarter" idx="12"/>
+          </p:nvPr>
+        </p:nvSpPr>
+        <p:spPr/>
+        <p:txBody>
+          <a:bodyPr/>
+          <a:lstStyle/>
+          <a:p>
+            <a:fld id="{7161DBD5-FC76-3842-B5FF-1B83B7554A96}" type="slidenum">
+              <a:rPr lang="fr-FR" smtClean="0"/>
+              <a:t>12</a:t>
+            </a:fld>
+            <a:endParaRPr lang="fr-FR"/>
+          </a:p>
+        </p:txBody>
+      </p:sp>
+      <p:sp>
+        <p:nvSpPr>
+          <p:cNvPr id="10" name="Espace réservé du pied de page 1">
+            <a:extLst>
+              <a:ext uri="{FF2B5EF4-FFF2-40B4-BE49-F238E27FC236}">
+                <a16:creationId xmlns:a16="http://schemas.microsoft.com/office/drawing/2014/main" id="{771AB4DA-34D7-4F10-B9DB-45FBBE78C093}"/>
+              </a:ext>
+            </a:extLst>
+          </p:cNvPr>
+          <p:cNvSpPr>
+            <a:spLocks noGrp="1"/>
+          </p:cNvSpPr>
+          <p:nvPr>
+            <p:ph type="ftr" sz="quarter" idx="11"/>
+          </p:nvPr>
+        </p:nvSpPr>
+        <p:spPr>
+          <a:xfrm>
+            <a:off x="2383283" y="6501691"/>
+            <a:ext cx="4377431" cy="365125"/>
+          </a:xfrm>
+        </p:spPr>
+        <p:txBody>
+          <a:bodyPr/>
+          <a:lstStyle/>
+          <a:p>
+            <a:r>
+              <a:rPr lang="fr-FR" dirty="0"/>
+              <a:t>Benjamin Heuclin, Axe transversal TIM, UPR AÏDA, </a:t>
+            </a:r>
+            <a:r>
+              <a:rPr lang="fr-FR" dirty="0" err="1"/>
+              <a:t>Cirad</a:t>
+            </a:r>
+            <a:endParaRPr lang="fr-FR" dirty="0"/>
           </a:p>
         </p:txBody>
       </p:sp>
@@ -4816,6 +5563,73 @@
           <a:p>
             <a:pPr algn="ctr"/>
             <a:endParaRPr lang="fr-FR"/>
+          </a:p>
+        </p:txBody>
+      </p:sp>
+      <p:sp>
+        <p:nvSpPr>
+          <p:cNvPr id="7" name="Espace réservé du numéro de diapositive 6">
+            <a:extLst>
+              <a:ext uri="{FF2B5EF4-FFF2-40B4-BE49-F238E27FC236}">
+                <a16:creationId xmlns:a16="http://schemas.microsoft.com/office/drawing/2014/main" id="{3D72E764-ACA1-4FE9-A518-12D18CF3BCE2}"/>
+              </a:ext>
+            </a:extLst>
+          </p:cNvPr>
+          <p:cNvSpPr>
+            <a:spLocks noGrp="1"/>
+          </p:cNvSpPr>
+          <p:nvPr>
+            <p:ph type="sldNum" sz="quarter" idx="12"/>
+          </p:nvPr>
+        </p:nvSpPr>
+        <p:spPr/>
+        <p:txBody>
+          <a:bodyPr/>
+          <a:lstStyle/>
+          <a:p>
+            <a:fld id="{7161DBD5-FC76-3842-B5FF-1B83B7554A96}" type="slidenum">
+              <a:rPr lang="fr-FR" smtClean="0"/>
+              <a:t>13</a:t>
+            </a:fld>
+            <a:endParaRPr lang="fr-FR"/>
+          </a:p>
+        </p:txBody>
+      </p:sp>
+      <p:sp>
+        <p:nvSpPr>
+          <p:cNvPr id="9" name="Espace réservé du pied de page 1">
+            <a:extLst>
+              <a:ext uri="{FF2B5EF4-FFF2-40B4-BE49-F238E27FC236}">
+                <a16:creationId xmlns:a16="http://schemas.microsoft.com/office/drawing/2014/main" id="{D3C6D61A-A254-47FD-ACF0-38D403CCFF9D}"/>
+              </a:ext>
+            </a:extLst>
+          </p:cNvPr>
+          <p:cNvSpPr>
+            <a:spLocks noGrp="1"/>
+          </p:cNvSpPr>
+          <p:nvPr>
+            <p:ph type="ftr" sz="quarter" idx="11"/>
+          </p:nvPr>
+        </p:nvSpPr>
+        <p:spPr>
+          <a:xfrm>
+            <a:off x="2383283" y="6501691"/>
+            <a:ext cx="4377431" cy="365125"/>
+          </a:xfrm>
+        </p:spPr>
+        <p:txBody>
+          <a:bodyPr/>
+          <a:lstStyle/>
+          <a:p>
+            <a:r>
+              <a:rPr lang="fr-FR" dirty="0"/>
+              <a:t>Benjamin Heuclin, Axe transversal TIM, UPR AÏDA, </a:t>
+            </a:r>
+            <a:r>
+              <a:rPr lang="fr-FR" dirty="0" err="1"/>
+              <a:t>Cirad</a:t>
+            </a:r>
+            <a:endParaRPr lang="fr-FR" dirty="0"/>
           </a:p>
         </p:txBody>
       </p:sp>
@@ -5293,6 +6107,73 @@
           </p:txBody>
         </p:sp>
       </p:grpSp>
+      <p:sp>
+        <p:nvSpPr>
+          <p:cNvPr id="11" name="Espace réservé du numéro de diapositive 10">
+            <a:extLst>
+              <a:ext uri="{FF2B5EF4-FFF2-40B4-BE49-F238E27FC236}">
+                <a16:creationId xmlns:a16="http://schemas.microsoft.com/office/drawing/2014/main" id="{CD602134-51DF-444F-8BD0-C98FF64997A6}"/>
+              </a:ext>
+            </a:extLst>
+          </p:cNvPr>
+          <p:cNvSpPr>
+            <a:spLocks noGrp="1"/>
+          </p:cNvSpPr>
+          <p:nvPr>
+            <p:ph type="sldNum" sz="quarter" idx="12"/>
+          </p:nvPr>
+        </p:nvSpPr>
+        <p:spPr/>
+        <p:txBody>
+          <a:bodyPr/>
+          <a:lstStyle/>
+          <a:p>
+            <a:fld id="{7161DBD5-FC76-3842-B5FF-1B83B7554A96}" type="slidenum">
+              <a:rPr lang="fr-FR" smtClean="0"/>
+              <a:t>14</a:t>
+            </a:fld>
+            <a:endParaRPr lang="fr-FR"/>
+          </a:p>
+        </p:txBody>
+      </p:sp>
+      <p:sp>
+        <p:nvSpPr>
+          <p:cNvPr id="12" name="Espace réservé du pied de page 1">
+            <a:extLst>
+              <a:ext uri="{FF2B5EF4-FFF2-40B4-BE49-F238E27FC236}">
+                <a16:creationId xmlns:a16="http://schemas.microsoft.com/office/drawing/2014/main" id="{1E3CC604-6836-431F-BFF6-1BC4989E32A4}"/>
+              </a:ext>
+            </a:extLst>
+          </p:cNvPr>
+          <p:cNvSpPr>
+            <a:spLocks noGrp="1"/>
+          </p:cNvSpPr>
+          <p:nvPr>
+            <p:ph type="ftr" sz="quarter" idx="11"/>
+          </p:nvPr>
+        </p:nvSpPr>
+        <p:spPr>
+          <a:xfrm>
+            <a:off x="2383283" y="6501691"/>
+            <a:ext cx="4377431" cy="365125"/>
+          </a:xfrm>
+        </p:spPr>
+        <p:txBody>
+          <a:bodyPr/>
+          <a:lstStyle/>
+          <a:p>
+            <a:r>
+              <a:rPr lang="fr-FR" dirty="0"/>
+              <a:t>Benjamin Heuclin, Axe transversal TIM, UPR AÏDA, </a:t>
+            </a:r>
+            <a:r>
+              <a:rPr lang="fr-FR" dirty="0" err="1"/>
+              <a:t>Cirad</a:t>
+            </a:r>
+            <a:endParaRPr lang="fr-FR" dirty="0"/>
+          </a:p>
+        </p:txBody>
+      </p:sp>
     </p:spTree>
     <p:extLst>
       <p:ext uri="{BB962C8B-B14F-4D97-AF65-F5344CB8AC3E}">
@@ -5575,6 +6456,73 @@
           </a:p>
         </p:txBody>
       </p:sp>
+      <p:sp>
+        <p:nvSpPr>
+          <p:cNvPr id="7" name="Espace réservé du numéro de diapositive 6">
+            <a:extLst>
+              <a:ext uri="{FF2B5EF4-FFF2-40B4-BE49-F238E27FC236}">
+                <a16:creationId xmlns:a16="http://schemas.microsoft.com/office/drawing/2014/main" id="{0B4F6A61-57DA-4B63-BAAE-9B28E9FCC42F}"/>
+              </a:ext>
+            </a:extLst>
+          </p:cNvPr>
+          <p:cNvSpPr>
+            <a:spLocks noGrp="1"/>
+          </p:cNvSpPr>
+          <p:nvPr>
+            <p:ph type="sldNum" sz="quarter" idx="12"/>
+          </p:nvPr>
+        </p:nvSpPr>
+        <p:spPr/>
+        <p:txBody>
+          <a:bodyPr/>
+          <a:lstStyle/>
+          <a:p>
+            <a:fld id="{7161DBD5-FC76-3842-B5FF-1B83B7554A96}" type="slidenum">
+              <a:rPr lang="fr-FR" smtClean="0"/>
+              <a:t>15</a:t>
+            </a:fld>
+            <a:endParaRPr lang="fr-FR"/>
+          </a:p>
+        </p:txBody>
+      </p:sp>
+      <p:sp>
+        <p:nvSpPr>
+          <p:cNvPr id="8" name="Espace réservé du pied de page 1">
+            <a:extLst>
+              <a:ext uri="{FF2B5EF4-FFF2-40B4-BE49-F238E27FC236}">
+                <a16:creationId xmlns:a16="http://schemas.microsoft.com/office/drawing/2014/main" id="{B14BE380-7F9B-497C-A936-F236871E1280}"/>
+              </a:ext>
+            </a:extLst>
+          </p:cNvPr>
+          <p:cNvSpPr>
+            <a:spLocks noGrp="1"/>
+          </p:cNvSpPr>
+          <p:nvPr>
+            <p:ph type="ftr" sz="quarter" idx="11"/>
+          </p:nvPr>
+        </p:nvSpPr>
+        <p:spPr>
+          <a:xfrm>
+            <a:off x="2383283" y="6501691"/>
+            <a:ext cx="4377431" cy="365125"/>
+          </a:xfrm>
+        </p:spPr>
+        <p:txBody>
+          <a:bodyPr/>
+          <a:lstStyle/>
+          <a:p>
+            <a:r>
+              <a:rPr lang="fr-FR" dirty="0"/>
+              <a:t>Benjamin Heuclin, Axe transversal TIM, UPR AÏDA, </a:t>
+            </a:r>
+            <a:r>
+              <a:rPr lang="fr-FR" dirty="0" err="1"/>
+              <a:t>Cirad</a:t>
+            </a:r>
+            <a:endParaRPr lang="fr-FR" dirty="0"/>
+          </a:p>
+        </p:txBody>
+      </p:sp>
     </p:spTree>
     <p:extLst>
       <p:ext uri="{BB962C8B-B14F-4D97-AF65-F5344CB8AC3E}">
@@ -5585,364 +6533,6 @@
   <p:clrMapOvr>
     <a:masterClrMapping/>
   </p:clrMapOvr>
-  <p:timing>
-    <p:tnLst>
-      <p:par>
-        <p:cTn id="1" dur="indefinite" restart="never" nodeType="tmRoot">
-          <p:childTnLst>
-            <p:seq concurrent="1" nextAc="seek">
-              <p:cTn id="2" dur="indefinite" nodeType="mainSeq">
-                <p:childTnLst>
-                  <p:par>
-                    <p:cTn id="3" fill="hold">
-                      <p:stCondLst>
-                        <p:cond delay="indefinite"/>
-                      </p:stCondLst>
-                      <p:childTnLst>
-                        <p:par>
-                          <p:cTn id="4" fill="hold">
-                            <p:stCondLst>
-                              <p:cond delay="0"/>
-                            </p:stCondLst>
-                            <p:childTnLst>
-                              <p:par>
-                                <p:cTn id="5" presetID="1" presetClass="entr" presetSubtype="0" fill="hold" nodeType="clickEffect">
-                                  <p:stCondLst>
-                                    <p:cond delay="0"/>
-                                  </p:stCondLst>
-                                  <p:childTnLst>
-                                    <p:set>
-                                      <p:cBhvr>
-                                        <p:cTn id="6" dur="1" fill="hold">
-                                          <p:stCondLst>
-                                            <p:cond delay="0"/>
-                                          </p:stCondLst>
-                                        </p:cTn>
-                                        <p:tgtEl>
-                                          <p:spTgt spid="3">
-                                            <p:txEl>
-                                              <p:pRg st="1" end="1"/>
-                                            </p:txEl>
-                                          </p:spTgt>
-                                        </p:tgtEl>
-                                        <p:attrNameLst>
-                                          <p:attrName>style.visibility</p:attrName>
-                                        </p:attrNameLst>
-                                      </p:cBhvr>
-                                      <p:to>
-                                        <p:strVal val="visible"/>
-                                      </p:to>
-                                    </p:set>
-                                  </p:childTnLst>
-                                </p:cTn>
-                              </p:par>
-                              <p:par>
-                                <p:cTn id="7" presetID="1" presetClass="entr" presetSubtype="0" fill="hold" nodeType="withEffect">
-                                  <p:stCondLst>
-                                    <p:cond delay="0"/>
-                                  </p:stCondLst>
-                                  <p:childTnLst>
-                                    <p:set>
-                                      <p:cBhvr>
-                                        <p:cTn id="8" dur="1" fill="hold">
-                                          <p:stCondLst>
-                                            <p:cond delay="0"/>
-                                          </p:stCondLst>
-                                        </p:cTn>
-                                        <p:tgtEl>
-                                          <p:spTgt spid="3">
-                                            <p:txEl>
-                                              <p:pRg st="2" end="2"/>
-                                            </p:txEl>
-                                          </p:spTgt>
-                                        </p:tgtEl>
-                                        <p:attrNameLst>
-                                          <p:attrName>style.visibility</p:attrName>
-                                        </p:attrNameLst>
-                                      </p:cBhvr>
-                                      <p:to>
-                                        <p:strVal val="visible"/>
-                                      </p:to>
-                                    </p:set>
-                                  </p:childTnLst>
-                                </p:cTn>
-                              </p:par>
-                              <p:par>
-                                <p:cTn id="9" presetID="1" presetClass="entr" presetSubtype="0" fill="hold" nodeType="withEffect">
-                                  <p:stCondLst>
-                                    <p:cond delay="0"/>
-                                  </p:stCondLst>
-                                  <p:childTnLst>
-                                    <p:set>
-                                      <p:cBhvr>
-                                        <p:cTn id="10" dur="1" fill="hold">
-                                          <p:stCondLst>
-                                            <p:cond delay="0"/>
-                                          </p:stCondLst>
-                                        </p:cTn>
-                                        <p:tgtEl>
-                                          <p:spTgt spid="3">
-                                            <p:txEl>
-                                              <p:pRg st="3" end="3"/>
-                                            </p:txEl>
-                                          </p:spTgt>
-                                        </p:tgtEl>
-                                        <p:attrNameLst>
-                                          <p:attrName>style.visibility</p:attrName>
-                                        </p:attrNameLst>
-                                      </p:cBhvr>
-                                      <p:to>
-                                        <p:strVal val="visible"/>
-                                      </p:to>
-                                    </p:set>
-                                  </p:childTnLst>
-                                </p:cTn>
-                              </p:par>
-                              <p:par>
-                                <p:cTn id="11" presetID="1" presetClass="entr" presetSubtype="0" fill="hold" nodeType="withEffect">
-                                  <p:stCondLst>
-                                    <p:cond delay="0"/>
-                                  </p:stCondLst>
-                                  <p:childTnLst>
-                                    <p:set>
-                                      <p:cBhvr>
-                                        <p:cTn id="12" dur="1" fill="hold">
-                                          <p:stCondLst>
-                                            <p:cond delay="0"/>
-                                          </p:stCondLst>
-                                        </p:cTn>
-                                        <p:tgtEl>
-                                          <p:spTgt spid="3">
-                                            <p:txEl>
-                                              <p:pRg st="4" end="4"/>
-                                            </p:txEl>
-                                          </p:spTgt>
-                                        </p:tgtEl>
-                                        <p:attrNameLst>
-                                          <p:attrName>style.visibility</p:attrName>
-                                        </p:attrNameLst>
-                                      </p:cBhvr>
-                                      <p:to>
-                                        <p:strVal val="visible"/>
-                                      </p:to>
-                                    </p:set>
-                                  </p:childTnLst>
-                                </p:cTn>
-                              </p:par>
-                              <p:par>
-                                <p:cTn id="13" presetID="1" presetClass="entr" presetSubtype="0" fill="hold" nodeType="withEffect">
-                                  <p:stCondLst>
-                                    <p:cond delay="0"/>
-                                  </p:stCondLst>
-                                  <p:childTnLst>
-                                    <p:set>
-                                      <p:cBhvr>
-                                        <p:cTn id="14" dur="1" fill="hold">
-                                          <p:stCondLst>
-                                            <p:cond delay="0"/>
-                                          </p:stCondLst>
-                                        </p:cTn>
-                                        <p:tgtEl>
-                                          <p:spTgt spid="3">
-                                            <p:txEl>
-                                              <p:pRg st="5" end="5"/>
-                                            </p:txEl>
-                                          </p:spTgt>
-                                        </p:tgtEl>
-                                        <p:attrNameLst>
-                                          <p:attrName>style.visibility</p:attrName>
-                                        </p:attrNameLst>
-                                      </p:cBhvr>
-                                      <p:to>
-                                        <p:strVal val="visible"/>
-                                      </p:to>
-                                    </p:set>
-                                  </p:childTnLst>
-                                </p:cTn>
-                              </p:par>
-                              <p:par>
-                                <p:cTn id="15" presetID="1" presetClass="entr" presetSubtype="0" fill="hold" nodeType="withEffect">
-                                  <p:stCondLst>
-                                    <p:cond delay="0"/>
-                                  </p:stCondLst>
-                                  <p:childTnLst>
-                                    <p:set>
-                                      <p:cBhvr>
-                                        <p:cTn id="16" dur="1" fill="hold">
-                                          <p:stCondLst>
-                                            <p:cond delay="0"/>
-                                          </p:stCondLst>
-                                        </p:cTn>
-                                        <p:tgtEl>
-                                          <p:spTgt spid="3">
-                                            <p:txEl>
-                                              <p:pRg st="6" end="6"/>
-                                            </p:txEl>
-                                          </p:spTgt>
-                                        </p:tgtEl>
-                                        <p:attrNameLst>
-                                          <p:attrName>style.visibility</p:attrName>
-                                        </p:attrNameLst>
-                                      </p:cBhvr>
-                                      <p:to>
-                                        <p:strVal val="visible"/>
-                                      </p:to>
-                                    </p:set>
-                                  </p:childTnLst>
-                                </p:cTn>
-                              </p:par>
-                              <p:par>
-                                <p:cTn id="17" presetID="1" presetClass="entr" presetSubtype="0" fill="hold" nodeType="withEffect">
-                                  <p:stCondLst>
-                                    <p:cond delay="0"/>
-                                  </p:stCondLst>
-                                  <p:childTnLst>
-                                    <p:set>
-                                      <p:cBhvr>
-                                        <p:cTn id="18" dur="1" fill="hold">
-                                          <p:stCondLst>
-                                            <p:cond delay="0"/>
-                                          </p:stCondLst>
-                                        </p:cTn>
-                                        <p:tgtEl>
-                                          <p:spTgt spid="3">
-                                            <p:txEl>
-                                              <p:pRg st="8" end="8"/>
-                                            </p:txEl>
-                                          </p:spTgt>
-                                        </p:tgtEl>
-                                        <p:attrNameLst>
-                                          <p:attrName>style.visibility</p:attrName>
-                                        </p:attrNameLst>
-                                      </p:cBhvr>
-                                      <p:to>
-                                        <p:strVal val="visible"/>
-                                      </p:to>
-                                    </p:set>
-                                  </p:childTnLst>
-                                </p:cTn>
-                              </p:par>
-                              <p:par>
-                                <p:cTn id="19" presetID="1" presetClass="entr" presetSubtype="0" fill="hold" nodeType="withEffect">
-                                  <p:stCondLst>
-                                    <p:cond delay="0"/>
-                                  </p:stCondLst>
-                                  <p:childTnLst>
-                                    <p:set>
-                                      <p:cBhvr>
-                                        <p:cTn id="20" dur="1" fill="hold">
-                                          <p:stCondLst>
-                                            <p:cond delay="0"/>
-                                          </p:stCondLst>
-                                        </p:cTn>
-                                        <p:tgtEl>
-                                          <p:spTgt spid="3">
-                                            <p:txEl>
-                                              <p:pRg st="9" end="9"/>
-                                            </p:txEl>
-                                          </p:spTgt>
-                                        </p:tgtEl>
-                                        <p:attrNameLst>
-                                          <p:attrName>style.visibility</p:attrName>
-                                        </p:attrNameLst>
-                                      </p:cBhvr>
-                                      <p:to>
-                                        <p:strVal val="visible"/>
-                                      </p:to>
-                                    </p:set>
-                                  </p:childTnLst>
-                                </p:cTn>
-                              </p:par>
-                              <p:par>
-                                <p:cTn id="21" presetID="1" presetClass="entr" presetSubtype="0" fill="hold" nodeType="withEffect">
-                                  <p:stCondLst>
-                                    <p:cond delay="0"/>
-                                  </p:stCondLst>
-                                  <p:childTnLst>
-                                    <p:set>
-                                      <p:cBhvr>
-                                        <p:cTn id="22" dur="1" fill="hold">
-                                          <p:stCondLst>
-                                            <p:cond delay="0"/>
-                                          </p:stCondLst>
-                                        </p:cTn>
-                                        <p:tgtEl>
-                                          <p:spTgt spid="3">
-                                            <p:txEl>
-                                              <p:pRg st="10" end="10"/>
-                                            </p:txEl>
-                                          </p:spTgt>
-                                        </p:tgtEl>
-                                        <p:attrNameLst>
-                                          <p:attrName>style.visibility</p:attrName>
-                                        </p:attrNameLst>
-                                      </p:cBhvr>
-                                      <p:to>
-                                        <p:strVal val="visible"/>
-                                      </p:to>
-                                    </p:set>
-                                  </p:childTnLst>
-                                </p:cTn>
-                              </p:par>
-                              <p:par>
-                                <p:cTn id="23" presetID="1" presetClass="entr" presetSubtype="0" fill="hold" nodeType="withEffect">
-                                  <p:stCondLst>
-                                    <p:cond delay="0"/>
-                                  </p:stCondLst>
-                                  <p:childTnLst>
-                                    <p:set>
-                                      <p:cBhvr>
-                                        <p:cTn id="24" dur="1" fill="hold">
-                                          <p:stCondLst>
-                                            <p:cond delay="0"/>
-                                          </p:stCondLst>
-                                        </p:cTn>
-                                        <p:tgtEl>
-                                          <p:spTgt spid="3">
-                                            <p:txEl>
-                                              <p:pRg st="11" end="11"/>
-                                            </p:txEl>
-                                          </p:spTgt>
-                                        </p:tgtEl>
-                                        <p:attrNameLst>
-                                          <p:attrName>style.visibility</p:attrName>
-                                        </p:attrNameLst>
-                                      </p:cBhvr>
-                                      <p:to>
-                                        <p:strVal val="visible"/>
-                                      </p:to>
-                                    </p:set>
-                                  </p:childTnLst>
-                                </p:cTn>
-                              </p:par>
-                            </p:childTnLst>
-                          </p:cTn>
-                        </p:par>
-                      </p:childTnLst>
-                    </p:cTn>
-                  </p:par>
-                </p:childTnLst>
-              </p:cTn>
-              <p:prevCondLst>
-                <p:cond evt="onPrev" delay="0">
-                  <p:tgtEl>
-                    <p:sldTgt/>
-                  </p:tgtEl>
-                </p:cond>
-              </p:prevCondLst>
-              <p:nextCondLst>
-                <p:cond evt="onNext" delay="0">
-                  <p:tgtEl>
-                    <p:sldTgt/>
-                  </p:tgtEl>
-                </p:cond>
-              </p:nextCondLst>
-            </p:seq>
-          </p:childTnLst>
-        </p:cTn>
-      </p:par>
-    </p:tnLst>
-  </p:timing>
 </p:sld>
 </file>
 
@@ -6671,6 +7261,137 @@
               <a:rPr lang="fr-FR" sz="1050" dirty="0"/>
               <a:t>)</a:t>
             </a:r>
+          </a:p>
+        </p:txBody>
+      </p:sp>
+      <p:sp>
+        <p:nvSpPr>
+          <p:cNvPr id="18" name="Espace réservé du pied de page 1">
+            <a:extLst>
+              <a:ext uri="{FF2B5EF4-FFF2-40B4-BE49-F238E27FC236}">
+                <a16:creationId xmlns:a16="http://schemas.microsoft.com/office/drawing/2014/main" id="{AE485E0E-B415-4287-AC0F-732A4A5BF80B}"/>
+              </a:ext>
+            </a:extLst>
+          </p:cNvPr>
+          <p:cNvSpPr txBox="1">
+            <a:spLocks/>
+          </p:cNvSpPr>
+          <p:nvPr/>
+        </p:nvSpPr>
+        <p:spPr>
+          <a:xfrm>
+            <a:off x="2383283" y="6535624"/>
+            <a:ext cx="4377431" cy="365125"/>
+          </a:xfrm>
+          <a:prstGeom prst="rect">
+            <a:avLst/>
+          </a:prstGeom>
+        </p:spPr>
+        <p:txBody>
+          <a:bodyPr vert="horz" lIns="91440" tIns="45720" rIns="91440" bIns="45720" rtlCol="0" anchor="ctr"/>
+          <a:lstStyle>
+            <a:defPPr>
+              <a:defRPr lang="fr-FR"/>
+            </a:defPPr>
+            <a:lvl1pPr marL="0" algn="r" defTabSz="457200" rtl="0" eaLnBrk="1" latinLnBrk="0" hangingPunct="1">
+              <a:defRPr sz="1200" kern="1200">
+                <a:solidFill>
+                  <a:schemeClr val="tx1">
+                    <a:tint val="75000"/>
+                  </a:schemeClr>
+                </a:solidFill>
+                <a:latin typeface="+mn-lt"/>
+                <a:ea typeface="+mn-ea"/>
+                <a:cs typeface="+mn-cs"/>
+              </a:defRPr>
+            </a:lvl1pPr>
+            <a:lvl2pPr marL="457200" algn="l" defTabSz="457200" rtl="0" eaLnBrk="1" latinLnBrk="0" hangingPunct="1">
+              <a:defRPr sz="1800" kern="1200">
+                <a:solidFill>
+                  <a:schemeClr val="tx1"/>
+                </a:solidFill>
+                <a:latin typeface="+mn-lt"/>
+                <a:ea typeface="+mn-ea"/>
+                <a:cs typeface="+mn-cs"/>
+              </a:defRPr>
+            </a:lvl2pPr>
+            <a:lvl3pPr marL="914400" algn="l" defTabSz="457200" rtl="0" eaLnBrk="1" latinLnBrk="0" hangingPunct="1">
+              <a:defRPr sz="1800" kern="1200">
+                <a:solidFill>
+                  <a:schemeClr val="tx1"/>
+                </a:solidFill>
+                <a:latin typeface="+mn-lt"/>
+                <a:ea typeface="+mn-ea"/>
+                <a:cs typeface="+mn-cs"/>
+              </a:defRPr>
+            </a:lvl3pPr>
+            <a:lvl4pPr marL="1371600" algn="l" defTabSz="457200" rtl="0" eaLnBrk="1" latinLnBrk="0" hangingPunct="1">
+              <a:defRPr sz="1800" kern="1200">
+                <a:solidFill>
+                  <a:schemeClr val="tx1"/>
+                </a:solidFill>
+                <a:latin typeface="+mn-lt"/>
+                <a:ea typeface="+mn-ea"/>
+                <a:cs typeface="+mn-cs"/>
+              </a:defRPr>
+            </a:lvl4pPr>
+            <a:lvl5pPr marL="1828800" algn="l" defTabSz="457200" rtl="0" eaLnBrk="1" latinLnBrk="0" hangingPunct="1">
+              <a:defRPr sz="1800" kern="1200">
+                <a:solidFill>
+                  <a:schemeClr val="tx1"/>
+                </a:solidFill>
+                <a:latin typeface="+mn-lt"/>
+                <a:ea typeface="+mn-ea"/>
+                <a:cs typeface="+mn-cs"/>
+              </a:defRPr>
+            </a:lvl5pPr>
+            <a:lvl6pPr marL="2286000" algn="l" defTabSz="457200" rtl="0" eaLnBrk="1" latinLnBrk="0" hangingPunct="1">
+              <a:defRPr sz="1800" kern="1200">
+                <a:solidFill>
+                  <a:schemeClr val="tx1"/>
+                </a:solidFill>
+                <a:latin typeface="+mn-lt"/>
+                <a:ea typeface="+mn-ea"/>
+                <a:cs typeface="+mn-cs"/>
+              </a:defRPr>
+            </a:lvl6pPr>
+            <a:lvl7pPr marL="2743200" algn="l" defTabSz="457200" rtl="0" eaLnBrk="1" latinLnBrk="0" hangingPunct="1">
+              <a:defRPr sz="1800" kern="1200">
+                <a:solidFill>
+                  <a:schemeClr val="tx1"/>
+                </a:solidFill>
+                <a:latin typeface="+mn-lt"/>
+                <a:ea typeface="+mn-ea"/>
+                <a:cs typeface="+mn-cs"/>
+              </a:defRPr>
+            </a:lvl7pPr>
+            <a:lvl8pPr marL="3200400" algn="l" defTabSz="457200" rtl="0" eaLnBrk="1" latinLnBrk="0" hangingPunct="1">
+              <a:defRPr sz="1800" kern="1200">
+                <a:solidFill>
+                  <a:schemeClr val="tx1"/>
+                </a:solidFill>
+                <a:latin typeface="+mn-lt"/>
+                <a:ea typeface="+mn-ea"/>
+                <a:cs typeface="+mn-cs"/>
+              </a:defRPr>
+            </a:lvl8pPr>
+            <a:lvl9pPr marL="3657600" algn="l" defTabSz="457200" rtl="0" eaLnBrk="1" latinLnBrk="0" hangingPunct="1">
+              <a:defRPr sz="1800" kern="1200">
+                <a:solidFill>
+                  <a:schemeClr val="tx1"/>
+                </a:solidFill>
+                <a:latin typeface="+mn-lt"/>
+                <a:ea typeface="+mn-ea"/>
+                <a:cs typeface="+mn-cs"/>
+              </a:defRPr>
+            </a:lvl9pPr>
+          </a:lstStyle>
+          <a:p>
+            <a:r>
+              <a:rPr lang="fr-FR"/>
+              <a:t>Benjamin Heuclin, Axe transversal TIM, UPR AÏDA, Cirad</a:t>
+            </a:r>
+            <a:endParaRPr lang="fr-FR" dirty="0"/>
           </a:p>
         </p:txBody>
       </p:sp>
@@ -7902,6 +8623,137 @@
               <a:rPr lang="fr-FR" sz="1050" dirty="0"/>
               <a:t>)</a:t>
             </a:r>
+          </a:p>
+        </p:txBody>
+      </p:sp>
+      <p:sp>
+        <p:nvSpPr>
+          <p:cNvPr id="17" name="Espace réservé du pied de page 1">
+            <a:extLst>
+              <a:ext uri="{FF2B5EF4-FFF2-40B4-BE49-F238E27FC236}">
+                <a16:creationId xmlns:a16="http://schemas.microsoft.com/office/drawing/2014/main" id="{4F6E73AA-8E86-4DBD-8310-F072C23781E3}"/>
+              </a:ext>
+            </a:extLst>
+          </p:cNvPr>
+          <p:cNvSpPr txBox="1">
+            <a:spLocks/>
+          </p:cNvSpPr>
+          <p:nvPr/>
+        </p:nvSpPr>
+        <p:spPr>
+          <a:xfrm>
+            <a:off x="2395986" y="6546494"/>
+            <a:ext cx="4377431" cy="365125"/>
+          </a:xfrm>
+          <a:prstGeom prst="rect">
+            <a:avLst/>
+          </a:prstGeom>
+        </p:spPr>
+        <p:txBody>
+          <a:bodyPr vert="horz" lIns="91440" tIns="45720" rIns="91440" bIns="45720" rtlCol="0" anchor="ctr"/>
+          <a:lstStyle>
+            <a:defPPr>
+              <a:defRPr lang="fr-FR"/>
+            </a:defPPr>
+            <a:lvl1pPr marL="0" algn="r" defTabSz="457200" rtl="0" eaLnBrk="1" latinLnBrk="0" hangingPunct="1">
+              <a:defRPr sz="1200" kern="1200">
+                <a:solidFill>
+                  <a:schemeClr val="tx1">
+                    <a:tint val="75000"/>
+                  </a:schemeClr>
+                </a:solidFill>
+                <a:latin typeface="+mn-lt"/>
+                <a:ea typeface="+mn-ea"/>
+                <a:cs typeface="+mn-cs"/>
+              </a:defRPr>
+            </a:lvl1pPr>
+            <a:lvl2pPr marL="457200" algn="l" defTabSz="457200" rtl="0" eaLnBrk="1" latinLnBrk="0" hangingPunct="1">
+              <a:defRPr sz="1800" kern="1200">
+                <a:solidFill>
+                  <a:schemeClr val="tx1"/>
+                </a:solidFill>
+                <a:latin typeface="+mn-lt"/>
+                <a:ea typeface="+mn-ea"/>
+                <a:cs typeface="+mn-cs"/>
+              </a:defRPr>
+            </a:lvl2pPr>
+            <a:lvl3pPr marL="914400" algn="l" defTabSz="457200" rtl="0" eaLnBrk="1" latinLnBrk="0" hangingPunct="1">
+              <a:defRPr sz="1800" kern="1200">
+                <a:solidFill>
+                  <a:schemeClr val="tx1"/>
+                </a:solidFill>
+                <a:latin typeface="+mn-lt"/>
+                <a:ea typeface="+mn-ea"/>
+                <a:cs typeface="+mn-cs"/>
+              </a:defRPr>
+            </a:lvl3pPr>
+            <a:lvl4pPr marL="1371600" algn="l" defTabSz="457200" rtl="0" eaLnBrk="1" latinLnBrk="0" hangingPunct="1">
+              <a:defRPr sz="1800" kern="1200">
+                <a:solidFill>
+                  <a:schemeClr val="tx1"/>
+                </a:solidFill>
+                <a:latin typeface="+mn-lt"/>
+                <a:ea typeface="+mn-ea"/>
+                <a:cs typeface="+mn-cs"/>
+              </a:defRPr>
+            </a:lvl4pPr>
+            <a:lvl5pPr marL="1828800" algn="l" defTabSz="457200" rtl="0" eaLnBrk="1" latinLnBrk="0" hangingPunct="1">
+              <a:defRPr sz="1800" kern="1200">
+                <a:solidFill>
+                  <a:schemeClr val="tx1"/>
+                </a:solidFill>
+                <a:latin typeface="+mn-lt"/>
+                <a:ea typeface="+mn-ea"/>
+                <a:cs typeface="+mn-cs"/>
+              </a:defRPr>
+            </a:lvl5pPr>
+            <a:lvl6pPr marL="2286000" algn="l" defTabSz="457200" rtl="0" eaLnBrk="1" latinLnBrk="0" hangingPunct="1">
+              <a:defRPr sz="1800" kern="1200">
+                <a:solidFill>
+                  <a:schemeClr val="tx1"/>
+                </a:solidFill>
+                <a:latin typeface="+mn-lt"/>
+                <a:ea typeface="+mn-ea"/>
+                <a:cs typeface="+mn-cs"/>
+              </a:defRPr>
+            </a:lvl6pPr>
+            <a:lvl7pPr marL="2743200" algn="l" defTabSz="457200" rtl="0" eaLnBrk="1" latinLnBrk="0" hangingPunct="1">
+              <a:defRPr sz="1800" kern="1200">
+                <a:solidFill>
+                  <a:schemeClr val="tx1"/>
+                </a:solidFill>
+                <a:latin typeface="+mn-lt"/>
+                <a:ea typeface="+mn-ea"/>
+                <a:cs typeface="+mn-cs"/>
+              </a:defRPr>
+            </a:lvl7pPr>
+            <a:lvl8pPr marL="3200400" algn="l" defTabSz="457200" rtl="0" eaLnBrk="1" latinLnBrk="0" hangingPunct="1">
+              <a:defRPr sz="1800" kern="1200">
+                <a:solidFill>
+                  <a:schemeClr val="tx1"/>
+                </a:solidFill>
+                <a:latin typeface="+mn-lt"/>
+                <a:ea typeface="+mn-ea"/>
+                <a:cs typeface="+mn-cs"/>
+              </a:defRPr>
+            </a:lvl8pPr>
+            <a:lvl9pPr marL="3657600" algn="l" defTabSz="457200" rtl="0" eaLnBrk="1" latinLnBrk="0" hangingPunct="1">
+              <a:defRPr sz="1800" kern="1200">
+                <a:solidFill>
+                  <a:schemeClr val="tx1"/>
+                </a:solidFill>
+                <a:latin typeface="+mn-lt"/>
+                <a:ea typeface="+mn-ea"/>
+                <a:cs typeface="+mn-cs"/>
+              </a:defRPr>
+            </a:lvl9pPr>
+          </a:lstStyle>
+          <a:p>
+            <a:r>
+              <a:rPr lang="fr-FR"/>
+              <a:t>Benjamin Heuclin, Axe transversal TIM, UPR AÏDA, Cirad</a:t>
+            </a:r>
+            <a:endParaRPr lang="fr-FR" dirty="0"/>
           </a:p>
         </p:txBody>
       </p:sp>
@@ -8596,6 +9448,73 @@
           </a:p>
         </p:txBody>
       </p:sp>
+      <p:sp>
+        <p:nvSpPr>
+          <p:cNvPr id="9" name="Espace réservé du numéro de diapositive 8">
+            <a:extLst>
+              <a:ext uri="{FF2B5EF4-FFF2-40B4-BE49-F238E27FC236}">
+                <a16:creationId xmlns:a16="http://schemas.microsoft.com/office/drawing/2014/main" id="{59A70E91-7CEB-4C06-8212-5A83D5B4AC44}"/>
+              </a:ext>
+            </a:extLst>
+          </p:cNvPr>
+          <p:cNvSpPr>
+            <a:spLocks noGrp="1"/>
+          </p:cNvSpPr>
+          <p:nvPr>
+            <p:ph type="sldNum" sz="quarter" idx="12"/>
+          </p:nvPr>
+        </p:nvSpPr>
+        <p:spPr/>
+        <p:txBody>
+          <a:bodyPr/>
+          <a:lstStyle/>
+          <a:p>
+            <a:fld id="{7161DBD5-FC76-3842-B5FF-1B83B7554A96}" type="slidenum">
+              <a:rPr lang="fr-FR" smtClean="0"/>
+              <a:t>18</a:t>
+            </a:fld>
+            <a:endParaRPr lang="fr-FR"/>
+          </a:p>
+        </p:txBody>
+      </p:sp>
+      <p:sp>
+        <p:nvSpPr>
+          <p:cNvPr id="10" name="Espace réservé du pied de page 1">
+            <a:extLst>
+              <a:ext uri="{FF2B5EF4-FFF2-40B4-BE49-F238E27FC236}">
+                <a16:creationId xmlns:a16="http://schemas.microsoft.com/office/drawing/2014/main" id="{246BDCB0-ECD6-4F13-ADB5-FD4CABADC0A5}"/>
+              </a:ext>
+            </a:extLst>
+          </p:cNvPr>
+          <p:cNvSpPr>
+            <a:spLocks noGrp="1"/>
+          </p:cNvSpPr>
+          <p:nvPr>
+            <p:ph type="ftr" sz="quarter" idx="11"/>
+          </p:nvPr>
+        </p:nvSpPr>
+        <p:spPr>
+          <a:xfrm>
+            <a:off x="2383283" y="6501691"/>
+            <a:ext cx="4377431" cy="365125"/>
+          </a:xfrm>
+        </p:spPr>
+        <p:txBody>
+          <a:bodyPr/>
+          <a:lstStyle/>
+          <a:p>
+            <a:r>
+              <a:rPr lang="fr-FR" dirty="0"/>
+              <a:t>Benjamin Heuclin, Axe transversal TIM, UPR AÏDA, </a:t>
+            </a:r>
+            <a:r>
+              <a:rPr lang="fr-FR" dirty="0" err="1"/>
+              <a:t>Cirad</a:t>
+            </a:r>
+            <a:endParaRPr lang="fr-FR" dirty="0"/>
+          </a:p>
+        </p:txBody>
+      </p:sp>
     </p:spTree>
     <p:extLst>
       <p:ext uri="{BB962C8B-B14F-4D97-AF65-F5344CB8AC3E}">
@@ -9043,6 +9962,73 @@
           </p:style>
         </p:cxnSp>
       </p:grpSp>
+      <p:sp>
+        <p:nvSpPr>
+          <p:cNvPr id="15" name="Espace réservé du numéro de diapositive 14">
+            <a:extLst>
+              <a:ext uri="{FF2B5EF4-FFF2-40B4-BE49-F238E27FC236}">
+                <a16:creationId xmlns:a16="http://schemas.microsoft.com/office/drawing/2014/main" id="{34BA3F17-3D96-48BD-B0B8-A594C7462313}"/>
+              </a:ext>
+            </a:extLst>
+          </p:cNvPr>
+          <p:cNvSpPr>
+            <a:spLocks noGrp="1"/>
+          </p:cNvSpPr>
+          <p:nvPr>
+            <p:ph type="sldNum" sz="quarter" idx="12"/>
+          </p:nvPr>
+        </p:nvSpPr>
+        <p:spPr/>
+        <p:txBody>
+          <a:bodyPr/>
+          <a:lstStyle/>
+          <a:p>
+            <a:fld id="{7161DBD5-FC76-3842-B5FF-1B83B7554A96}" type="slidenum">
+              <a:rPr lang="fr-FR" smtClean="0"/>
+              <a:t>19</a:t>
+            </a:fld>
+            <a:endParaRPr lang="fr-FR"/>
+          </a:p>
+        </p:txBody>
+      </p:sp>
+      <p:sp>
+        <p:nvSpPr>
+          <p:cNvPr id="16" name="Espace réservé du pied de page 1">
+            <a:extLst>
+              <a:ext uri="{FF2B5EF4-FFF2-40B4-BE49-F238E27FC236}">
+                <a16:creationId xmlns:a16="http://schemas.microsoft.com/office/drawing/2014/main" id="{147C9B7F-2709-4272-A0FF-2C77C39DD96D}"/>
+              </a:ext>
+            </a:extLst>
+          </p:cNvPr>
+          <p:cNvSpPr>
+            <a:spLocks noGrp="1"/>
+          </p:cNvSpPr>
+          <p:nvPr>
+            <p:ph type="ftr" sz="quarter" idx="11"/>
+          </p:nvPr>
+        </p:nvSpPr>
+        <p:spPr>
+          <a:xfrm>
+            <a:off x="2383283" y="6501691"/>
+            <a:ext cx="4377431" cy="365125"/>
+          </a:xfrm>
+        </p:spPr>
+        <p:txBody>
+          <a:bodyPr/>
+          <a:lstStyle/>
+          <a:p>
+            <a:r>
+              <a:rPr lang="fr-FR" dirty="0"/>
+              <a:t>Benjamin Heuclin, Axe transversal TIM, UPR AÏDA, </a:t>
+            </a:r>
+            <a:r>
+              <a:rPr lang="fr-FR" dirty="0" err="1"/>
+              <a:t>Cirad</a:t>
+            </a:r>
+            <a:endParaRPr lang="fr-FR" dirty="0"/>
+          </a:p>
+        </p:txBody>
+      </p:sp>
     </p:spTree>
     <p:extLst>
       <p:ext uri="{BB962C8B-B14F-4D97-AF65-F5344CB8AC3E}">
@@ -9073,12 +10059,79 @@
           <a:chExt cx="0" cy="0"/>
         </a:xfrm>
       </p:grpSpPr>
+      <p:sp>
+        <p:nvSpPr>
+          <p:cNvPr id="2" name="Espace réservé du pied de page 1">
+            <a:extLst>
+              <a:ext uri="{FF2B5EF4-FFF2-40B4-BE49-F238E27FC236}">
+                <a16:creationId xmlns:a16="http://schemas.microsoft.com/office/drawing/2014/main" id="{9E01D733-A17B-412D-A90D-C96F4C473A27}"/>
+              </a:ext>
+            </a:extLst>
+          </p:cNvPr>
+          <p:cNvSpPr>
+            <a:spLocks noGrp="1"/>
+          </p:cNvSpPr>
+          <p:nvPr>
+            <p:ph type="ftr" sz="quarter" idx="11"/>
+          </p:nvPr>
+        </p:nvSpPr>
+        <p:spPr>
+          <a:xfrm>
+            <a:off x="2383283" y="6501691"/>
+            <a:ext cx="4377431" cy="365125"/>
+          </a:xfrm>
+        </p:spPr>
+        <p:txBody>
+          <a:bodyPr/>
+          <a:lstStyle/>
+          <a:p>
+            <a:r>
+              <a:rPr lang="fr-FR" dirty="0"/>
+              <a:t>Benjamin Heuclin, Axe transversal TIM, UPR AÏDA, </a:t>
+            </a:r>
+            <a:r>
+              <a:rPr lang="fr-FR" dirty="0" err="1"/>
+              <a:t>Cirad</a:t>
+            </a:r>
+            <a:endParaRPr lang="fr-FR" dirty="0"/>
+          </a:p>
+        </p:txBody>
+      </p:sp>
+      <p:sp>
+        <p:nvSpPr>
+          <p:cNvPr id="3" name="Espace réservé du numéro de diapositive 2">
+            <a:extLst>
+              <a:ext uri="{FF2B5EF4-FFF2-40B4-BE49-F238E27FC236}">
+                <a16:creationId xmlns:a16="http://schemas.microsoft.com/office/drawing/2014/main" id="{C6569333-41A6-4747-BAA3-F6A2CF79790B}"/>
+              </a:ext>
+            </a:extLst>
+          </p:cNvPr>
+          <p:cNvSpPr>
+            <a:spLocks noGrp="1"/>
+          </p:cNvSpPr>
+          <p:nvPr>
+            <p:ph type="sldNum" sz="quarter" idx="12"/>
+          </p:nvPr>
+        </p:nvSpPr>
+        <p:spPr/>
+        <p:txBody>
+          <a:bodyPr/>
+          <a:lstStyle/>
+          <a:p>
+            <a:fld id="{7161DBD5-FC76-3842-B5FF-1B83B7554A96}" type="slidenum">
+              <a:rPr lang="fr-FR" smtClean="0"/>
+              <a:t>2</a:t>
+            </a:fld>
+            <a:endParaRPr lang="fr-FR"/>
+          </a:p>
+        </p:txBody>
+      </p:sp>
       <p:pic>
         <p:nvPicPr>
-          <p:cNvPr id="1026" name="Picture 2">
+          <p:cNvPr id="4" name="Picture 2">
             <a:extLst>
               <a:ext uri="{FF2B5EF4-FFF2-40B4-BE49-F238E27FC236}">
-                <a16:creationId xmlns:a16="http://schemas.microsoft.com/office/drawing/2014/main" id="{B27FF9B8-6FEC-4477-B1F1-AF242814B300}"/>
+                <a16:creationId xmlns:a16="http://schemas.microsoft.com/office/drawing/2014/main" id="{FEF540E6-062D-4615-B4D7-EE23C6C83DAD}"/>
               </a:ext>
             </a:extLst>
           </p:cNvPr>
@@ -9123,25 +10176,13 @@
     </p:spTree>
     <p:extLst>
       <p:ext uri="{BB962C8B-B14F-4D97-AF65-F5344CB8AC3E}">
-        <p14:creationId xmlns:p14="http://schemas.microsoft.com/office/powerpoint/2010/main" val="3867482798"/>
+        <p14:creationId xmlns:p14="http://schemas.microsoft.com/office/powerpoint/2010/main" val="2281669701"/>
       </p:ext>
     </p:extLst>
   </p:cSld>
   <p:clrMapOvr>
     <a:masterClrMapping/>
   </p:clrMapOvr>
-  <mc:AlternateContent xmlns:mc="http://schemas.openxmlformats.org/markup-compatibility/2006" xmlns:p14="http://schemas.microsoft.com/office/powerpoint/2010/main">
-    <mc:Choice Requires="p14">
-      <p:transition spd="slow" p14:dur="1750">
-        <p:fade/>
-      </p:transition>
-    </mc:Choice>
-    <mc:Fallback xmlns="">
-      <p:transition spd="slow">
-        <p:fade/>
-      </p:transition>
-    </mc:Fallback>
-  </mc:AlternateContent>
 </p:sld>
 </file>
 
@@ -9578,6 +10619,73 @@
             <a:endParaRPr lang="fr-FR" altLang="fr-FR" dirty="0">
               <a:latin typeface="Arial" panose="020B0604020202020204" pitchFamily="34" charset="0"/>
             </a:endParaRPr>
+          </a:p>
+        </p:txBody>
+      </p:sp>
+      <p:sp>
+        <p:nvSpPr>
+          <p:cNvPr id="7" name="Espace réservé du numéro de diapositive 6">
+            <a:extLst>
+              <a:ext uri="{FF2B5EF4-FFF2-40B4-BE49-F238E27FC236}">
+                <a16:creationId xmlns:a16="http://schemas.microsoft.com/office/drawing/2014/main" id="{8E46D7E4-9185-4578-AD8C-101A19FC3562}"/>
+              </a:ext>
+            </a:extLst>
+          </p:cNvPr>
+          <p:cNvSpPr>
+            <a:spLocks noGrp="1"/>
+          </p:cNvSpPr>
+          <p:nvPr>
+            <p:ph type="sldNum" sz="quarter" idx="12"/>
+          </p:nvPr>
+        </p:nvSpPr>
+        <p:spPr/>
+        <p:txBody>
+          <a:bodyPr/>
+          <a:lstStyle/>
+          <a:p>
+            <a:fld id="{7161DBD5-FC76-3842-B5FF-1B83B7554A96}" type="slidenum">
+              <a:rPr lang="fr-FR" smtClean="0"/>
+              <a:t>20</a:t>
+            </a:fld>
+            <a:endParaRPr lang="fr-FR"/>
+          </a:p>
+        </p:txBody>
+      </p:sp>
+      <p:sp>
+        <p:nvSpPr>
+          <p:cNvPr id="8" name="Espace réservé du pied de page 1">
+            <a:extLst>
+              <a:ext uri="{FF2B5EF4-FFF2-40B4-BE49-F238E27FC236}">
+                <a16:creationId xmlns:a16="http://schemas.microsoft.com/office/drawing/2014/main" id="{7CB71028-AC04-4A05-ADB3-73A3AAD3F3BC}"/>
+              </a:ext>
+            </a:extLst>
+          </p:cNvPr>
+          <p:cNvSpPr>
+            <a:spLocks noGrp="1"/>
+          </p:cNvSpPr>
+          <p:nvPr>
+            <p:ph type="ftr" sz="quarter" idx="11"/>
+          </p:nvPr>
+        </p:nvSpPr>
+        <p:spPr>
+          <a:xfrm>
+            <a:off x="2383283" y="6501691"/>
+            <a:ext cx="4377431" cy="365125"/>
+          </a:xfrm>
+        </p:spPr>
+        <p:txBody>
+          <a:bodyPr/>
+          <a:lstStyle/>
+          <a:p>
+            <a:r>
+              <a:rPr lang="fr-FR" dirty="0"/>
+              <a:t>Benjamin Heuclin, Axe transversal TIM, UPR AÏDA, </a:t>
+            </a:r>
+            <a:r>
+              <a:rPr lang="fr-FR" dirty="0" err="1"/>
+              <a:t>Cirad</a:t>
+            </a:r>
+            <a:endParaRPr lang="fr-FR" dirty="0"/>
           </a:p>
         </p:txBody>
       </p:sp>
@@ -9667,6 +10775,73 @@
           </a:p>
         </p:txBody>
       </p:sp>
+      <p:sp>
+        <p:nvSpPr>
+          <p:cNvPr id="6" name="Espace réservé du numéro de diapositive 5">
+            <a:extLst>
+              <a:ext uri="{FF2B5EF4-FFF2-40B4-BE49-F238E27FC236}">
+                <a16:creationId xmlns:a16="http://schemas.microsoft.com/office/drawing/2014/main" id="{FBEB91ED-99D3-4781-90C4-E2CD6419C265}"/>
+              </a:ext>
+            </a:extLst>
+          </p:cNvPr>
+          <p:cNvSpPr>
+            <a:spLocks noGrp="1"/>
+          </p:cNvSpPr>
+          <p:nvPr>
+            <p:ph type="sldNum" sz="quarter" idx="12"/>
+          </p:nvPr>
+        </p:nvSpPr>
+        <p:spPr/>
+        <p:txBody>
+          <a:bodyPr/>
+          <a:lstStyle/>
+          <a:p>
+            <a:fld id="{7161DBD5-FC76-3842-B5FF-1B83B7554A96}" type="slidenum">
+              <a:rPr lang="fr-FR" smtClean="0"/>
+              <a:t>21</a:t>
+            </a:fld>
+            <a:endParaRPr lang="fr-FR"/>
+          </a:p>
+        </p:txBody>
+      </p:sp>
+      <p:sp>
+        <p:nvSpPr>
+          <p:cNvPr id="7" name="Espace réservé du pied de page 1">
+            <a:extLst>
+              <a:ext uri="{FF2B5EF4-FFF2-40B4-BE49-F238E27FC236}">
+                <a16:creationId xmlns:a16="http://schemas.microsoft.com/office/drawing/2014/main" id="{C0EB8EFC-DCFC-44C1-8EA6-5E2D9170D72B}"/>
+              </a:ext>
+            </a:extLst>
+          </p:cNvPr>
+          <p:cNvSpPr>
+            <a:spLocks noGrp="1"/>
+          </p:cNvSpPr>
+          <p:nvPr>
+            <p:ph type="ftr" sz="quarter" idx="11"/>
+          </p:nvPr>
+        </p:nvSpPr>
+        <p:spPr>
+          <a:xfrm>
+            <a:off x="2383283" y="6501691"/>
+            <a:ext cx="4377431" cy="365125"/>
+          </a:xfrm>
+        </p:spPr>
+        <p:txBody>
+          <a:bodyPr/>
+          <a:lstStyle/>
+          <a:p>
+            <a:r>
+              <a:rPr lang="fr-FR" dirty="0"/>
+              <a:t>Benjamin Heuclin, Axe transversal TIM, UPR AÏDA, </a:t>
+            </a:r>
+            <a:r>
+              <a:rPr lang="fr-FR" dirty="0" err="1"/>
+              <a:t>Cirad</a:t>
+            </a:r>
+            <a:endParaRPr lang="fr-FR" dirty="0"/>
+          </a:p>
+        </p:txBody>
+      </p:sp>
     </p:spTree>
     <p:extLst>
       <p:ext uri="{BB962C8B-B14F-4D97-AF65-F5344CB8AC3E}">
@@ -9758,10 +10933,10 @@
           <p:nvPr/>
         </p:nvPicPr>
         <p:blipFill>
-          <a:blip r:embed="rId2">
+          <a:blip r:embed="rId3">
             <a:extLst>
               <a:ext uri="{96DAC541-7B7A-43D3-8B79-37D633B846F1}">
-                <asvg:svgBlip xmlns:asvg="http://schemas.microsoft.com/office/drawing/2016/SVG/main" r:embed="rId3"/>
+                <asvg:svgBlip xmlns:asvg="http://schemas.microsoft.com/office/drawing/2016/SVG/main" r:embed="rId4"/>
               </a:ext>
             </a:extLst>
           </a:blip>
@@ -9818,6 +10993,73 @@
               <a:rPr lang="fr-FR" sz="2400" b="1" dirty="0"/>
               <a:t> comme GitLab ! </a:t>
             </a:r>
+          </a:p>
+        </p:txBody>
+      </p:sp>
+      <p:sp>
+        <p:nvSpPr>
+          <p:cNvPr id="8" name="Espace réservé du numéro de diapositive 7">
+            <a:extLst>
+              <a:ext uri="{FF2B5EF4-FFF2-40B4-BE49-F238E27FC236}">
+                <a16:creationId xmlns:a16="http://schemas.microsoft.com/office/drawing/2014/main" id="{D674862B-5440-458E-AC55-854AD22578B8}"/>
+              </a:ext>
+            </a:extLst>
+          </p:cNvPr>
+          <p:cNvSpPr>
+            <a:spLocks noGrp="1"/>
+          </p:cNvSpPr>
+          <p:nvPr>
+            <p:ph type="sldNum" sz="quarter" idx="12"/>
+          </p:nvPr>
+        </p:nvSpPr>
+        <p:spPr/>
+        <p:txBody>
+          <a:bodyPr/>
+          <a:lstStyle/>
+          <a:p>
+            <a:fld id="{7161DBD5-FC76-3842-B5FF-1B83B7554A96}" type="slidenum">
+              <a:rPr lang="fr-FR" smtClean="0"/>
+              <a:t>3</a:t>
+            </a:fld>
+            <a:endParaRPr lang="fr-FR"/>
+          </a:p>
+        </p:txBody>
+      </p:sp>
+      <p:sp>
+        <p:nvSpPr>
+          <p:cNvPr id="9" name="Espace réservé du pied de page 1">
+            <a:extLst>
+              <a:ext uri="{FF2B5EF4-FFF2-40B4-BE49-F238E27FC236}">
+                <a16:creationId xmlns:a16="http://schemas.microsoft.com/office/drawing/2014/main" id="{A688804A-7F50-4C62-84DD-4CF4C8F33AC3}"/>
+              </a:ext>
+            </a:extLst>
+          </p:cNvPr>
+          <p:cNvSpPr>
+            <a:spLocks noGrp="1"/>
+          </p:cNvSpPr>
+          <p:nvPr>
+            <p:ph type="ftr" sz="quarter" idx="11"/>
+          </p:nvPr>
+        </p:nvSpPr>
+        <p:spPr>
+          <a:xfrm>
+            <a:off x="2383283" y="6501691"/>
+            <a:ext cx="4377431" cy="365125"/>
+          </a:xfrm>
+        </p:spPr>
+        <p:txBody>
+          <a:bodyPr/>
+          <a:lstStyle/>
+          <a:p>
+            <a:r>
+              <a:rPr lang="fr-FR" dirty="0"/>
+              <a:t>Benjamin Heuclin, Axe transversal TIM, UPR AÏDA, </a:t>
+            </a:r>
+            <a:r>
+              <a:rPr lang="fr-FR" dirty="0" err="1"/>
+              <a:t>Cirad</a:t>
+            </a:r>
+            <a:endParaRPr lang="fr-FR" dirty="0"/>
           </a:p>
         </p:txBody>
       </p:sp>
@@ -10232,6 +11474,73 @@
               <a:rPr lang="fr-FR" sz="2800" b="1" dirty="0"/>
               <a:t>Donc pas d’excuse 🤩</a:t>
             </a:r>
+          </a:p>
+        </p:txBody>
+      </p:sp>
+      <p:sp>
+        <p:nvSpPr>
+          <p:cNvPr id="6" name="Espace réservé du numéro de diapositive 5">
+            <a:extLst>
+              <a:ext uri="{FF2B5EF4-FFF2-40B4-BE49-F238E27FC236}">
+                <a16:creationId xmlns:a16="http://schemas.microsoft.com/office/drawing/2014/main" id="{64819BF1-FBD6-4455-BCE9-0FAF2348C06A}"/>
+              </a:ext>
+            </a:extLst>
+          </p:cNvPr>
+          <p:cNvSpPr>
+            <a:spLocks noGrp="1"/>
+          </p:cNvSpPr>
+          <p:nvPr>
+            <p:ph type="sldNum" sz="quarter" idx="12"/>
+          </p:nvPr>
+        </p:nvSpPr>
+        <p:spPr/>
+        <p:txBody>
+          <a:bodyPr/>
+          <a:lstStyle/>
+          <a:p>
+            <a:fld id="{7161DBD5-FC76-3842-B5FF-1B83B7554A96}" type="slidenum">
+              <a:rPr lang="fr-FR" smtClean="0"/>
+              <a:t>4</a:t>
+            </a:fld>
+            <a:endParaRPr lang="fr-FR"/>
+          </a:p>
+        </p:txBody>
+      </p:sp>
+      <p:sp>
+        <p:nvSpPr>
+          <p:cNvPr id="7" name="Espace réservé du pied de page 1">
+            <a:extLst>
+              <a:ext uri="{FF2B5EF4-FFF2-40B4-BE49-F238E27FC236}">
+                <a16:creationId xmlns:a16="http://schemas.microsoft.com/office/drawing/2014/main" id="{05A6EAC6-79AC-4355-AF34-D96E91CF1342}"/>
+              </a:ext>
+            </a:extLst>
+          </p:cNvPr>
+          <p:cNvSpPr>
+            <a:spLocks noGrp="1"/>
+          </p:cNvSpPr>
+          <p:nvPr>
+            <p:ph type="ftr" sz="quarter" idx="11"/>
+          </p:nvPr>
+        </p:nvSpPr>
+        <p:spPr>
+          <a:xfrm>
+            <a:off x="2383283" y="6501691"/>
+            <a:ext cx="4377431" cy="365125"/>
+          </a:xfrm>
+        </p:spPr>
+        <p:txBody>
+          <a:bodyPr/>
+          <a:lstStyle/>
+          <a:p>
+            <a:r>
+              <a:rPr lang="fr-FR" dirty="0"/>
+              <a:t>Benjamin Heuclin, Axe transversal TIM, UPR AÏDA, </a:t>
+            </a:r>
+            <a:r>
+              <a:rPr lang="fr-FR" dirty="0" err="1"/>
+              <a:t>Cirad</a:t>
+            </a:r>
+            <a:endParaRPr lang="fr-FR" dirty="0"/>
           </a:p>
         </p:txBody>
       </p:sp>
@@ -10518,7 +11827,7 @@
             </a:r>
             <a:r>
               <a:rPr lang="fr-FR" dirty="0">
-                <a:hlinkClick r:id="rId2"/>
+                <a:hlinkClick r:id="rId3"/>
               </a:rPr>
               <a:t>https://gitlab.cirad.fr/</a:t>
             </a:r>
@@ -10591,6 +11900,73 @@
             <a:endParaRPr lang="fr-FR" dirty="0"/>
           </a:p>
           <a:p>
+            <a:endParaRPr lang="fr-FR" dirty="0"/>
+          </a:p>
+        </p:txBody>
+      </p:sp>
+      <p:sp>
+        <p:nvSpPr>
+          <p:cNvPr id="6" name="Espace réservé du numéro de diapositive 5">
+            <a:extLst>
+              <a:ext uri="{FF2B5EF4-FFF2-40B4-BE49-F238E27FC236}">
+                <a16:creationId xmlns:a16="http://schemas.microsoft.com/office/drawing/2014/main" id="{35B04F1A-12B2-4451-BAAA-6D5BA4703999}"/>
+              </a:ext>
+            </a:extLst>
+          </p:cNvPr>
+          <p:cNvSpPr>
+            <a:spLocks noGrp="1"/>
+          </p:cNvSpPr>
+          <p:nvPr>
+            <p:ph type="sldNum" sz="quarter" idx="12"/>
+          </p:nvPr>
+        </p:nvSpPr>
+        <p:spPr/>
+        <p:txBody>
+          <a:bodyPr/>
+          <a:lstStyle/>
+          <a:p>
+            <a:fld id="{7161DBD5-FC76-3842-B5FF-1B83B7554A96}" type="slidenum">
+              <a:rPr lang="fr-FR" smtClean="0"/>
+              <a:t>5</a:t>
+            </a:fld>
+            <a:endParaRPr lang="fr-FR"/>
+          </a:p>
+        </p:txBody>
+      </p:sp>
+      <p:sp>
+        <p:nvSpPr>
+          <p:cNvPr id="7" name="Espace réservé du pied de page 1">
+            <a:extLst>
+              <a:ext uri="{FF2B5EF4-FFF2-40B4-BE49-F238E27FC236}">
+                <a16:creationId xmlns:a16="http://schemas.microsoft.com/office/drawing/2014/main" id="{2929124E-5D21-4C51-A6C3-757F1D29B90F}"/>
+              </a:ext>
+            </a:extLst>
+          </p:cNvPr>
+          <p:cNvSpPr>
+            <a:spLocks noGrp="1"/>
+          </p:cNvSpPr>
+          <p:nvPr>
+            <p:ph type="ftr" sz="quarter" idx="11"/>
+          </p:nvPr>
+        </p:nvSpPr>
+        <p:spPr>
+          <a:xfrm>
+            <a:off x="2383283" y="6501691"/>
+            <a:ext cx="4377431" cy="365125"/>
+          </a:xfrm>
+        </p:spPr>
+        <p:txBody>
+          <a:bodyPr/>
+          <a:lstStyle/>
+          <a:p>
+            <a:r>
+              <a:rPr lang="fr-FR" dirty="0"/>
+              <a:t>Benjamin Heuclin, Axe transversal TIM, UPR AÏDA, </a:t>
+            </a:r>
+            <a:r>
+              <a:rPr lang="fr-FR" dirty="0" err="1"/>
+              <a:t>Cirad</a:t>
+            </a:r>
             <a:endParaRPr lang="fr-FR" dirty="0"/>
           </a:p>
         </p:txBody>
@@ -11109,6 +12485,73 @@
           </a:p>
         </p:txBody>
       </p:sp>
+      <p:sp>
+        <p:nvSpPr>
+          <p:cNvPr id="7" name="Espace réservé du numéro de diapositive 6">
+            <a:extLst>
+              <a:ext uri="{FF2B5EF4-FFF2-40B4-BE49-F238E27FC236}">
+                <a16:creationId xmlns:a16="http://schemas.microsoft.com/office/drawing/2014/main" id="{B175E1F3-C29F-4D26-A49C-F198DBB6A1BE}"/>
+              </a:ext>
+            </a:extLst>
+          </p:cNvPr>
+          <p:cNvSpPr>
+            <a:spLocks noGrp="1"/>
+          </p:cNvSpPr>
+          <p:nvPr>
+            <p:ph type="sldNum" sz="quarter" idx="12"/>
+          </p:nvPr>
+        </p:nvSpPr>
+        <p:spPr/>
+        <p:txBody>
+          <a:bodyPr/>
+          <a:lstStyle/>
+          <a:p>
+            <a:fld id="{7161DBD5-FC76-3842-B5FF-1B83B7554A96}" type="slidenum">
+              <a:rPr lang="fr-FR" smtClean="0"/>
+              <a:t>6</a:t>
+            </a:fld>
+            <a:endParaRPr lang="fr-FR"/>
+          </a:p>
+        </p:txBody>
+      </p:sp>
+      <p:sp>
+        <p:nvSpPr>
+          <p:cNvPr id="8" name="Espace réservé du pied de page 1">
+            <a:extLst>
+              <a:ext uri="{FF2B5EF4-FFF2-40B4-BE49-F238E27FC236}">
+                <a16:creationId xmlns:a16="http://schemas.microsoft.com/office/drawing/2014/main" id="{40198805-7D5D-4481-93A3-A345B43A4392}"/>
+              </a:ext>
+            </a:extLst>
+          </p:cNvPr>
+          <p:cNvSpPr>
+            <a:spLocks noGrp="1"/>
+          </p:cNvSpPr>
+          <p:nvPr>
+            <p:ph type="ftr" sz="quarter" idx="11"/>
+          </p:nvPr>
+        </p:nvSpPr>
+        <p:spPr>
+          <a:xfrm>
+            <a:off x="2383283" y="6501691"/>
+            <a:ext cx="4377431" cy="365125"/>
+          </a:xfrm>
+        </p:spPr>
+        <p:txBody>
+          <a:bodyPr/>
+          <a:lstStyle/>
+          <a:p>
+            <a:r>
+              <a:rPr lang="fr-FR" dirty="0"/>
+              <a:t>Benjamin Heuclin, Axe transversal TIM, UPR AÏDA, </a:t>
+            </a:r>
+            <a:r>
+              <a:rPr lang="fr-FR" dirty="0" err="1"/>
+              <a:t>Cirad</a:t>
+            </a:r>
+            <a:endParaRPr lang="fr-FR" dirty="0"/>
+          </a:p>
+        </p:txBody>
+      </p:sp>
     </p:spTree>
     <p:extLst>
       <p:ext uri="{BB962C8B-B14F-4D97-AF65-F5344CB8AC3E}">
@@ -11514,6 +12957,73 @@
           </a:p>
         </p:txBody>
       </p:sp>
+      <p:sp>
+        <p:nvSpPr>
+          <p:cNvPr id="7" name="Espace réservé du numéro de diapositive 6">
+            <a:extLst>
+              <a:ext uri="{FF2B5EF4-FFF2-40B4-BE49-F238E27FC236}">
+                <a16:creationId xmlns:a16="http://schemas.microsoft.com/office/drawing/2014/main" id="{051361FE-7F96-4CA8-8D0D-1F05150BE67D}"/>
+              </a:ext>
+            </a:extLst>
+          </p:cNvPr>
+          <p:cNvSpPr>
+            <a:spLocks noGrp="1"/>
+          </p:cNvSpPr>
+          <p:nvPr>
+            <p:ph type="sldNum" sz="quarter" idx="12"/>
+          </p:nvPr>
+        </p:nvSpPr>
+        <p:spPr/>
+        <p:txBody>
+          <a:bodyPr/>
+          <a:lstStyle/>
+          <a:p>
+            <a:fld id="{7161DBD5-FC76-3842-B5FF-1B83B7554A96}" type="slidenum">
+              <a:rPr lang="fr-FR" smtClean="0"/>
+              <a:t>7</a:t>
+            </a:fld>
+            <a:endParaRPr lang="fr-FR"/>
+          </a:p>
+        </p:txBody>
+      </p:sp>
+      <p:sp>
+        <p:nvSpPr>
+          <p:cNvPr id="8" name="Espace réservé du pied de page 1">
+            <a:extLst>
+              <a:ext uri="{FF2B5EF4-FFF2-40B4-BE49-F238E27FC236}">
+                <a16:creationId xmlns:a16="http://schemas.microsoft.com/office/drawing/2014/main" id="{9DD9AA9C-09FA-4643-8DA1-73714B71F6AA}"/>
+              </a:ext>
+            </a:extLst>
+          </p:cNvPr>
+          <p:cNvSpPr>
+            <a:spLocks noGrp="1"/>
+          </p:cNvSpPr>
+          <p:nvPr>
+            <p:ph type="ftr" sz="quarter" idx="11"/>
+          </p:nvPr>
+        </p:nvSpPr>
+        <p:spPr>
+          <a:xfrm>
+            <a:off x="2383283" y="6501691"/>
+            <a:ext cx="4377431" cy="365125"/>
+          </a:xfrm>
+        </p:spPr>
+        <p:txBody>
+          <a:bodyPr/>
+          <a:lstStyle/>
+          <a:p>
+            <a:r>
+              <a:rPr lang="fr-FR" dirty="0"/>
+              <a:t>Benjamin Heuclin, Axe transversal TIM, UPR AÏDA, </a:t>
+            </a:r>
+            <a:r>
+              <a:rPr lang="fr-FR" dirty="0" err="1"/>
+              <a:t>Cirad</a:t>
+            </a:r>
+            <a:endParaRPr lang="fr-FR" dirty="0"/>
+          </a:p>
+        </p:txBody>
+      </p:sp>
     </p:spTree>
     <p:extLst>
       <p:ext uri="{BB962C8B-B14F-4D97-AF65-F5344CB8AC3E}">
@@ -11807,6 +13317,73 @@
           </a:p>
         </p:txBody>
       </p:sp>
+      <p:sp>
+        <p:nvSpPr>
+          <p:cNvPr id="7" name="Espace réservé du numéro de diapositive 6">
+            <a:extLst>
+              <a:ext uri="{FF2B5EF4-FFF2-40B4-BE49-F238E27FC236}">
+                <a16:creationId xmlns:a16="http://schemas.microsoft.com/office/drawing/2014/main" id="{E066F05E-3180-4AF2-AE39-DA9C639A6A96}"/>
+              </a:ext>
+            </a:extLst>
+          </p:cNvPr>
+          <p:cNvSpPr>
+            <a:spLocks noGrp="1"/>
+          </p:cNvSpPr>
+          <p:nvPr>
+            <p:ph type="sldNum" sz="quarter" idx="12"/>
+          </p:nvPr>
+        </p:nvSpPr>
+        <p:spPr/>
+        <p:txBody>
+          <a:bodyPr/>
+          <a:lstStyle/>
+          <a:p>
+            <a:fld id="{7161DBD5-FC76-3842-B5FF-1B83B7554A96}" type="slidenum">
+              <a:rPr lang="fr-FR" smtClean="0"/>
+              <a:t>8</a:t>
+            </a:fld>
+            <a:endParaRPr lang="fr-FR"/>
+          </a:p>
+        </p:txBody>
+      </p:sp>
+      <p:sp>
+        <p:nvSpPr>
+          <p:cNvPr id="8" name="Espace réservé du pied de page 1">
+            <a:extLst>
+              <a:ext uri="{FF2B5EF4-FFF2-40B4-BE49-F238E27FC236}">
+                <a16:creationId xmlns:a16="http://schemas.microsoft.com/office/drawing/2014/main" id="{B88799DA-C65C-484E-A09A-44A8D6E85CDC}"/>
+              </a:ext>
+            </a:extLst>
+          </p:cNvPr>
+          <p:cNvSpPr>
+            <a:spLocks noGrp="1"/>
+          </p:cNvSpPr>
+          <p:nvPr>
+            <p:ph type="ftr" sz="quarter" idx="11"/>
+          </p:nvPr>
+        </p:nvSpPr>
+        <p:spPr>
+          <a:xfrm>
+            <a:off x="2383283" y="6501691"/>
+            <a:ext cx="4377431" cy="365125"/>
+          </a:xfrm>
+        </p:spPr>
+        <p:txBody>
+          <a:bodyPr/>
+          <a:lstStyle/>
+          <a:p>
+            <a:r>
+              <a:rPr lang="fr-FR" dirty="0"/>
+              <a:t>Benjamin Heuclin, Axe transversal TIM, UPR AÏDA, </a:t>
+            </a:r>
+            <a:r>
+              <a:rPr lang="fr-FR" dirty="0" err="1"/>
+              <a:t>Cirad</a:t>
+            </a:r>
+            <a:endParaRPr lang="fr-FR" dirty="0"/>
+          </a:p>
+        </p:txBody>
+      </p:sp>
     </p:spTree>
     <p:extLst>
       <p:ext uri="{BB962C8B-B14F-4D97-AF65-F5344CB8AC3E}">
@@ -11979,6 +13556,73 @@
                 <a:hlinkClick r:id="rId2"/>
               </a:rPr>
               <a:t>https://youtu.be/Ly30zu8epwI</a:t>
+            </a:r>
+            <a:endParaRPr lang="fr-FR" dirty="0"/>
+          </a:p>
+        </p:txBody>
+      </p:sp>
+      <p:sp>
+        <p:nvSpPr>
+          <p:cNvPr id="7" name="Espace réservé du numéro de diapositive 6">
+            <a:extLst>
+              <a:ext uri="{FF2B5EF4-FFF2-40B4-BE49-F238E27FC236}">
+                <a16:creationId xmlns:a16="http://schemas.microsoft.com/office/drawing/2014/main" id="{73DCB65C-8DA8-4AA6-92F2-5F02962CDD35}"/>
+              </a:ext>
+            </a:extLst>
+          </p:cNvPr>
+          <p:cNvSpPr>
+            <a:spLocks noGrp="1"/>
+          </p:cNvSpPr>
+          <p:nvPr>
+            <p:ph type="sldNum" sz="quarter" idx="12"/>
+          </p:nvPr>
+        </p:nvSpPr>
+        <p:spPr/>
+        <p:txBody>
+          <a:bodyPr/>
+          <a:lstStyle/>
+          <a:p>
+            <a:fld id="{7161DBD5-FC76-3842-B5FF-1B83B7554A96}" type="slidenum">
+              <a:rPr lang="fr-FR" smtClean="0"/>
+              <a:t>9</a:t>
+            </a:fld>
+            <a:endParaRPr lang="fr-FR"/>
+          </a:p>
+        </p:txBody>
+      </p:sp>
+      <p:sp>
+        <p:nvSpPr>
+          <p:cNvPr id="8" name="Espace réservé du pied de page 1">
+            <a:extLst>
+              <a:ext uri="{FF2B5EF4-FFF2-40B4-BE49-F238E27FC236}">
+                <a16:creationId xmlns:a16="http://schemas.microsoft.com/office/drawing/2014/main" id="{27B41CE1-726E-4E97-8258-4EE9EC1F17DE}"/>
+              </a:ext>
+            </a:extLst>
+          </p:cNvPr>
+          <p:cNvSpPr>
+            <a:spLocks noGrp="1"/>
+          </p:cNvSpPr>
+          <p:nvPr>
+            <p:ph type="ftr" sz="quarter" idx="11"/>
+          </p:nvPr>
+        </p:nvSpPr>
+        <p:spPr>
+          <a:xfrm>
+            <a:off x="2383283" y="6501691"/>
+            <a:ext cx="4377431" cy="365125"/>
+          </a:xfrm>
+        </p:spPr>
+        <p:txBody>
+          <a:bodyPr/>
+          <a:lstStyle/>
+          <a:p>
+            <a:r>
+              <a:rPr lang="fr-FR" dirty="0"/>
+              <a:t>Benjamin Heuclin, Axe transversal TIM, UPR AÏDA, </a:t>
+            </a:r>
+            <a:r>
+              <a:rPr lang="fr-FR" dirty="0" err="1"/>
+              <a:t>Cirad</a:t>
             </a:r>
             <a:endParaRPr lang="fr-FR" dirty="0"/>
           </a:p>

</xml_diff>